<commit_message>
added 2nd iteration groups fig
</commit_message>
<xml_diff>
--- a/docs/sigmod15/figures/figs.pptx
+++ b/docs/sigmod15/figures/figs.pptx
@@ -10,6 +10,7 @@
     <p:sldId id="260" r:id="rId4"/>
     <p:sldId id="258" r:id="rId5"/>
     <p:sldId id="259" r:id="rId6"/>
+    <p:sldId id="261" r:id="rId7"/>
   </p:sldIdLst>
   <p:sldSz cx="9144000" cy="6858000" type="screen4x3"/>
   <p:notesSz cx="6858000" cy="9144000"/>
@@ -108,6 +109,22 @@
       </a:defRPr>
     </a:lvl9pPr>
   </p:defaultTextStyle>
+  <p:extLst>
+    <p:ext uri="{EFAFB233-063F-42B5-8137-9DF3F51BA10A}">
+      <p15:sldGuideLst xmlns:p15="http://schemas.microsoft.com/office/powerpoint/2012/main">
+        <p15:guide id="1" orient="horz" pos="2160">
+          <p15:clr>
+            <a:srgbClr val="A4A3A4"/>
+          </p15:clr>
+        </p15:guide>
+        <p15:guide id="2" pos="2880">
+          <p15:clr>
+            <a:srgbClr val="A4A3A4"/>
+          </p15:clr>
+        </p15:guide>
+      </p15:sldGuideLst>
+    </p:ext>
+  </p:extLst>
 </p:presentation>
 </file>
 
@@ -292,7 +309,7 @@
           <a:p>
             <a:fld id="{E53DFF73-D480-144E-A535-5E58F29F2980}" type="datetimeFigureOut">
               <a:rPr lang="en-US" smtClean="0"/>
-              <a:t>2/27/15</a:t>
+              <a:t>11/16/15</a:t>
             </a:fld>
             <a:endParaRPr lang="en-US"/>
           </a:p>
@@ -462,7 +479,7 @@
           <a:p>
             <a:fld id="{E53DFF73-D480-144E-A535-5E58F29F2980}" type="datetimeFigureOut">
               <a:rPr lang="en-US" smtClean="0"/>
-              <a:t>2/27/15</a:t>
+              <a:t>11/16/15</a:t>
             </a:fld>
             <a:endParaRPr lang="en-US"/>
           </a:p>
@@ -642,7 +659,7 @@
           <a:p>
             <a:fld id="{E53DFF73-D480-144E-A535-5E58F29F2980}" type="datetimeFigureOut">
               <a:rPr lang="en-US" smtClean="0"/>
-              <a:t>2/27/15</a:t>
+              <a:t>11/16/15</a:t>
             </a:fld>
             <a:endParaRPr lang="en-US"/>
           </a:p>
@@ -812,7 +829,7 @@
           <a:p>
             <a:fld id="{E53DFF73-D480-144E-A535-5E58F29F2980}" type="datetimeFigureOut">
               <a:rPr lang="en-US" smtClean="0"/>
-              <a:t>2/27/15</a:t>
+              <a:t>11/16/15</a:t>
             </a:fld>
             <a:endParaRPr lang="en-US"/>
           </a:p>
@@ -1058,7 +1075,7 @@
           <a:p>
             <a:fld id="{E53DFF73-D480-144E-A535-5E58F29F2980}" type="datetimeFigureOut">
               <a:rPr lang="en-US" smtClean="0"/>
-              <a:t>2/27/15</a:t>
+              <a:t>11/16/15</a:t>
             </a:fld>
             <a:endParaRPr lang="en-US"/>
           </a:p>
@@ -1346,7 +1363,7 @@
           <a:p>
             <a:fld id="{E53DFF73-D480-144E-A535-5E58F29F2980}" type="datetimeFigureOut">
               <a:rPr lang="en-US" smtClean="0"/>
-              <a:t>2/27/15</a:t>
+              <a:t>11/16/15</a:t>
             </a:fld>
             <a:endParaRPr lang="en-US"/>
           </a:p>
@@ -1768,7 +1785,7 @@
           <a:p>
             <a:fld id="{E53DFF73-D480-144E-A535-5E58F29F2980}" type="datetimeFigureOut">
               <a:rPr lang="en-US" smtClean="0"/>
-              <a:t>2/27/15</a:t>
+              <a:t>11/16/15</a:t>
             </a:fld>
             <a:endParaRPr lang="en-US"/>
           </a:p>
@@ -1886,7 +1903,7 @@
           <a:p>
             <a:fld id="{E53DFF73-D480-144E-A535-5E58F29F2980}" type="datetimeFigureOut">
               <a:rPr lang="en-US" smtClean="0"/>
-              <a:t>2/27/15</a:t>
+              <a:t>11/16/15</a:t>
             </a:fld>
             <a:endParaRPr lang="en-US"/>
           </a:p>
@@ -1981,7 +1998,7 @@
           <a:p>
             <a:fld id="{E53DFF73-D480-144E-A535-5E58F29F2980}" type="datetimeFigureOut">
               <a:rPr lang="en-US" smtClean="0"/>
-              <a:t>2/27/15</a:t>
+              <a:t>11/16/15</a:t>
             </a:fld>
             <a:endParaRPr lang="en-US"/>
           </a:p>
@@ -2258,7 +2275,7 @@
           <a:p>
             <a:fld id="{E53DFF73-D480-144E-A535-5E58F29F2980}" type="datetimeFigureOut">
               <a:rPr lang="en-US" smtClean="0"/>
-              <a:t>2/27/15</a:t>
+              <a:t>11/16/15</a:t>
             </a:fld>
             <a:endParaRPr lang="en-US"/>
           </a:p>
@@ -2511,7 +2528,7 @@
           <a:p>
             <a:fld id="{E53DFF73-D480-144E-A535-5E58F29F2980}" type="datetimeFigureOut">
               <a:rPr lang="en-US" smtClean="0"/>
-              <a:t>2/27/15</a:t>
+              <a:t>11/16/15</a:t>
             </a:fld>
             <a:endParaRPr lang="en-US"/>
           </a:p>
@@ -2724,7 +2741,7 @@
           <a:p>
             <a:fld id="{E53DFF73-D480-144E-A535-5E58F29F2980}" type="datetimeFigureOut">
               <a:rPr lang="en-US" smtClean="0"/>
-              <a:t>2/27/15</a:t>
+              <a:t>11/16/15</a:t>
             </a:fld>
             <a:endParaRPr lang="en-US"/>
           </a:p>
@@ -3461,7 +3478,7 @@
   <p:timing>
     <p:tnLst>
       <p:par>
-        <p:cTn xmlns:p14="http://schemas.microsoft.com/office/powerpoint/2010/main" id="1" dur="indefinite" restart="never" nodeType="tmRoot"/>
+        <p:cTn id="1" dur="indefinite" restart="never" nodeType="tmRoot"/>
       </p:par>
     </p:tnLst>
   </p:timing>
@@ -4280,7 +4297,7 @@
   <p:timing>
     <p:tnLst>
       <p:par>
-        <p:cTn xmlns:p14="http://schemas.microsoft.com/office/powerpoint/2010/main" id="1" dur="indefinite" restart="never" nodeType="tmRoot"/>
+        <p:cTn id="1" dur="indefinite" restart="never" nodeType="tmRoot"/>
       </p:par>
     </p:tnLst>
   </p:timing>
@@ -4872,10 +4889,6 @@
               </a:rPr>
               <a:t>^*</a:t>
             </a:r>
-            <a:endParaRPr lang="en-US" sz="2400" dirty="0" smtClean="0">
-              <a:latin typeface="Gill Sans"/>
-              <a:cs typeface="Gill Sans"/>
-            </a:endParaRPr>
           </a:p>
         </p:txBody>
       </p:sp>
@@ -5021,7 +5034,7 @@
   <p:timing>
     <p:tnLst>
       <p:par>
-        <p:cTn xmlns:p14="http://schemas.microsoft.com/office/powerpoint/2010/main" id="1" dur="indefinite" restart="never" nodeType="tmRoot"/>
+        <p:cTn id="1" dur="indefinite" restart="never" nodeType="tmRoot"/>
       </p:par>
     </p:tnLst>
   </p:timing>
@@ -9785,6 +9798,1202 @@
     <p:extLst>
       <p:ext uri="{BB962C8B-B14F-4D97-AF65-F5344CB8AC3E}">
         <p14:creationId xmlns:p14="http://schemas.microsoft.com/office/powerpoint/2010/main" val="1649287303"/>
+      </p:ext>
+    </p:extLst>
+  </p:cSld>
+  <p:clrMapOvr>
+    <a:masterClrMapping/>
+  </p:clrMapOvr>
+</p:sld>
+</file>
+
+<file path=ppt/slides/slide6.xml><?xml version="1.0" encoding="utf-8"?>
+<p:sld xmlns:a="http://schemas.openxmlformats.org/drawingml/2006/main" xmlns:r="http://schemas.openxmlformats.org/officeDocument/2006/relationships" xmlns:p="http://schemas.openxmlformats.org/presentationml/2006/main">
+  <p:cSld>
+    <p:spTree>
+      <p:nvGrpSpPr>
+        <p:cNvPr id="1" name=""/>
+        <p:cNvGrpSpPr/>
+        <p:nvPr/>
+      </p:nvGrpSpPr>
+      <p:grpSpPr>
+        <a:xfrm>
+          <a:off x="0" y="0"/>
+          <a:ext cx="0" cy="0"/>
+          <a:chOff x="0" y="0"/>
+          <a:chExt cx="0" cy="0"/>
+        </a:xfrm>
+      </p:grpSpPr>
+      <p:cxnSp>
+        <p:nvCxnSpPr>
+          <p:cNvPr id="43" name="Straight Connector 42"/>
+          <p:cNvCxnSpPr/>
+          <p:nvPr/>
+        </p:nvCxnSpPr>
+        <p:spPr>
+          <a:xfrm>
+            <a:off x="2719775" y="4608491"/>
+            <a:ext cx="4115737" cy="0"/>
+          </a:xfrm>
+          <a:prstGeom prst="line">
+            <a:avLst/>
+          </a:prstGeom>
+          <a:ln>
+            <a:solidFill>
+              <a:schemeClr val="bg1">
+                <a:lumMod val="75000"/>
+              </a:schemeClr>
+            </a:solidFill>
+            <a:prstDash val="sysDot"/>
+            <a:headEnd type="none" w="med" len="med"/>
+            <a:tailEnd type="none" w="med" len="med"/>
+          </a:ln>
+          <a:effectLst/>
+        </p:spPr>
+        <p:style>
+          <a:lnRef idx="2">
+            <a:schemeClr val="accent1"/>
+          </a:lnRef>
+          <a:fillRef idx="0">
+            <a:schemeClr val="accent1"/>
+          </a:fillRef>
+          <a:effectRef idx="1">
+            <a:schemeClr val="accent1"/>
+          </a:effectRef>
+          <a:fontRef idx="minor">
+            <a:schemeClr val="tx1"/>
+          </a:fontRef>
+        </p:style>
+      </p:cxnSp>
+      <p:cxnSp>
+        <p:nvCxnSpPr>
+          <p:cNvPr id="44" name="Straight Connector 43"/>
+          <p:cNvCxnSpPr/>
+          <p:nvPr/>
+        </p:nvCxnSpPr>
+        <p:spPr>
+          <a:xfrm>
+            <a:off x="2719775" y="4831973"/>
+            <a:ext cx="4115737" cy="0"/>
+          </a:xfrm>
+          <a:prstGeom prst="line">
+            <a:avLst/>
+          </a:prstGeom>
+          <a:ln>
+            <a:solidFill>
+              <a:schemeClr val="bg1">
+                <a:lumMod val="75000"/>
+              </a:schemeClr>
+            </a:solidFill>
+            <a:prstDash val="sysDot"/>
+            <a:headEnd type="none" w="med" len="med"/>
+            <a:tailEnd type="none" w="med" len="med"/>
+          </a:ln>
+          <a:effectLst/>
+        </p:spPr>
+        <p:style>
+          <a:lnRef idx="2">
+            <a:schemeClr val="accent1"/>
+          </a:lnRef>
+          <a:fillRef idx="0">
+            <a:schemeClr val="accent1"/>
+          </a:fillRef>
+          <a:effectRef idx="1">
+            <a:schemeClr val="accent1"/>
+          </a:effectRef>
+          <a:fontRef idx="minor">
+            <a:schemeClr val="tx1"/>
+          </a:fontRef>
+        </p:style>
+      </p:cxnSp>
+      <p:cxnSp>
+        <p:nvCxnSpPr>
+          <p:cNvPr id="45" name="Straight Connector 44"/>
+          <p:cNvCxnSpPr/>
+          <p:nvPr/>
+        </p:nvCxnSpPr>
+        <p:spPr>
+          <a:xfrm>
+            <a:off x="2719775" y="5050547"/>
+            <a:ext cx="4115737" cy="0"/>
+          </a:xfrm>
+          <a:prstGeom prst="line">
+            <a:avLst/>
+          </a:prstGeom>
+          <a:ln>
+            <a:solidFill>
+              <a:schemeClr val="bg1">
+                <a:lumMod val="75000"/>
+              </a:schemeClr>
+            </a:solidFill>
+            <a:prstDash val="sysDot"/>
+            <a:headEnd type="none" w="med" len="med"/>
+            <a:tailEnd type="none" w="med" len="med"/>
+          </a:ln>
+          <a:effectLst/>
+        </p:spPr>
+        <p:style>
+          <a:lnRef idx="2">
+            <a:schemeClr val="accent1"/>
+          </a:lnRef>
+          <a:fillRef idx="0">
+            <a:schemeClr val="accent1"/>
+          </a:fillRef>
+          <a:effectRef idx="1">
+            <a:schemeClr val="accent1"/>
+          </a:effectRef>
+          <a:fontRef idx="minor">
+            <a:schemeClr val="tx1"/>
+          </a:fontRef>
+        </p:style>
+      </p:cxnSp>
+      <p:cxnSp>
+        <p:nvCxnSpPr>
+          <p:cNvPr id="46" name="Straight Connector 45"/>
+          <p:cNvCxnSpPr/>
+          <p:nvPr/>
+        </p:nvCxnSpPr>
+        <p:spPr>
+          <a:xfrm>
+            <a:off x="2719775" y="5268326"/>
+            <a:ext cx="4115737" cy="0"/>
+          </a:xfrm>
+          <a:prstGeom prst="line">
+            <a:avLst/>
+          </a:prstGeom>
+          <a:ln>
+            <a:solidFill>
+              <a:schemeClr val="bg1">
+                <a:lumMod val="75000"/>
+              </a:schemeClr>
+            </a:solidFill>
+            <a:prstDash val="sysDot"/>
+            <a:headEnd type="none" w="med" len="med"/>
+            <a:tailEnd type="none" w="med" len="med"/>
+          </a:ln>
+          <a:effectLst/>
+        </p:spPr>
+        <p:style>
+          <a:lnRef idx="2">
+            <a:schemeClr val="accent1"/>
+          </a:lnRef>
+          <a:fillRef idx="0">
+            <a:schemeClr val="accent1"/>
+          </a:fillRef>
+          <a:effectRef idx="1">
+            <a:schemeClr val="accent1"/>
+          </a:effectRef>
+          <a:fontRef idx="minor">
+            <a:schemeClr val="tx1"/>
+          </a:fontRef>
+        </p:style>
+      </p:cxnSp>
+      <p:cxnSp>
+        <p:nvCxnSpPr>
+          <p:cNvPr id="39" name="Straight Connector 38"/>
+          <p:cNvCxnSpPr/>
+          <p:nvPr/>
+        </p:nvCxnSpPr>
+        <p:spPr>
+          <a:xfrm>
+            <a:off x="2719775" y="3516232"/>
+            <a:ext cx="4115737" cy="0"/>
+          </a:xfrm>
+          <a:prstGeom prst="line">
+            <a:avLst/>
+          </a:prstGeom>
+          <a:ln>
+            <a:solidFill>
+              <a:schemeClr val="bg1">
+                <a:lumMod val="75000"/>
+              </a:schemeClr>
+            </a:solidFill>
+            <a:prstDash val="sysDot"/>
+            <a:headEnd type="none" w="med" len="med"/>
+            <a:tailEnd type="none" w="med" len="med"/>
+          </a:ln>
+          <a:effectLst/>
+        </p:spPr>
+        <p:style>
+          <a:lnRef idx="2">
+            <a:schemeClr val="accent1"/>
+          </a:lnRef>
+          <a:fillRef idx="0">
+            <a:schemeClr val="accent1"/>
+          </a:fillRef>
+          <a:effectRef idx="1">
+            <a:schemeClr val="accent1"/>
+          </a:effectRef>
+          <a:fontRef idx="minor">
+            <a:schemeClr val="tx1"/>
+          </a:fontRef>
+        </p:style>
+      </p:cxnSp>
+      <p:cxnSp>
+        <p:nvCxnSpPr>
+          <p:cNvPr id="40" name="Straight Connector 39"/>
+          <p:cNvCxnSpPr/>
+          <p:nvPr/>
+        </p:nvCxnSpPr>
+        <p:spPr>
+          <a:xfrm>
+            <a:off x="2719775" y="3739714"/>
+            <a:ext cx="4115737" cy="0"/>
+          </a:xfrm>
+          <a:prstGeom prst="line">
+            <a:avLst/>
+          </a:prstGeom>
+          <a:ln>
+            <a:solidFill>
+              <a:schemeClr val="bg1">
+                <a:lumMod val="75000"/>
+              </a:schemeClr>
+            </a:solidFill>
+            <a:prstDash val="sysDot"/>
+            <a:headEnd type="none" w="med" len="med"/>
+            <a:tailEnd type="none" w="med" len="med"/>
+          </a:ln>
+          <a:effectLst/>
+        </p:spPr>
+        <p:style>
+          <a:lnRef idx="2">
+            <a:schemeClr val="accent1"/>
+          </a:lnRef>
+          <a:fillRef idx="0">
+            <a:schemeClr val="accent1"/>
+          </a:fillRef>
+          <a:effectRef idx="1">
+            <a:schemeClr val="accent1"/>
+          </a:effectRef>
+          <a:fontRef idx="minor">
+            <a:schemeClr val="tx1"/>
+          </a:fontRef>
+        </p:style>
+      </p:cxnSp>
+      <p:cxnSp>
+        <p:nvCxnSpPr>
+          <p:cNvPr id="41" name="Straight Connector 40"/>
+          <p:cNvCxnSpPr/>
+          <p:nvPr/>
+        </p:nvCxnSpPr>
+        <p:spPr>
+          <a:xfrm>
+            <a:off x="2719775" y="3958288"/>
+            <a:ext cx="4115737" cy="0"/>
+          </a:xfrm>
+          <a:prstGeom prst="line">
+            <a:avLst/>
+          </a:prstGeom>
+          <a:ln>
+            <a:solidFill>
+              <a:schemeClr val="bg1">
+                <a:lumMod val="75000"/>
+              </a:schemeClr>
+            </a:solidFill>
+            <a:prstDash val="sysDot"/>
+            <a:headEnd type="none" w="med" len="med"/>
+            <a:tailEnd type="none" w="med" len="med"/>
+          </a:ln>
+          <a:effectLst/>
+        </p:spPr>
+        <p:style>
+          <a:lnRef idx="2">
+            <a:schemeClr val="accent1"/>
+          </a:lnRef>
+          <a:fillRef idx="0">
+            <a:schemeClr val="accent1"/>
+          </a:fillRef>
+          <a:effectRef idx="1">
+            <a:schemeClr val="accent1"/>
+          </a:effectRef>
+          <a:fontRef idx="minor">
+            <a:schemeClr val="tx1"/>
+          </a:fontRef>
+        </p:style>
+      </p:cxnSp>
+      <p:cxnSp>
+        <p:nvCxnSpPr>
+          <p:cNvPr id="42" name="Straight Connector 41"/>
+          <p:cNvCxnSpPr/>
+          <p:nvPr/>
+        </p:nvCxnSpPr>
+        <p:spPr>
+          <a:xfrm>
+            <a:off x="2719775" y="4176067"/>
+            <a:ext cx="4115737" cy="0"/>
+          </a:xfrm>
+          <a:prstGeom prst="line">
+            <a:avLst/>
+          </a:prstGeom>
+          <a:ln>
+            <a:solidFill>
+              <a:schemeClr val="bg1">
+                <a:lumMod val="75000"/>
+              </a:schemeClr>
+            </a:solidFill>
+            <a:prstDash val="sysDot"/>
+            <a:headEnd type="none" w="med" len="med"/>
+            <a:tailEnd type="none" w="med" len="med"/>
+          </a:ln>
+          <a:effectLst/>
+        </p:spPr>
+        <p:style>
+          <a:lnRef idx="2">
+            <a:schemeClr val="accent1"/>
+          </a:lnRef>
+          <a:fillRef idx="0">
+            <a:schemeClr val="accent1"/>
+          </a:fillRef>
+          <a:effectRef idx="1">
+            <a:schemeClr val="accent1"/>
+          </a:effectRef>
+          <a:fontRef idx="minor">
+            <a:schemeClr val="tx1"/>
+          </a:fontRef>
+        </p:style>
+      </p:cxnSp>
+      <p:cxnSp>
+        <p:nvCxnSpPr>
+          <p:cNvPr id="10" name="Straight Connector 9"/>
+          <p:cNvCxnSpPr/>
+          <p:nvPr/>
+        </p:nvCxnSpPr>
+        <p:spPr>
+          <a:xfrm>
+            <a:off x="2869675" y="3736177"/>
+            <a:ext cx="1612900" cy="0"/>
+          </a:xfrm>
+          <a:prstGeom prst="line">
+            <a:avLst/>
+          </a:prstGeom>
+          <a:ln w="57150">
+            <a:solidFill>
+              <a:srgbClr val="FF0000"/>
+            </a:solidFill>
+            <a:headEnd type="none" w="med" len="med"/>
+            <a:tailEnd type="none" w="med" len="med"/>
+          </a:ln>
+          <a:effectLst/>
+        </p:spPr>
+        <p:style>
+          <a:lnRef idx="2">
+            <a:schemeClr val="accent1"/>
+          </a:lnRef>
+          <a:fillRef idx="0">
+            <a:schemeClr val="accent1"/>
+          </a:fillRef>
+          <a:effectRef idx="1">
+            <a:schemeClr val="accent1"/>
+          </a:effectRef>
+          <a:fontRef idx="minor">
+            <a:schemeClr val="tx1"/>
+          </a:fontRef>
+        </p:style>
+      </p:cxnSp>
+      <p:cxnSp>
+        <p:nvCxnSpPr>
+          <p:cNvPr id="12" name="Straight Connector 11"/>
+          <p:cNvCxnSpPr/>
+          <p:nvPr/>
+        </p:nvCxnSpPr>
+        <p:spPr>
+          <a:xfrm>
+            <a:off x="4895325" y="3956122"/>
+            <a:ext cx="1612900" cy="0"/>
+          </a:xfrm>
+          <a:prstGeom prst="line">
+            <a:avLst/>
+          </a:prstGeom>
+          <a:ln w="57150">
+            <a:solidFill>
+              <a:schemeClr val="accent5"/>
+            </a:solidFill>
+            <a:headEnd type="none" w="med" len="med"/>
+            <a:tailEnd type="none" w="med" len="med"/>
+          </a:ln>
+          <a:effectLst/>
+        </p:spPr>
+        <p:style>
+          <a:lnRef idx="2">
+            <a:schemeClr val="accent1"/>
+          </a:lnRef>
+          <a:fillRef idx="0">
+            <a:schemeClr val="accent1"/>
+          </a:fillRef>
+          <a:effectRef idx="1">
+            <a:schemeClr val="accent1"/>
+          </a:effectRef>
+          <a:fontRef idx="minor">
+            <a:schemeClr val="tx1"/>
+          </a:fontRef>
+        </p:style>
+      </p:cxnSp>
+      <p:cxnSp>
+        <p:nvCxnSpPr>
+          <p:cNvPr id="13" name="Straight Connector 12"/>
+          <p:cNvCxnSpPr/>
+          <p:nvPr/>
+        </p:nvCxnSpPr>
+        <p:spPr>
+          <a:xfrm>
+            <a:off x="4482575" y="4176067"/>
+            <a:ext cx="2025650" cy="0"/>
+          </a:xfrm>
+          <a:prstGeom prst="line">
+            <a:avLst/>
+          </a:prstGeom>
+          <a:ln w="57150">
+            <a:solidFill>
+              <a:schemeClr val="accent6"/>
+            </a:solidFill>
+            <a:headEnd type="none" w="med" len="med"/>
+            <a:tailEnd type="none" w="med" len="med"/>
+          </a:ln>
+          <a:effectLst/>
+        </p:spPr>
+        <p:style>
+          <a:lnRef idx="2">
+            <a:schemeClr val="accent1"/>
+          </a:lnRef>
+          <a:fillRef idx="0">
+            <a:schemeClr val="accent1"/>
+          </a:fillRef>
+          <a:effectRef idx="1">
+            <a:schemeClr val="accent1"/>
+          </a:effectRef>
+          <a:fontRef idx="minor">
+            <a:schemeClr val="tx1"/>
+          </a:fontRef>
+        </p:style>
+      </p:cxnSp>
+      <p:cxnSp>
+        <p:nvCxnSpPr>
+          <p:cNvPr id="15" name="Straight Connector 14"/>
+          <p:cNvCxnSpPr/>
+          <p:nvPr/>
+        </p:nvCxnSpPr>
+        <p:spPr>
+          <a:xfrm>
+            <a:off x="2869675" y="4828439"/>
+            <a:ext cx="1612900" cy="0"/>
+          </a:xfrm>
+          <a:prstGeom prst="line">
+            <a:avLst/>
+          </a:prstGeom>
+          <a:ln w="57150">
+            <a:solidFill>
+              <a:srgbClr val="FF0000"/>
+            </a:solidFill>
+            <a:headEnd type="none" w="med" len="med"/>
+            <a:tailEnd type="none" w="med" len="med"/>
+          </a:ln>
+          <a:effectLst/>
+        </p:spPr>
+        <p:style>
+          <a:lnRef idx="2">
+            <a:schemeClr val="accent1"/>
+          </a:lnRef>
+          <a:fillRef idx="0">
+            <a:schemeClr val="accent1"/>
+          </a:fillRef>
+          <a:effectRef idx="1">
+            <a:schemeClr val="accent1"/>
+          </a:effectRef>
+          <a:fontRef idx="minor">
+            <a:schemeClr val="tx1"/>
+          </a:fontRef>
+        </p:style>
+      </p:cxnSp>
+      <p:cxnSp>
+        <p:nvCxnSpPr>
+          <p:cNvPr id="16" name="Straight Connector 15"/>
+          <p:cNvCxnSpPr/>
+          <p:nvPr/>
+        </p:nvCxnSpPr>
+        <p:spPr>
+          <a:xfrm>
+            <a:off x="3872975" y="5048384"/>
+            <a:ext cx="1612900" cy="0"/>
+          </a:xfrm>
+          <a:prstGeom prst="line">
+            <a:avLst/>
+          </a:prstGeom>
+          <a:ln w="57150">
+            <a:solidFill>
+              <a:schemeClr val="accent5"/>
+            </a:solidFill>
+            <a:headEnd type="none" w="med" len="med"/>
+            <a:tailEnd type="none" w="med" len="med"/>
+          </a:ln>
+          <a:effectLst/>
+        </p:spPr>
+        <p:style>
+          <a:lnRef idx="2">
+            <a:schemeClr val="accent1"/>
+          </a:lnRef>
+          <a:fillRef idx="0">
+            <a:schemeClr val="accent1"/>
+          </a:fillRef>
+          <a:effectRef idx="1">
+            <a:schemeClr val="accent1"/>
+          </a:effectRef>
+          <a:fontRef idx="minor">
+            <a:schemeClr val="tx1"/>
+          </a:fontRef>
+        </p:style>
+      </p:cxnSp>
+      <p:cxnSp>
+        <p:nvCxnSpPr>
+          <p:cNvPr id="17" name="Straight Connector 16"/>
+          <p:cNvCxnSpPr/>
+          <p:nvPr/>
+        </p:nvCxnSpPr>
+        <p:spPr>
+          <a:xfrm>
+            <a:off x="3882500" y="5268326"/>
+            <a:ext cx="2441575" cy="0"/>
+          </a:xfrm>
+          <a:prstGeom prst="line">
+            <a:avLst/>
+          </a:prstGeom>
+          <a:ln w="57150">
+            <a:solidFill>
+              <a:schemeClr val="accent6"/>
+            </a:solidFill>
+            <a:headEnd type="none" w="med" len="med"/>
+            <a:tailEnd type="none" w="med" len="med"/>
+          </a:ln>
+          <a:effectLst/>
+        </p:spPr>
+        <p:style>
+          <a:lnRef idx="2">
+            <a:schemeClr val="accent1"/>
+          </a:lnRef>
+          <a:fillRef idx="0">
+            <a:schemeClr val="accent1"/>
+          </a:fillRef>
+          <a:effectRef idx="1">
+            <a:schemeClr val="accent1"/>
+          </a:effectRef>
+          <a:fontRef idx="minor">
+            <a:schemeClr val="tx1"/>
+          </a:fontRef>
+        </p:style>
+      </p:cxnSp>
+      <p:sp>
+        <p:nvSpPr>
+          <p:cNvPr id="19" name="TextBox 18"/>
+          <p:cNvSpPr txBox="1"/>
+          <p:nvPr/>
+        </p:nvSpPr>
+        <p:spPr>
+          <a:xfrm>
+            <a:off x="1558298" y="3331566"/>
+            <a:ext cx="1186543" cy="369332"/>
+          </a:xfrm>
+          <a:prstGeom prst="rect">
+            <a:avLst/>
+          </a:prstGeom>
+          <a:noFill/>
+        </p:spPr>
+        <p:txBody>
+          <a:bodyPr wrap="none" rtlCol="0">
+            <a:spAutoFit/>
+          </a:bodyPr>
+          <a:lstStyle/>
+          <a:p>
+            <a:r>
+              <a:rPr lang="en-US" dirty="0" smtClean="0">
+                <a:solidFill>
+                  <a:schemeClr val="bg1">
+                    <a:lumMod val="50000"/>
+                  </a:schemeClr>
+                </a:solidFill>
+                <a:latin typeface="Gill Sans"/>
+                <a:cs typeface="Gill Sans"/>
+              </a:rPr>
+              <a:t>complaints</a:t>
+            </a:r>
+            <a:endParaRPr lang="en-US" dirty="0" smtClean="0">
+              <a:solidFill>
+                <a:schemeClr val="bg1">
+                  <a:lumMod val="50000"/>
+                </a:schemeClr>
+              </a:solidFill>
+              <a:latin typeface="Gill Sans"/>
+              <a:cs typeface="Gill Sans"/>
+            </a:endParaRPr>
+          </a:p>
+        </p:txBody>
+      </p:sp>
+      <p:sp>
+        <p:nvSpPr>
+          <p:cNvPr id="20" name="TextBox 19"/>
+          <p:cNvSpPr txBox="1"/>
+          <p:nvPr/>
+        </p:nvSpPr>
+        <p:spPr>
+          <a:xfrm>
+            <a:off x="2117938" y="3551511"/>
+            <a:ext cx="626903" cy="369332"/>
+          </a:xfrm>
+          <a:prstGeom prst="rect">
+            <a:avLst/>
+          </a:prstGeom>
+          <a:noFill/>
+        </p:spPr>
+        <p:txBody>
+          <a:bodyPr wrap="none" rtlCol="0">
+            <a:spAutoFit/>
+          </a:bodyPr>
+          <a:lstStyle/>
+          <a:p>
+            <a:r>
+              <a:rPr lang="en-US" dirty="0" smtClean="0">
+                <a:solidFill>
+                  <a:srgbClr val="FF0000"/>
+                </a:solidFill>
+                <a:latin typeface="Gill Sans"/>
+                <a:cs typeface="Gill Sans"/>
+              </a:rPr>
+              <a:t>dirty</a:t>
+            </a:r>
+            <a:endParaRPr lang="en-US" dirty="0" smtClean="0">
+              <a:solidFill>
+                <a:srgbClr val="FF0000"/>
+              </a:solidFill>
+              <a:latin typeface="Gill Sans"/>
+              <a:cs typeface="Gill Sans"/>
+            </a:endParaRPr>
+          </a:p>
+        </p:txBody>
+      </p:sp>
+      <p:sp>
+        <p:nvSpPr>
+          <p:cNvPr id="21" name="TextBox 20"/>
+          <p:cNvSpPr txBox="1"/>
+          <p:nvPr/>
+        </p:nvSpPr>
+        <p:spPr>
+          <a:xfrm>
+            <a:off x="2084083" y="3771456"/>
+            <a:ext cx="660758" cy="369332"/>
+          </a:xfrm>
+          <a:prstGeom prst="rect">
+            <a:avLst/>
+          </a:prstGeom>
+          <a:noFill/>
+        </p:spPr>
+        <p:txBody>
+          <a:bodyPr wrap="none" rtlCol="0">
+            <a:spAutoFit/>
+          </a:bodyPr>
+          <a:lstStyle/>
+          <a:p>
+            <a:r>
+              <a:rPr lang="en-US" dirty="0" smtClean="0">
+                <a:solidFill>
+                  <a:schemeClr val="accent5"/>
+                </a:solidFill>
+                <a:latin typeface="Gill Sans"/>
+                <a:cs typeface="Gill Sans"/>
+              </a:rPr>
+              <a:t>truth</a:t>
+            </a:r>
+            <a:endParaRPr lang="en-US" dirty="0" smtClean="0">
+              <a:solidFill>
+                <a:schemeClr val="accent5"/>
+              </a:solidFill>
+              <a:latin typeface="Gill Sans"/>
+              <a:cs typeface="Gill Sans"/>
+            </a:endParaRPr>
+          </a:p>
+        </p:txBody>
+      </p:sp>
+      <p:grpSp>
+        <p:nvGrpSpPr>
+          <p:cNvPr id="32" name="Group 31"/>
+          <p:cNvGrpSpPr/>
+          <p:nvPr/>
+        </p:nvGrpSpPr>
+        <p:grpSpPr>
+          <a:xfrm>
+            <a:off x="2869675" y="3516232"/>
+            <a:ext cx="3638550" cy="0"/>
+            <a:chOff x="2000250" y="3516235"/>
+            <a:chExt cx="3638550" cy="0"/>
+          </a:xfrm>
+        </p:grpSpPr>
+        <p:cxnSp>
+          <p:nvCxnSpPr>
+            <p:cNvPr id="25" name="Straight Connector 24"/>
+            <p:cNvCxnSpPr/>
+            <p:nvPr/>
+          </p:nvCxnSpPr>
+          <p:spPr>
+            <a:xfrm>
+              <a:off x="2000250" y="3516235"/>
+              <a:ext cx="1612900" cy="0"/>
+            </a:xfrm>
+            <a:prstGeom prst="line">
+              <a:avLst/>
+            </a:prstGeom>
+            <a:ln w="57150">
+              <a:solidFill>
+                <a:schemeClr val="bg1">
+                  <a:lumMod val="50000"/>
+                </a:schemeClr>
+              </a:solidFill>
+              <a:headEnd type="none" w="med" len="med"/>
+              <a:tailEnd type="none" w="med" len="med"/>
+            </a:ln>
+            <a:effectLst/>
+          </p:spPr>
+          <p:style>
+            <a:lnRef idx="2">
+              <a:schemeClr val="accent1"/>
+            </a:lnRef>
+            <a:fillRef idx="0">
+              <a:schemeClr val="accent1"/>
+            </a:fillRef>
+            <a:effectRef idx="1">
+              <a:schemeClr val="accent1"/>
+            </a:effectRef>
+            <a:fontRef idx="minor">
+              <a:schemeClr val="tx1"/>
+            </a:fontRef>
+          </p:style>
+        </p:cxnSp>
+        <p:cxnSp>
+          <p:nvCxnSpPr>
+            <p:cNvPr id="26" name="Straight Connector 25"/>
+            <p:cNvCxnSpPr/>
+            <p:nvPr/>
+          </p:nvCxnSpPr>
+          <p:spPr>
+            <a:xfrm>
+              <a:off x="4025900" y="3516235"/>
+              <a:ext cx="1612900" cy="0"/>
+            </a:xfrm>
+            <a:prstGeom prst="line">
+              <a:avLst/>
+            </a:prstGeom>
+            <a:ln w="57150">
+              <a:solidFill>
+                <a:schemeClr val="bg1">
+                  <a:lumMod val="50000"/>
+                </a:schemeClr>
+              </a:solidFill>
+              <a:headEnd type="none" w="med" len="med"/>
+              <a:tailEnd type="none" w="med" len="med"/>
+            </a:ln>
+            <a:effectLst/>
+          </p:spPr>
+          <p:style>
+            <a:lnRef idx="2">
+              <a:schemeClr val="accent1"/>
+            </a:lnRef>
+            <a:fillRef idx="0">
+              <a:schemeClr val="accent1"/>
+            </a:fillRef>
+            <a:effectRef idx="1">
+              <a:schemeClr val="accent1"/>
+            </a:effectRef>
+            <a:fontRef idx="minor">
+              <a:schemeClr val="tx1"/>
+            </a:fontRef>
+          </p:style>
+        </p:cxnSp>
+      </p:grpSp>
+      <p:grpSp>
+        <p:nvGrpSpPr>
+          <p:cNvPr id="31" name="Group 30"/>
+          <p:cNvGrpSpPr/>
+          <p:nvPr/>
+        </p:nvGrpSpPr>
+        <p:grpSpPr>
+          <a:xfrm>
+            <a:off x="2869675" y="4608491"/>
+            <a:ext cx="2616200" cy="3"/>
+            <a:chOff x="2000250" y="4762914"/>
+            <a:chExt cx="2616200" cy="3"/>
+          </a:xfrm>
+        </p:grpSpPr>
+        <p:cxnSp>
+          <p:nvCxnSpPr>
+            <p:cNvPr id="27" name="Straight Connector 26"/>
+            <p:cNvCxnSpPr/>
+            <p:nvPr/>
+          </p:nvCxnSpPr>
+          <p:spPr>
+            <a:xfrm>
+              <a:off x="2000250" y="4762917"/>
+              <a:ext cx="1003300" cy="0"/>
+            </a:xfrm>
+            <a:prstGeom prst="line">
+              <a:avLst/>
+            </a:prstGeom>
+            <a:ln w="57150">
+              <a:solidFill>
+                <a:schemeClr val="bg1">
+                  <a:lumMod val="50000"/>
+                </a:schemeClr>
+              </a:solidFill>
+              <a:headEnd type="none" w="med" len="med"/>
+              <a:tailEnd type="none" w="med" len="med"/>
+            </a:ln>
+            <a:effectLst/>
+          </p:spPr>
+          <p:style>
+            <a:lnRef idx="2">
+              <a:schemeClr val="accent1"/>
+            </a:lnRef>
+            <a:fillRef idx="0">
+              <a:schemeClr val="accent1"/>
+            </a:fillRef>
+            <a:effectRef idx="1">
+              <a:schemeClr val="accent1"/>
+            </a:effectRef>
+            <a:fontRef idx="minor">
+              <a:schemeClr val="tx1"/>
+            </a:fontRef>
+          </p:style>
+        </p:cxnSp>
+        <p:cxnSp>
+          <p:nvCxnSpPr>
+            <p:cNvPr id="28" name="Straight Connector 27"/>
+            <p:cNvCxnSpPr/>
+            <p:nvPr/>
+          </p:nvCxnSpPr>
+          <p:spPr>
+            <a:xfrm>
+              <a:off x="3613150" y="4762914"/>
+              <a:ext cx="1003300" cy="3"/>
+            </a:xfrm>
+            <a:prstGeom prst="line">
+              <a:avLst/>
+            </a:prstGeom>
+            <a:ln w="57150">
+              <a:solidFill>
+                <a:schemeClr val="bg1">
+                  <a:lumMod val="50000"/>
+                </a:schemeClr>
+              </a:solidFill>
+              <a:headEnd type="none" w="med" len="med"/>
+              <a:tailEnd type="none" w="med" len="med"/>
+            </a:ln>
+            <a:effectLst/>
+          </p:spPr>
+          <p:style>
+            <a:lnRef idx="2">
+              <a:schemeClr val="accent1"/>
+            </a:lnRef>
+            <a:fillRef idx="0">
+              <a:schemeClr val="accent1"/>
+            </a:fillRef>
+            <a:effectRef idx="1">
+              <a:schemeClr val="accent1"/>
+            </a:effectRef>
+            <a:fontRef idx="minor">
+              <a:schemeClr val="tx1"/>
+            </a:fontRef>
+          </p:style>
+        </p:cxnSp>
+      </p:grpSp>
+      <p:sp>
+        <p:nvSpPr>
+          <p:cNvPr id="33" name="TextBox 32"/>
+          <p:cNvSpPr txBox="1"/>
+          <p:nvPr/>
+        </p:nvSpPr>
+        <p:spPr>
+          <a:xfrm>
+            <a:off x="2335755" y="3991401"/>
+            <a:ext cx="409086" cy="369332"/>
+          </a:xfrm>
+          <a:prstGeom prst="rect">
+            <a:avLst/>
+          </a:prstGeom>
+          <a:noFill/>
+        </p:spPr>
+        <p:txBody>
+          <a:bodyPr wrap="none" rtlCol="0">
+            <a:spAutoFit/>
+          </a:bodyPr>
+          <a:lstStyle/>
+          <a:p>
+            <a:r>
+              <a:rPr lang="en-US" dirty="0" smtClean="0">
+                <a:solidFill>
+                  <a:schemeClr val="accent6"/>
+                </a:solidFill>
+                <a:latin typeface="Gill Sans"/>
+                <a:cs typeface="Gill Sans"/>
+              </a:rPr>
+              <a:t>fix</a:t>
+            </a:r>
+            <a:endParaRPr lang="en-US" dirty="0" smtClean="0">
+              <a:solidFill>
+                <a:schemeClr val="accent6"/>
+              </a:solidFill>
+              <a:latin typeface="Gill Sans"/>
+              <a:cs typeface="Gill Sans"/>
+            </a:endParaRPr>
+          </a:p>
+        </p:txBody>
+      </p:sp>
+      <p:sp>
+        <p:nvSpPr>
+          <p:cNvPr id="34" name="TextBox 33"/>
+          <p:cNvSpPr txBox="1"/>
+          <p:nvPr/>
+        </p:nvSpPr>
+        <p:spPr>
+          <a:xfrm>
+            <a:off x="1558298" y="4393845"/>
+            <a:ext cx="1186543" cy="369332"/>
+          </a:xfrm>
+          <a:prstGeom prst="rect">
+            <a:avLst/>
+          </a:prstGeom>
+          <a:noFill/>
+        </p:spPr>
+        <p:txBody>
+          <a:bodyPr wrap="none" rtlCol="0">
+            <a:spAutoFit/>
+          </a:bodyPr>
+          <a:lstStyle/>
+          <a:p>
+            <a:r>
+              <a:rPr lang="en-US" dirty="0" smtClean="0">
+                <a:solidFill>
+                  <a:schemeClr val="bg1">
+                    <a:lumMod val="50000"/>
+                  </a:schemeClr>
+                </a:solidFill>
+                <a:latin typeface="Gill Sans"/>
+                <a:cs typeface="Gill Sans"/>
+              </a:rPr>
+              <a:t>complaints</a:t>
+            </a:r>
+            <a:endParaRPr lang="en-US" dirty="0" smtClean="0">
+              <a:solidFill>
+                <a:schemeClr val="bg1">
+                  <a:lumMod val="50000"/>
+                </a:schemeClr>
+              </a:solidFill>
+              <a:latin typeface="Gill Sans"/>
+              <a:cs typeface="Gill Sans"/>
+            </a:endParaRPr>
+          </a:p>
+        </p:txBody>
+      </p:sp>
+      <p:sp>
+        <p:nvSpPr>
+          <p:cNvPr id="35" name="TextBox 34"/>
+          <p:cNvSpPr txBox="1"/>
+          <p:nvPr/>
+        </p:nvSpPr>
+        <p:spPr>
+          <a:xfrm>
+            <a:off x="2117938" y="4613790"/>
+            <a:ext cx="626903" cy="369332"/>
+          </a:xfrm>
+          <a:prstGeom prst="rect">
+            <a:avLst/>
+          </a:prstGeom>
+          <a:noFill/>
+        </p:spPr>
+        <p:txBody>
+          <a:bodyPr wrap="none" rtlCol="0">
+            <a:spAutoFit/>
+          </a:bodyPr>
+          <a:lstStyle/>
+          <a:p>
+            <a:r>
+              <a:rPr lang="en-US" dirty="0" smtClean="0">
+                <a:solidFill>
+                  <a:srgbClr val="FF0000"/>
+                </a:solidFill>
+                <a:latin typeface="Gill Sans"/>
+                <a:cs typeface="Gill Sans"/>
+              </a:rPr>
+              <a:t>dirty</a:t>
+            </a:r>
+            <a:endParaRPr lang="en-US" dirty="0" smtClean="0">
+              <a:solidFill>
+                <a:srgbClr val="FF0000"/>
+              </a:solidFill>
+              <a:latin typeface="Gill Sans"/>
+              <a:cs typeface="Gill Sans"/>
+            </a:endParaRPr>
+          </a:p>
+        </p:txBody>
+      </p:sp>
+      <p:sp>
+        <p:nvSpPr>
+          <p:cNvPr id="36" name="TextBox 35"/>
+          <p:cNvSpPr txBox="1"/>
+          <p:nvPr/>
+        </p:nvSpPr>
+        <p:spPr>
+          <a:xfrm>
+            <a:off x="2084083" y="4833735"/>
+            <a:ext cx="660758" cy="369332"/>
+          </a:xfrm>
+          <a:prstGeom prst="rect">
+            <a:avLst/>
+          </a:prstGeom>
+          <a:noFill/>
+        </p:spPr>
+        <p:txBody>
+          <a:bodyPr wrap="none" rtlCol="0">
+            <a:spAutoFit/>
+          </a:bodyPr>
+          <a:lstStyle/>
+          <a:p>
+            <a:r>
+              <a:rPr lang="en-US" dirty="0" smtClean="0">
+                <a:solidFill>
+                  <a:schemeClr val="accent5"/>
+                </a:solidFill>
+                <a:latin typeface="Gill Sans"/>
+                <a:cs typeface="Gill Sans"/>
+              </a:rPr>
+              <a:t>truth</a:t>
+            </a:r>
+            <a:endParaRPr lang="en-US" dirty="0" smtClean="0">
+              <a:solidFill>
+                <a:schemeClr val="accent5"/>
+              </a:solidFill>
+              <a:latin typeface="Gill Sans"/>
+              <a:cs typeface="Gill Sans"/>
+            </a:endParaRPr>
+          </a:p>
+        </p:txBody>
+      </p:sp>
+      <p:sp>
+        <p:nvSpPr>
+          <p:cNvPr id="37" name="TextBox 36"/>
+          <p:cNvSpPr txBox="1"/>
+          <p:nvPr/>
+        </p:nvSpPr>
+        <p:spPr>
+          <a:xfrm>
+            <a:off x="2335755" y="5053680"/>
+            <a:ext cx="409086" cy="369332"/>
+          </a:xfrm>
+          <a:prstGeom prst="rect">
+            <a:avLst/>
+          </a:prstGeom>
+          <a:noFill/>
+        </p:spPr>
+        <p:txBody>
+          <a:bodyPr wrap="none" rtlCol="0">
+            <a:spAutoFit/>
+          </a:bodyPr>
+          <a:lstStyle/>
+          <a:p>
+            <a:r>
+              <a:rPr lang="en-US" dirty="0" smtClean="0">
+                <a:solidFill>
+                  <a:schemeClr val="accent6"/>
+                </a:solidFill>
+                <a:latin typeface="Gill Sans"/>
+                <a:cs typeface="Gill Sans"/>
+              </a:rPr>
+              <a:t>fix</a:t>
+            </a:r>
+            <a:endParaRPr lang="en-US" dirty="0" smtClean="0">
+              <a:solidFill>
+                <a:schemeClr val="accent6"/>
+              </a:solidFill>
+              <a:latin typeface="Gill Sans"/>
+              <a:cs typeface="Gill Sans"/>
+            </a:endParaRPr>
+          </a:p>
+        </p:txBody>
+      </p:sp>
+      <p:sp>
+        <p:nvSpPr>
+          <p:cNvPr id="48" name="TextBox 47"/>
+          <p:cNvSpPr txBox="1"/>
+          <p:nvPr/>
+        </p:nvSpPr>
+        <p:spPr>
+          <a:xfrm>
+            <a:off x="981290" y="3603014"/>
+            <a:ext cx="516488" cy="461665"/>
+          </a:xfrm>
+          <a:prstGeom prst="rect">
+            <a:avLst/>
+          </a:prstGeom>
+          <a:noFill/>
+        </p:spPr>
+        <p:txBody>
+          <a:bodyPr wrap="none" rtlCol="0">
+            <a:spAutoFit/>
+          </a:bodyPr>
+          <a:lstStyle/>
+          <a:p>
+            <a:r>
+              <a:rPr lang="en-US" sz="2400" dirty="0" smtClean="0">
+                <a:latin typeface="Alegreya" charset="0"/>
+                <a:ea typeface="Alegreya" charset="0"/>
+                <a:cs typeface="Alegreya" charset="0"/>
+              </a:rPr>
+              <a:t>(a)</a:t>
+            </a:r>
+            <a:endParaRPr lang="en-US" sz="2400" dirty="0" smtClean="0">
+              <a:latin typeface="Alegreya" charset="0"/>
+              <a:ea typeface="Alegreya" charset="0"/>
+              <a:cs typeface="Alegreya" charset="0"/>
+            </a:endParaRPr>
+          </a:p>
+        </p:txBody>
+      </p:sp>
+      <p:sp>
+        <p:nvSpPr>
+          <p:cNvPr id="49" name="TextBox 48"/>
+          <p:cNvSpPr txBox="1"/>
+          <p:nvPr/>
+        </p:nvSpPr>
+        <p:spPr>
+          <a:xfrm>
+            <a:off x="966863" y="4669436"/>
+            <a:ext cx="530915" cy="461665"/>
+          </a:xfrm>
+          <a:prstGeom prst="rect">
+            <a:avLst/>
+          </a:prstGeom>
+          <a:noFill/>
+        </p:spPr>
+        <p:txBody>
+          <a:bodyPr wrap="none" rtlCol="0">
+            <a:spAutoFit/>
+          </a:bodyPr>
+          <a:lstStyle/>
+          <a:p>
+            <a:r>
+              <a:rPr lang="en-US" sz="2400" dirty="0" smtClean="0">
+                <a:latin typeface="Alegreya" charset="0"/>
+                <a:ea typeface="Alegreya" charset="0"/>
+                <a:cs typeface="Alegreya" charset="0"/>
+              </a:rPr>
+              <a:t>(b)</a:t>
+            </a:r>
+            <a:endParaRPr lang="en-US" sz="2400" dirty="0" smtClean="0">
+              <a:latin typeface="Alegreya" charset="0"/>
+              <a:ea typeface="Alegreya" charset="0"/>
+              <a:cs typeface="Alegreya" charset="0"/>
+            </a:endParaRPr>
+          </a:p>
+        </p:txBody>
+      </p:sp>
+    </p:spTree>
+    <p:extLst>
+      <p:ext uri="{BB962C8B-B14F-4D97-AF65-F5344CB8AC3E}">
+        <p14:creationId xmlns:p14="http://schemas.microsoft.com/office/powerpoint/2010/main" val="612918260"/>
       </p:ext>
     </p:extLst>
   </p:cSld>

</xml_diff>

<commit_message>
added more comments about nonwhere clauses
</commit_message>
<xml_diff>
--- a/docs/sigmod15/figures/figs.pptx
+++ b/docs/sigmod15/figures/figs.pptx
@@ -10351,7 +10351,7 @@
         <p:spPr>
           <a:xfrm>
             <a:off x="3882500" y="5268326"/>
-            <a:ext cx="2441575" cy="0"/>
+            <a:ext cx="1603375" cy="0"/>
           </a:xfrm>
           <a:prstGeom prst="line">
             <a:avLst/>
@@ -10414,15 +10414,6 @@
               </a:rPr>
               <a:t>complaints</a:t>
             </a:r>
-            <a:endParaRPr lang="en-US" dirty="0" smtClean="0">
-              <a:solidFill>
-                <a:schemeClr val="bg1">
-                  <a:lumMod val="50000"/>
-                </a:schemeClr>
-              </a:solidFill>
-              <a:latin typeface="Gill Sans"/>
-              <a:cs typeface="Gill Sans"/>
-            </a:endParaRPr>
           </a:p>
         </p:txBody>
       </p:sp>
@@ -10458,13 +10449,6 @@
               </a:rPr>
               <a:t>dirty</a:t>
             </a:r>
-            <a:endParaRPr lang="en-US" dirty="0" smtClean="0">
-              <a:solidFill>
-                <a:srgbClr val="FF0000"/>
-              </a:solidFill>
-              <a:latin typeface="Gill Sans"/>
-              <a:cs typeface="Gill Sans"/>
-            </a:endParaRPr>
           </a:p>
         </p:txBody>
       </p:sp>
@@ -10500,13 +10484,6 @@
               </a:rPr>
               <a:t>truth</a:t>
             </a:r>
-            <a:endParaRPr lang="en-US" dirty="0" smtClean="0">
-              <a:solidFill>
-                <a:schemeClr val="accent5"/>
-              </a:solidFill>
-              <a:latin typeface="Gill Sans"/>
-              <a:cs typeface="Gill Sans"/>
-            </a:endParaRPr>
           </a:p>
         </p:txBody>
       </p:sp>
@@ -10732,13 +10709,6 @@
               </a:rPr>
               <a:t>fix</a:t>
             </a:r>
-            <a:endParaRPr lang="en-US" dirty="0" smtClean="0">
-              <a:solidFill>
-                <a:schemeClr val="accent6"/>
-              </a:solidFill>
-              <a:latin typeface="Gill Sans"/>
-              <a:cs typeface="Gill Sans"/>
-            </a:endParaRPr>
           </a:p>
         </p:txBody>
       </p:sp>
@@ -10776,15 +10746,6 @@
               </a:rPr>
               <a:t>complaints</a:t>
             </a:r>
-            <a:endParaRPr lang="en-US" dirty="0" smtClean="0">
-              <a:solidFill>
-                <a:schemeClr val="bg1">
-                  <a:lumMod val="50000"/>
-                </a:schemeClr>
-              </a:solidFill>
-              <a:latin typeface="Gill Sans"/>
-              <a:cs typeface="Gill Sans"/>
-            </a:endParaRPr>
           </a:p>
         </p:txBody>
       </p:sp>
@@ -10820,13 +10781,6 @@
               </a:rPr>
               <a:t>dirty</a:t>
             </a:r>
-            <a:endParaRPr lang="en-US" dirty="0" smtClean="0">
-              <a:solidFill>
-                <a:srgbClr val="FF0000"/>
-              </a:solidFill>
-              <a:latin typeface="Gill Sans"/>
-              <a:cs typeface="Gill Sans"/>
-            </a:endParaRPr>
           </a:p>
         </p:txBody>
       </p:sp>
@@ -10862,13 +10816,6 @@
               </a:rPr>
               <a:t>truth</a:t>
             </a:r>
-            <a:endParaRPr lang="en-US" dirty="0" smtClean="0">
-              <a:solidFill>
-                <a:schemeClr val="accent5"/>
-              </a:solidFill>
-              <a:latin typeface="Gill Sans"/>
-              <a:cs typeface="Gill Sans"/>
-            </a:endParaRPr>
           </a:p>
         </p:txBody>
       </p:sp>
@@ -10904,13 +10851,6 @@
               </a:rPr>
               <a:t>fix</a:t>
             </a:r>
-            <a:endParaRPr lang="en-US" dirty="0" smtClean="0">
-              <a:solidFill>
-                <a:schemeClr val="accent6"/>
-              </a:solidFill>
-              <a:latin typeface="Gill Sans"/>
-              <a:cs typeface="Gill Sans"/>
-            </a:endParaRPr>
           </a:p>
         </p:txBody>
       </p:sp>
@@ -10944,11 +10884,6 @@
               </a:rPr>
               <a:t>(a)</a:t>
             </a:r>
-            <a:endParaRPr lang="en-US" sz="2400" dirty="0" smtClean="0">
-              <a:latin typeface="Alegreya" charset="0"/>
-              <a:ea typeface="Alegreya" charset="0"/>
-              <a:cs typeface="Alegreya" charset="0"/>
-            </a:endParaRPr>
           </a:p>
         </p:txBody>
       </p:sp>
@@ -10982,11 +10917,6 @@
               </a:rPr>
               <a:t>(b)</a:t>
             </a:r>
-            <a:endParaRPr lang="en-US" sz="2400" dirty="0" smtClean="0">
-              <a:latin typeface="Alegreya" charset="0"/>
-              <a:ea typeface="Alegreya" charset="0"/>
-              <a:cs typeface="Alegreya" charset="0"/>
-            </a:endParaRPr>
           </a:p>
         </p:txBody>
       </p:sp>

</xml_diff>

<commit_message>
1st pass on the 2 iteration business
</commit_message>
<xml_diff>
--- a/docs/sigmod15/figures/figs.pptx
+++ b/docs/sigmod15/figures/figs.pptx
@@ -9832,7 +9832,7 @@
         </p:nvCxnSpPr>
         <p:spPr>
           <a:xfrm>
-            <a:off x="2719775" y="4608491"/>
+            <a:off x="2719775" y="2409044"/>
             <a:ext cx="4115737" cy="0"/>
           </a:xfrm>
           <a:prstGeom prst="line">
@@ -9873,7 +9873,7 @@
         </p:nvCxnSpPr>
         <p:spPr>
           <a:xfrm>
-            <a:off x="2719775" y="4831973"/>
+            <a:off x="2719775" y="2632526"/>
             <a:ext cx="4115737" cy="0"/>
           </a:xfrm>
           <a:prstGeom prst="line">
@@ -9914,7 +9914,7 @@
         </p:nvCxnSpPr>
         <p:spPr>
           <a:xfrm>
-            <a:off x="2719775" y="5050547"/>
+            <a:off x="2719775" y="2851100"/>
             <a:ext cx="4115737" cy="0"/>
           </a:xfrm>
           <a:prstGeom prst="line">
@@ -9955,7 +9955,7 @@
         </p:nvCxnSpPr>
         <p:spPr>
           <a:xfrm>
-            <a:off x="2719775" y="5268326"/>
+            <a:off x="2719775" y="3068879"/>
             <a:ext cx="4115737" cy="0"/>
           </a:xfrm>
           <a:prstGeom prst="line">
@@ -10274,7 +10274,7 @@
         </p:nvCxnSpPr>
         <p:spPr>
           <a:xfrm>
-            <a:off x="2869675" y="4828439"/>
+            <a:off x="2869675" y="2628992"/>
             <a:ext cx="1612900" cy="0"/>
           </a:xfrm>
           <a:prstGeom prst="line">
@@ -10312,7 +10312,7 @@
         </p:nvCxnSpPr>
         <p:spPr>
           <a:xfrm>
-            <a:off x="3872975" y="5048384"/>
+            <a:off x="3872975" y="2848937"/>
             <a:ext cx="1612900" cy="0"/>
           </a:xfrm>
           <a:prstGeom prst="line">
@@ -10350,7 +10350,7 @@
         </p:nvCxnSpPr>
         <p:spPr>
           <a:xfrm>
-            <a:off x="3882500" y="5268326"/>
+            <a:off x="3882500" y="3068879"/>
             <a:ext cx="1603375" cy="0"/>
           </a:xfrm>
           <a:prstGeom prst="line">
@@ -10388,8 +10388,8 @@
         </p:nvSpPr>
         <p:spPr>
           <a:xfrm>
-            <a:off x="1558298" y="3331566"/>
-            <a:ext cx="1186543" cy="369332"/>
+            <a:off x="2002330" y="3335411"/>
+            <a:ext cx="742511" cy="369332"/>
           </a:xfrm>
           <a:prstGeom prst="rect">
             <a:avLst/>
@@ -10402,6 +10402,7 @@
           </a:bodyPr>
           <a:lstStyle/>
           <a:p>
+            <a:pPr algn="r"/>
             <a:r>
               <a:rPr lang="en-US" dirty="0" smtClean="0">
                 <a:solidFill>
@@ -10412,8 +10413,17 @@
                 <a:latin typeface="Gill Sans"/>
                 <a:cs typeface="Gill Sans"/>
               </a:rPr>
-              <a:t>complaints</a:t>
-            </a:r>
+              <a:t>tuples</a:t>
+            </a:r>
+            <a:endParaRPr lang="en-US" dirty="0" smtClean="0">
+              <a:solidFill>
+                <a:schemeClr val="bg1">
+                  <a:lumMod val="50000"/>
+                </a:schemeClr>
+              </a:solidFill>
+              <a:latin typeface="Gill Sans"/>
+              <a:cs typeface="Gill Sans"/>
+            </a:endParaRPr>
           </a:p>
         </p:txBody>
       </p:sp>
@@ -10487,196 +10497,6 @@
           </a:p>
         </p:txBody>
       </p:sp>
-      <p:grpSp>
-        <p:nvGrpSpPr>
-          <p:cNvPr id="32" name="Group 31"/>
-          <p:cNvGrpSpPr/>
-          <p:nvPr/>
-        </p:nvGrpSpPr>
-        <p:grpSpPr>
-          <a:xfrm>
-            <a:off x="2869675" y="3516232"/>
-            <a:ext cx="3638550" cy="0"/>
-            <a:chOff x="2000250" y="3516235"/>
-            <a:chExt cx="3638550" cy="0"/>
-          </a:xfrm>
-        </p:grpSpPr>
-        <p:cxnSp>
-          <p:nvCxnSpPr>
-            <p:cNvPr id="25" name="Straight Connector 24"/>
-            <p:cNvCxnSpPr/>
-            <p:nvPr/>
-          </p:nvCxnSpPr>
-          <p:spPr>
-            <a:xfrm>
-              <a:off x="2000250" y="3516235"/>
-              <a:ext cx="1612900" cy="0"/>
-            </a:xfrm>
-            <a:prstGeom prst="line">
-              <a:avLst/>
-            </a:prstGeom>
-            <a:ln w="57150">
-              <a:solidFill>
-                <a:schemeClr val="bg1">
-                  <a:lumMod val="50000"/>
-                </a:schemeClr>
-              </a:solidFill>
-              <a:headEnd type="none" w="med" len="med"/>
-              <a:tailEnd type="none" w="med" len="med"/>
-            </a:ln>
-            <a:effectLst/>
-          </p:spPr>
-          <p:style>
-            <a:lnRef idx="2">
-              <a:schemeClr val="accent1"/>
-            </a:lnRef>
-            <a:fillRef idx="0">
-              <a:schemeClr val="accent1"/>
-            </a:fillRef>
-            <a:effectRef idx="1">
-              <a:schemeClr val="accent1"/>
-            </a:effectRef>
-            <a:fontRef idx="minor">
-              <a:schemeClr val="tx1"/>
-            </a:fontRef>
-          </p:style>
-        </p:cxnSp>
-        <p:cxnSp>
-          <p:nvCxnSpPr>
-            <p:cNvPr id="26" name="Straight Connector 25"/>
-            <p:cNvCxnSpPr/>
-            <p:nvPr/>
-          </p:nvCxnSpPr>
-          <p:spPr>
-            <a:xfrm>
-              <a:off x="4025900" y="3516235"/>
-              <a:ext cx="1612900" cy="0"/>
-            </a:xfrm>
-            <a:prstGeom prst="line">
-              <a:avLst/>
-            </a:prstGeom>
-            <a:ln w="57150">
-              <a:solidFill>
-                <a:schemeClr val="bg1">
-                  <a:lumMod val="50000"/>
-                </a:schemeClr>
-              </a:solidFill>
-              <a:headEnd type="none" w="med" len="med"/>
-              <a:tailEnd type="none" w="med" len="med"/>
-            </a:ln>
-            <a:effectLst/>
-          </p:spPr>
-          <p:style>
-            <a:lnRef idx="2">
-              <a:schemeClr val="accent1"/>
-            </a:lnRef>
-            <a:fillRef idx="0">
-              <a:schemeClr val="accent1"/>
-            </a:fillRef>
-            <a:effectRef idx="1">
-              <a:schemeClr val="accent1"/>
-            </a:effectRef>
-            <a:fontRef idx="minor">
-              <a:schemeClr val="tx1"/>
-            </a:fontRef>
-          </p:style>
-        </p:cxnSp>
-      </p:grpSp>
-      <p:grpSp>
-        <p:nvGrpSpPr>
-          <p:cNvPr id="31" name="Group 30"/>
-          <p:cNvGrpSpPr/>
-          <p:nvPr/>
-        </p:nvGrpSpPr>
-        <p:grpSpPr>
-          <a:xfrm>
-            <a:off x="2869675" y="4608491"/>
-            <a:ext cx="2616200" cy="3"/>
-            <a:chOff x="2000250" y="4762914"/>
-            <a:chExt cx="2616200" cy="3"/>
-          </a:xfrm>
-        </p:grpSpPr>
-        <p:cxnSp>
-          <p:nvCxnSpPr>
-            <p:cNvPr id="27" name="Straight Connector 26"/>
-            <p:cNvCxnSpPr/>
-            <p:nvPr/>
-          </p:nvCxnSpPr>
-          <p:spPr>
-            <a:xfrm>
-              <a:off x="2000250" y="4762917"/>
-              <a:ext cx="1003300" cy="0"/>
-            </a:xfrm>
-            <a:prstGeom prst="line">
-              <a:avLst/>
-            </a:prstGeom>
-            <a:ln w="57150">
-              <a:solidFill>
-                <a:schemeClr val="bg1">
-                  <a:lumMod val="50000"/>
-                </a:schemeClr>
-              </a:solidFill>
-              <a:headEnd type="none" w="med" len="med"/>
-              <a:tailEnd type="none" w="med" len="med"/>
-            </a:ln>
-            <a:effectLst/>
-          </p:spPr>
-          <p:style>
-            <a:lnRef idx="2">
-              <a:schemeClr val="accent1"/>
-            </a:lnRef>
-            <a:fillRef idx="0">
-              <a:schemeClr val="accent1"/>
-            </a:fillRef>
-            <a:effectRef idx="1">
-              <a:schemeClr val="accent1"/>
-            </a:effectRef>
-            <a:fontRef idx="minor">
-              <a:schemeClr val="tx1"/>
-            </a:fontRef>
-          </p:style>
-        </p:cxnSp>
-        <p:cxnSp>
-          <p:nvCxnSpPr>
-            <p:cNvPr id="28" name="Straight Connector 27"/>
-            <p:cNvCxnSpPr/>
-            <p:nvPr/>
-          </p:nvCxnSpPr>
-          <p:spPr>
-            <a:xfrm>
-              <a:off x="3613150" y="4762914"/>
-              <a:ext cx="1003300" cy="3"/>
-            </a:xfrm>
-            <a:prstGeom prst="line">
-              <a:avLst/>
-            </a:prstGeom>
-            <a:ln w="57150">
-              <a:solidFill>
-                <a:schemeClr val="bg1">
-                  <a:lumMod val="50000"/>
-                </a:schemeClr>
-              </a:solidFill>
-              <a:headEnd type="none" w="med" len="med"/>
-              <a:tailEnd type="none" w="med" len="med"/>
-            </a:ln>
-            <a:effectLst/>
-          </p:spPr>
-          <p:style>
-            <a:lnRef idx="2">
-              <a:schemeClr val="accent1"/>
-            </a:lnRef>
-            <a:fillRef idx="0">
-              <a:schemeClr val="accent1"/>
-            </a:fillRef>
-            <a:effectRef idx="1">
-              <a:schemeClr val="accent1"/>
-            </a:effectRef>
-            <a:fontRef idx="minor">
-              <a:schemeClr val="tx1"/>
-            </a:fontRef>
-          </p:style>
-        </p:cxnSp>
-      </p:grpSp>
       <p:sp>
         <p:nvSpPr>
           <p:cNvPr id="33" name="TextBox 32"/>
@@ -10720,8 +10540,8 @@
         </p:nvSpPr>
         <p:spPr>
           <a:xfrm>
-            <a:off x="1558298" y="4393845"/>
-            <a:ext cx="1186543" cy="369332"/>
+            <a:off x="2002330" y="2194994"/>
+            <a:ext cx="742511" cy="369332"/>
           </a:xfrm>
           <a:prstGeom prst="rect">
             <a:avLst/>
@@ -10734,6 +10554,7 @@
           </a:bodyPr>
           <a:lstStyle/>
           <a:p>
+            <a:pPr algn="r"/>
             <a:r>
               <a:rPr lang="en-US" dirty="0" smtClean="0">
                 <a:solidFill>
@@ -10744,8 +10565,17 @@
                 <a:latin typeface="Gill Sans"/>
                 <a:cs typeface="Gill Sans"/>
               </a:rPr>
-              <a:t>complaints</a:t>
-            </a:r>
+              <a:t>tuples</a:t>
+            </a:r>
+            <a:endParaRPr lang="en-US" dirty="0" smtClean="0">
+              <a:solidFill>
+                <a:schemeClr val="bg1">
+                  <a:lumMod val="50000"/>
+                </a:schemeClr>
+              </a:solidFill>
+              <a:latin typeface="Gill Sans"/>
+              <a:cs typeface="Gill Sans"/>
+            </a:endParaRPr>
           </a:p>
         </p:txBody>
       </p:sp>
@@ -10757,7 +10587,7 @@
         </p:nvSpPr>
         <p:spPr>
           <a:xfrm>
-            <a:off x="2117938" y="4613790"/>
+            <a:off x="2117938" y="2414343"/>
             <a:ext cx="626903" cy="369332"/>
           </a:xfrm>
           <a:prstGeom prst="rect">
@@ -10792,7 +10622,7 @@
         </p:nvSpPr>
         <p:spPr>
           <a:xfrm>
-            <a:off x="2084083" y="4833735"/>
+            <a:off x="2084083" y="2634288"/>
             <a:ext cx="660758" cy="369332"/>
           </a:xfrm>
           <a:prstGeom prst="rect">
@@ -10827,7 +10657,7 @@
         </p:nvSpPr>
         <p:spPr>
           <a:xfrm>
-            <a:off x="2335755" y="5053680"/>
+            <a:off x="2335755" y="2854233"/>
             <a:ext cx="409086" cy="369332"/>
           </a:xfrm>
           <a:prstGeom prst="rect">
@@ -10862,7 +10692,45 @@
         </p:nvSpPr>
         <p:spPr>
           <a:xfrm>
-            <a:off x="981290" y="3603014"/>
+            <a:off x="1403766" y="3603014"/>
+            <a:ext cx="530915" cy="461665"/>
+          </a:xfrm>
+          <a:prstGeom prst="rect">
+            <a:avLst/>
+          </a:prstGeom>
+          <a:noFill/>
+        </p:spPr>
+        <p:txBody>
+          <a:bodyPr wrap="none" rtlCol="0">
+            <a:spAutoFit/>
+          </a:bodyPr>
+          <a:lstStyle/>
+          <a:p>
+            <a:r>
+              <a:rPr lang="en-US" sz="2400" dirty="0" smtClean="0">
+                <a:latin typeface="Alegreya" charset="0"/>
+                <a:ea typeface="Alegreya" charset="0"/>
+                <a:cs typeface="Alegreya" charset="0"/>
+              </a:rPr>
+              <a:t>(b)</a:t>
+            </a:r>
+            <a:endParaRPr lang="en-US" sz="2400" dirty="0" smtClean="0">
+              <a:latin typeface="Alegreya" charset="0"/>
+              <a:ea typeface="Alegreya" charset="0"/>
+              <a:cs typeface="Alegreya" charset="0"/>
+            </a:endParaRPr>
+          </a:p>
+        </p:txBody>
+      </p:sp>
+      <p:sp>
+        <p:nvSpPr>
+          <p:cNvPr id="49" name="TextBox 48"/>
+          <p:cNvSpPr txBox="1"/>
+          <p:nvPr/>
+        </p:nvSpPr>
+        <p:spPr>
+          <a:xfrm>
+            <a:off x="1389339" y="2469989"/>
             <a:ext cx="516488" cy="461665"/>
           </a:xfrm>
           <a:prstGeom prst="rect">
@@ -10884,42 +10752,1002 @@
               </a:rPr>
               <a:t>(a)</a:t>
             </a:r>
-          </a:p>
-        </p:txBody>
-      </p:sp>
-      <p:sp>
-        <p:nvSpPr>
-          <p:cNvPr id="49" name="TextBox 48"/>
-          <p:cNvSpPr txBox="1"/>
-          <p:nvPr/>
-        </p:nvSpPr>
-        <p:spPr>
-          <a:xfrm>
-            <a:off x="966863" y="4669436"/>
-            <a:ext cx="530915" cy="461665"/>
-          </a:xfrm>
-          <a:prstGeom prst="rect">
-            <a:avLst/>
-          </a:prstGeom>
-          <a:noFill/>
-        </p:spPr>
-        <p:txBody>
-          <a:bodyPr wrap="none" rtlCol="0">
-            <a:spAutoFit/>
-          </a:bodyPr>
-          <a:lstStyle/>
-          <a:p>
-            <a:r>
-              <a:rPr lang="en-US" sz="2400" dirty="0" smtClean="0">
-                <a:latin typeface="Alegreya" charset="0"/>
-                <a:ea typeface="Alegreya" charset="0"/>
-                <a:cs typeface="Alegreya" charset="0"/>
-              </a:rPr>
-              <a:t>(b)</a:t>
-            </a:r>
-          </a:p>
-        </p:txBody>
-      </p:sp>
+            <a:endParaRPr lang="en-US" sz="2400" dirty="0" smtClean="0">
+              <a:latin typeface="Alegreya" charset="0"/>
+              <a:ea typeface="Alegreya" charset="0"/>
+              <a:cs typeface="Alegreya" charset="0"/>
+            </a:endParaRPr>
+          </a:p>
+        </p:txBody>
+      </p:sp>
+      <p:sp>
+        <p:nvSpPr>
+          <p:cNvPr id="3" name="Oval 2"/>
+          <p:cNvSpPr/>
+          <p:nvPr/>
+        </p:nvSpPr>
+        <p:spPr>
+          <a:xfrm>
+            <a:off x="2928981" y="2349338"/>
+            <a:ext cx="120660" cy="120660"/>
+          </a:xfrm>
+          <a:prstGeom prst="ellipse">
+            <a:avLst/>
+          </a:prstGeom>
+          <a:solidFill>
+            <a:schemeClr val="bg1">
+              <a:lumMod val="50000"/>
+            </a:schemeClr>
+          </a:solidFill>
+          <a:ln>
+            <a:noFill/>
+          </a:ln>
+          <a:effectLst/>
+        </p:spPr>
+        <p:style>
+          <a:lnRef idx="1">
+            <a:schemeClr val="accent1"/>
+          </a:lnRef>
+          <a:fillRef idx="3">
+            <a:schemeClr val="accent1"/>
+          </a:fillRef>
+          <a:effectRef idx="2">
+            <a:schemeClr val="accent1"/>
+          </a:effectRef>
+          <a:fontRef idx="minor">
+            <a:schemeClr val="lt1"/>
+          </a:fontRef>
+        </p:style>
+        <p:txBody>
+          <a:bodyPr rtlCol="0" anchor="ctr"/>
+          <a:lstStyle/>
+          <a:p>
+            <a:pPr algn="ctr"/>
+            <a:endParaRPr lang="en-US"/>
+          </a:p>
+        </p:txBody>
+      </p:sp>
+      <p:sp>
+        <p:nvSpPr>
+          <p:cNvPr id="38" name="Oval 37"/>
+          <p:cNvSpPr/>
+          <p:nvPr/>
+        </p:nvSpPr>
+        <p:spPr>
+          <a:xfrm>
+            <a:off x="3232618" y="2349338"/>
+            <a:ext cx="120660" cy="120660"/>
+          </a:xfrm>
+          <a:prstGeom prst="ellipse">
+            <a:avLst/>
+          </a:prstGeom>
+          <a:solidFill>
+            <a:schemeClr val="bg1">
+              <a:lumMod val="50000"/>
+            </a:schemeClr>
+          </a:solidFill>
+          <a:ln>
+            <a:noFill/>
+          </a:ln>
+          <a:effectLst/>
+        </p:spPr>
+        <p:style>
+          <a:lnRef idx="1">
+            <a:schemeClr val="accent1"/>
+          </a:lnRef>
+          <a:fillRef idx="3">
+            <a:schemeClr val="accent1"/>
+          </a:fillRef>
+          <a:effectRef idx="2">
+            <a:schemeClr val="accent1"/>
+          </a:effectRef>
+          <a:fontRef idx="minor">
+            <a:schemeClr val="lt1"/>
+          </a:fontRef>
+        </p:style>
+        <p:txBody>
+          <a:bodyPr rtlCol="0" anchor="ctr"/>
+          <a:lstStyle/>
+          <a:p>
+            <a:pPr algn="ctr"/>
+            <a:endParaRPr lang="en-US"/>
+          </a:p>
+        </p:txBody>
+      </p:sp>
+      <p:sp>
+        <p:nvSpPr>
+          <p:cNvPr id="47" name="Oval 46"/>
+          <p:cNvSpPr/>
+          <p:nvPr/>
+        </p:nvSpPr>
+        <p:spPr>
+          <a:xfrm>
+            <a:off x="3724147" y="2349338"/>
+            <a:ext cx="120660" cy="120660"/>
+          </a:xfrm>
+          <a:prstGeom prst="ellipse">
+            <a:avLst/>
+          </a:prstGeom>
+          <a:solidFill>
+            <a:schemeClr val="bg1">
+              <a:lumMod val="50000"/>
+            </a:schemeClr>
+          </a:solidFill>
+          <a:ln>
+            <a:noFill/>
+          </a:ln>
+          <a:effectLst/>
+        </p:spPr>
+        <p:style>
+          <a:lnRef idx="1">
+            <a:schemeClr val="accent1"/>
+          </a:lnRef>
+          <a:fillRef idx="3">
+            <a:schemeClr val="accent1"/>
+          </a:fillRef>
+          <a:effectRef idx="2">
+            <a:schemeClr val="accent1"/>
+          </a:effectRef>
+          <a:fontRef idx="minor">
+            <a:schemeClr val="lt1"/>
+          </a:fontRef>
+        </p:style>
+        <p:txBody>
+          <a:bodyPr rtlCol="0" anchor="ctr"/>
+          <a:lstStyle/>
+          <a:p>
+            <a:pPr algn="ctr"/>
+            <a:endParaRPr lang="en-US"/>
+          </a:p>
+        </p:txBody>
+      </p:sp>
+      <p:sp>
+        <p:nvSpPr>
+          <p:cNvPr id="50" name="Oval 49"/>
+          <p:cNvSpPr/>
+          <p:nvPr/>
+        </p:nvSpPr>
+        <p:spPr>
+          <a:xfrm>
+            <a:off x="4556597" y="2349338"/>
+            <a:ext cx="120660" cy="120660"/>
+          </a:xfrm>
+          <a:prstGeom prst="ellipse">
+            <a:avLst/>
+          </a:prstGeom>
+          <a:solidFill>
+            <a:schemeClr val="bg1">
+              <a:lumMod val="50000"/>
+            </a:schemeClr>
+          </a:solidFill>
+          <a:ln>
+            <a:noFill/>
+          </a:ln>
+          <a:effectLst/>
+        </p:spPr>
+        <p:style>
+          <a:lnRef idx="1">
+            <a:schemeClr val="accent1"/>
+          </a:lnRef>
+          <a:fillRef idx="3">
+            <a:schemeClr val="accent1"/>
+          </a:fillRef>
+          <a:effectRef idx="2">
+            <a:schemeClr val="accent1"/>
+          </a:effectRef>
+          <a:fontRef idx="minor">
+            <a:schemeClr val="lt1"/>
+          </a:fontRef>
+        </p:style>
+        <p:txBody>
+          <a:bodyPr rtlCol="0" anchor="ctr"/>
+          <a:lstStyle/>
+          <a:p>
+            <a:pPr algn="ctr"/>
+            <a:endParaRPr lang="en-US"/>
+          </a:p>
+        </p:txBody>
+      </p:sp>
+      <p:sp>
+        <p:nvSpPr>
+          <p:cNvPr id="51" name="Oval 50"/>
+          <p:cNvSpPr/>
+          <p:nvPr/>
+        </p:nvSpPr>
+        <p:spPr>
+          <a:xfrm>
+            <a:off x="4939354" y="2349338"/>
+            <a:ext cx="120660" cy="120660"/>
+          </a:xfrm>
+          <a:prstGeom prst="ellipse">
+            <a:avLst/>
+          </a:prstGeom>
+          <a:solidFill>
+            <a:schemeClr val="bg1">
+              <a:lumMod val="50000"/>
+            </a:schemeClr>
+          </a:solidFill>
+          <a:ln>
+            <a:noFill/>
+          </a:ln>
+          <a:effectLst/>
+        </p:spPr>
+        <p:style>
+          <a:lnRef idx="1">
+            <a:schemeClr val="accent1"/>
+          </a:lnRef>
+          <a:fillRef idx="3">
+            <a:schemeClr val="accent1"/>
+          </a:fillRef>
+          <a:effectRef idx="2">
+            <a:schemeClr val="accent1"/>
+          </a:effectRef>
+          <a:fontRef idx="minor">
+            <a:schemeClr val="lt1"/>
+          </a:fontRef>
+        </p:style>
+        <p:txBody>
+          <a:bodyPr rtlCol="0" anchor="ctr"/>
+          <a:lstStyle/>
+          <a:p>
+            <a:pPr algn="ctr"/>
+            <a:endParaRPr lang="en-US"/>
+          </a:p>
+        </p:txBody>
+      </p:sp>
+      <p:sp>
+        <p:nvSpPr>
+          <p:cNvPr id="52" name="Oval 51"/>
+          <p:cNvSpPr/>
+          <p:nvPr/>
+        </p:nvSpPr>
+        <p:spPr>
+          <a:xfrm>
+            <a:off x="5374740" y="2349338"/>
+            <a:ext cx="120660" cy="120660"/>
+          </a:xfrm>
+          <a:prstGeom prst="ellipse">
+            <a:avLst/>
+          </a:prstGeom>
+          <a:solidFill>
+            <a:schemeClr val="bg1">
+              <a:lumMod val="50000"/>
+            </a:schemeClr>
+          </a:solidFill>
+          <a:ln>
+            <a:noFill/>
+          </a:ln>
+          <a:effectLst/>
+        </p:spPr>
+        <p:style>
+          <a:lnRef idx="1">
+            <a:schemeClr val="accent1"/>
+          </a:lnRef>
+          <a:fillRef idx="3">
+            <a:schemeClr val="accent1"/>
+          </a:fillRef>
+          <a:effectRef idx="2">
+            <a:schemeClr val="accent1"/>
+          </a:effectRef>
+          <a:fontRef idx="minor">
+            <a:schemeClr val="lt1"/>
+          </a:fontRef>
+        </p:style>
+        <p:txBody>
+          <a:bodyPr rtlCol="0" anchor="ctr"/>
+          <a:lstStyle/>
+          <a:p>
+            <a:pPr algn="ctr"/>
+            <a:endParaRPr lang="en-US"/>
+          </a:p>
+        </p:txBody>
+      </p:sp>
+      <p:sp>
+        <p:nvSpPr>
+          <p:cNvPr id="53" name="Oval 52"/>
+          <p:cNvSpPr/>
+          <p:nvPr/>
+        </p:nvSpPr>
+        <p:spPr>
+          <a:xfrm>
+            <a:off x="5217411" y="2349338"/>
+            <a:ext cx="120660" cy="120660"/>
+          </a:xfrm>
+          <a:prstGeom prst="ellipse">
+            <a:avLst/>
+          </a:prstGeom>
+          <a:solidFill>
+            <a:schemeClr val="bg1">
+              <a:lumMod val="50000"/>
+            </a:schemeClr>
+          </a:solidFill>
+          <a:ln>
+            <a:noFill/>
+          </a:ln>
+          <a:effectLst/>
+        </p:spPr>
+        <p:style>
+          <a:lnRef idx="1">
+            <a:schemeClr val="accent1"/>
+          </a:lnRef>
+          <a:fillRef idx="3">
+            <a:schemeClr val="accent1"/>
+          </a:fillRef>
+          <a:effectRef idx="2">
+            <a:schemeClr val="accent1"/>
+          </a:effectRef>
+          <a:fontRef idx="minor">
+            <a:schemeClr val="lt1"/>
+          </a:fontRef>
+        </p:style>
+        <p:txBody>
+          <a:bodyPr rtlCol="0" anchor="ctr"/>
+          <a:lstStyle/>
+          <a:p>
+            <a:pPr algn="ctr"/>
+            <a:endParaRPr lang="en-US"/>
+          </a:p>
+        </p:txBody>
+      </p:sp>
+      <p:sp>
+        <p:nvSpPr>
+          <p:cNvPr id="57" name="Oval 56"/>
+          <p:cNvSpPr/>
+          <p:nvPr/>
+        </p:nvSpPr>
+        <p:spPr>
+          <a:xfrm>
+            <a:off x="2940040" y="3459062"/>
+            <a:ext cx="120660" cy="120660"/>
+          </a:xfrm>
+          <a:prstGeom prst="ellipse">
+            <a:avLst/>
+          </a:prstGeom>
+          <a:solidFill>
+            <a:schemeClr val="bg1">
+              <a:lumMod val="50000"/>
+            </a:schemeClr>
+          </a:solidFill>
+          <a:ln>
+            <a:noFill/>
+          </a:ln>
+          <a:effectLst/>
+        </p:spPr>
+        <p:style>
+          <a:lnRef idx="1">
+            <a:schemeClr val="accent1"/>
+          </a:lnRef>
+          <a:fillRef idx="3">
+            <a:schemeClr val="accent1"/>
+          </a:fillRef>
+          <a:effectRef idx="2">
+            <a:schemeClr val="accent1"/>
+          </a:effectRef>
+          <a:fontRef idx="minor">
+            <a:schemeClr val="lt1"/>
+          </a:fontRef>
+        </p:style>
+        <p:txBody>
+          <a:bodyPr rtlCol="0" anchor="ctr"/>
+          <a:lstStyle/>
+          <a:p>
+            <a:pPr algn="ctr"/>
+            <a:endParaRPr lang="en-US"/>
+          </a:p>
+        </p:txBody>
+      </p:sp>
+      <p:sp>
+        <p:nvSpPr>
+          <p:cNvPr id="59" name="Oval 58"/>
+          <p:cNvSpPr/>
+          <p:nvPr/>
+        </p:nvSpPr>
+        <p:spPr>
+          <a:xfrm>
+            <a:off x="3735206" y="3459062"/>
+            <a:ext cx="120660" cy="120660"/>
+          </a:xfrm>
+          <a:prstGeom prst="ellipse">
+            <a:avLst/>
+          </a:prstGeom>
+          <a:solidFill>
+            <a:schemeClr val="bg1">
+              <a:lumMod val="50000"/>
+            </a:schemeClr>
+          </a:solidFill>
+          <a:ln>
+            <a:noFill/>
+          </a:ln>
+          <a:effectLst/>
+        </p:spPr>
+        <p:style>
+          <a:lnRef idx="1">
+            <a:schemeClr val="accent1"/>
+          </a:lnRef>
+          <a:fillRef idx="3">
+            <a:schemeClr val="accent1"/>
+          </a:fillRef>
+          <a:effectRef idx="2">
+            <a:schemeClr val="accent1"/>
+          </a:effectRef>
+          <a:fontRef idx="minor">
+            <a:schemeClr val="lt1"/>
+          </a:fontRef>
+        </p:style>
+        <p:txBody>
+          <a:bodyPr rtlCol="0" anchor="ctr"/>
+          <a:lstStyle/>
+          <a:p>
+            <a:pPr algn="ctr"/>
+            <a:endParaRPr lang="en-US"/>
+          </a:p>
+        </p:txBody>
+      </p:sp>
+      <p:sp>
+        <p:nvSpPr>
+          <p:cNvPr id="61" name="Oval 60"/>
+          <p:cNvSpPr/>
+          <p:nvPr/>
+        </p:nvSpPr>
+        <p:spPr>
+          <a:xfrm>
+            <a:off x="4950413" y="3459062"/>
+            <a:ext cx="120660" cy="120660"/>
+          </a:xfrm>
+          <a:prstGeom prst="ellipse">
+            <a:avLst/>
+          </a:prstGeom>
+          <a:solidFill>
+            <a:schemeClr val="bg1">
+              <a:lumMod val="50000"/>
+            </a:schemeClr>
+          </a:solidFill>
+          <a:ln>
+            <a:noFill/>
+          </a:ln>
+          <a:effectLst/>
+        </p:spPr>
+        <p:style>
+          <a:lnRef idx="1">
+            <a:schemeClr val="accent1"/>
+          </a:lnRef>
+          <a:fillRef idx="3">
+            <a:schemeClr val="accent1"/>
+          </a:fillRef>
+          <a:effectRef idx="2">
+            <a:schemeClr val="accent1"/>
+          </a:effectRef>
+          <a:fontRef idx="minor">
+            <a:schemeClr val="lt1"/>
+          </a:fontRef>
+        </p:style>
+        <p:txBody>
+          <a:bodyPr rtlCol="0" anchor="ctr"/>
+          <a:lstStyle/>
+          <a:p>
+            <a:pPr algn="ctr"/>
+            <a:endParaRPr lang="en-US"/>
+          </a:p>
+        </p:txBody>
+      </p:sp>
+      <p:sp>
+        <p:nvSpPr>
+          <p:cNvPr id="63" name="Oval 62"/>
+          <p:cNvSpPr/>
+          <p:nvPr/>
+        </p:nvSpPr>
+        <p:spPr>
+          <a:xfrm>
+            <a:off x="5228470" y="3459062"/>
+            <a:ext cx="120660" cy="120660"/>
+          </a:xfrm>
+          <a:prstGeom prst="ellipse">
+            <a:avLst/>
+          </a:prstGeom>
+          <a:solidFill>
+            <a:schemeClr val="bg1">
+              <a:lumMod val="50000"/>
+            </a:schemeClr>
+          </a:solidFill>
+          <a:ln>
+            <a:noFill/>
+          </a:ln>
+          <a:effectLst/>
+        </p:spPr>
+        <p:style>
+          <a:lnRef idx="1">
+            <a:schemeClr val="accent1"/>
+          </a:lnRef>
+          <a:fillRef idx="3">
+            <a:schemeClr val="accent1"/>
+          </a:fillRef>
+          <a:effectRef idx="2">
+            <a:schemeClr val="accent1"/>
+          </a:effectRef>
+          <a:fontRef idx="minor">
+            <a:schemeClr val="lt1"/>
+          </a:fontRef>
+        </p:style>
+        <p:txBody>
+          <a:bodyPr rtlCol="0" anchor="ctr"/>
+          <a:lstStyle/>
+          <a:p>
+            <a:pPr algn="ctr"/>
+            <a:endParaRPr lang="en-US"/>
+          </a:p>
+        </p:txBody>
+      </p:sp>
+      <p:sp>
+        <p:nvSpPr>
+          <p:cNvPr id="64" name="Oval 63"/>
+          <p:cNvSpPr/>
+          <p:nvPr/>
+        </p:nvSpPr>
+        <p:spPr>
+          <a:xfrm>
+            <a:off x="5910184" y="3459062"/>
+            <a:ext cx="120660" cy="120660"/>
+          </a:xfrm>
+          <a:prstGeom prst="ellipse">
+            <a:avLst/>
+          </a:prstGeom>
+          <a:solidFill>
+            <a:schemeClr val="bg1">
+              <a:lumMod val="50000"/>
+            </a:schemeClr>
+          </a:solidFill>
+          <a:ln>
+            <a:noFill/>
+          </a:ln>
+          <a:effectLst/>
+        </p:spPr>
+        <p:style>
+          <a:lnRef idx="1">
+            <a:schemeClr val="accent1"/>
+          </a:lnRef>
+          <a:fillRef idx="3">
+            <a:schemeClr val="accent1"/>
+          </a:fillRef>
+          <a:effectRef idx="2">
+            <a:schemeClr val="accent1"/>
+          </a:effectRef>
+          <a:fontRef idx="minor">
+            <a:schemeClr val="lt1"/>
+          </a:fontRef>
+        </p:style>
+        <p:txBody>
+          <a:bodyPr rtlCol="0" anchor="ctr"/>
+          <a:lstStyle/>
+          <a:p>
+            <a:pPr algn="ctr"/>
+            <a:endParaRPr lang="en-US"/>
+          </a:p>
+        </p:txBody>
+      </p:sp>
+      <p:sp>
+        <p:nvSpPr>
+          <p:cNvPr id="65" name="Oval 64"/>
+          <p:cNvSpPr/>
+          <p:nvPr/>
+        </p:nvSpPr>
+        <p:spPr>
+          <a:xfrm>
+            <a:off x="6345570" y="3459062"/>
+            <a:ext cx="120660" cy="120660"/>
+          </a:xfrm>
+          <a:prstGeom prst="ellipse">
+            <a:avLst/>
+          </a:prstGeom>
+          <a:solidFill>
+            <a:schemeClr val="bg1">
+              <a:lumMod val="50000"/>
+            </a:schemeClr>
+          </a:solidFill>
+          <a:ln>
+            <a:noFill/>
+          </a:ln>
+          <a:effectLst/>
+        </p:spPr>
+        <p:style>
+          <a:lnRef idx="1">
+            <a:schemeClr val="accent1"/>
+          </a:lnRef>
+          <a:fillRef idx="3">
+            <a:schemeClr val="accent1"/>
+          </a:fillRef>
+          <a:effectRef idx="2">
+            <a:schemeClr val="accent1"/>
+          </a:effectRef>
+          <a:fontRef idx="minor">
+            <a:schemeClr val="lt1"/>
+          </a:fontRef>
+        </p:style>
+        <p:txBody>
+          <a:bodyPr rtlCol="0" anchor="ctr"/>
+          <a:lstStyle/>
+          <a:p>
+            <a:pPr algn="ctr"/>
+            <a:endParaRPr lang="en-US"/>
+          </a:p>
+        </p:txBody>
+      </p:sp>
+      <p:sp>
+        <p:nvSpPr>
+          <p:cNvPr id="67" name="Oval 66"/>
+          <p:cNvSpPr/>
+          <p:nvPr/>
+        </p:nvSpPr>
+        <p:spPr>
+          <a:xfrm>
+            <a:off x="4323557" y="3459062"/>
+            <a:ext cx="120660" cy="120660"/>
+          </a:xfrm>
+          <a:prstGeom prst="ellipse">
+            <a:avLst/>
+          </a:prstGeom>
+          <a:solidFill>
+            <a:schemeClr val="bg1">
+              <a:lumMod val="50000"/>
+            </a:schemeClr>
+          </a:solidFill>
+          <a:ln>
+            <a:noFill/>
+          </a:ln>
+          <a:effectLst/>
+        </p:spPr>
+        <p:style>
+          <a:lnRef idx="1">
+            <a:schemeClr val="accent1"/>
+          </a:lnRef>
+          <a:fillRef idx="3">
+            <a:schemeClr val="accent1"/>
+          </a:fillRef>
+          <a:effectRef idx="2">
+            <a:schemeClr val="accent1"/>
+          </a:effectRef>
+          <a:fontRef idx="minor">
+            <a:schemeClr val="lt1"/>
+          </a:fontRef>
+        </p:style>
+        <p:txBody>
+          <a:bodyPr rtlCol="0" anchor="ctr"/>
+          <a:lstStyle/>
+          <a:p>
+            <a:pPr algn="ctr"/>
+            <a:endParaRPr lang="en-US"/>
+          </a:p>
+        </p:txBody>
+      </p:sp>
+      <p:sp>
+        <p:nvSpPr>
+          <p:cNvPr id="68" name="Oval 67"/>
+          <p:cNvSpPr/>
+          <p:nvPr/>
+        </p:nvSpPr>
+        <p:spPr>
+          <a:xfrm>
+            <a:off x="4239232" y="2349338"/>
+            <a:ext cx="120660" cy="120660"/>
+          </a:xfrm>
+          <a:prstGeom prst="ellipse">
+            <a:avLst/>
+          </a:prstGeom>
+          <a:solidFill>
+            <a:schemeClr val="bg1"/>
+          </a:solidFill>
+          <a:ln w="28575">
+            <a:solidFill>
+              <a:schemeClr val="bg1">
+                <a:lumMod val="50000"/>
+              </a:schemeClr>
+            </a:solidFill>
+          </a:ln>
+          <a:effectLst/>
+        </p:spPr>
+        <p:style>
+          <a:lnRef idx="1">
+            <a:schemeClr val="accent1"/>
+          </a:lnRef>
+          <a:fillRef idx="3">
+            <a:schemeClr val="accent1"/>
+          </a:fillRef>
+          <a:effectRef idx="2">
+            <a:schemeClr val="accent1"/>
+          </a:effectRef>
+          <a:fontRef idx="minor">
+            <a:schemeClr val="lt1"/>
+          </a:fontRef>
+        </p:style>
+        <p:txBody>
+          <a:bodyPr rtlCol="0" anchor="ctr"/>
+          <a:lstStyle/>
+          <a:p>
+            <a:pPr algn="ctr"/>
+            <a:endParaRPr lang="en-US"/>
+          </a:p>
+        </p:txBody>
+      </p:sp>
+      <p:sp>
+        <p:nvSpPr>
+          <p:cNvPr id="69" name="Oval 68"/>
+          <p:cNvSpPr/>
+          <p:nvPr/>
+        </p:nvSpPr>
+        <p:spPr>
+          <a:xfrm>
+            <a:off x="3944408" y="2349338"/>
+            <a:ext cx="120660" cy="120660"/>
+          </a:xfrm>
+          <a:prstGeom prst="ellipse">
+            <a:avLst/>
+          </a:prstGeom>
+          <a:solidFill>
+            <a:schemeClr val="bg1"/>
+          </a:solidFill>
+          <a:ln w="28575">
+            <a:solidFill>
+              <a:schemeClr val="bg1">
+                <a:lumMod val="50000"/>
+              </a:schemeClr>
+            </a:solidFill>
+          </a:ln>
+          <a:effectLst/>
+        </p:spPr>
+        <p:style>
+          <a:lnRef idx="1">
+            <a:schemeClr val="accent1"/>
+          </a:lnRef>
+          <a:fillRef idx="3">
+            <a:schemeClr val="accent1"/>
+          </a:fillRef>
+          <a:effectRef idx="2">
+            <a:schemeClr val="accent1"/>
+          </a:effectRef>
+          <a:fontRef idx="minor">
+            <a:schemeClr val="lt1"/>
+          </a:fontRef>
+        </p:style>
+        <p:txBody>
+          <a:bodyPr rtlCol="0" anchor="ctr"/>
+          <a:lstStyle/>
+          <a:p>
+            <a:pPr algn="ctr"/>
+            <a:endParaRPr lang="en-US"/>
+          </a:p>
+        </p:txBody>
+      </p:sp>
+      <p:sp>
+        <p:nvSpPr>
+          <p:cNvPr id="70" name="Oval 69"/>
+          <p:cNvSpPr/>
+          <p:nvPr/>
+        </p:nvSpPr>
+        <p:spPr>
+          <a:xfrm>
+            <a:off x="4633828" y="3459062"/>
+            <a:ext cx="120660" cy="120660"/>
+          </a:xfrm>
+          <a:prstGeom prst="ellipse">
+            <a:avLst/>
+          </a:prstGeom>
+          <a:solidFill>
+            <a:schemeClr val="bg1"/>
+          </a:solidFill>
+          <a:ln w="28575">
+            <a:solidFill>
+              <a:schemeClr val="bg1">
+                <a:lumMod val="50000"/>
+              </a:schemeClr>
+            </a:solidFill>
+          </a:ln>
+          <a:effectLst/>
+        </p:spPr>
+        <p:style>
+          <a:lnRef idx="1">
+            <a:schemeClr val="accent1"/>
+          </a:lnRef>
+          <a:fillRef idx="3">
+            <a:schemeClr val="accent1"/>
+          </a:fillRef>
+          <a:effectRef idx="2">
+            <a:schemeClr val="accent1"/>
+          </a:effectRef>
+          <a:fontRef idx="minor">
+            <a:schemeClr val="lt1"/>
+          </a:fontRef>
+        </p:style>
+        <p:txBody>
+          <a:bodyPr rtlCol="0" anchor="ctr"/>
+          <a:lstStyle/>
+          <a:p>
+            <a:pPr algn="ctr"/>
+            <a:endParaRPr lang="en-US"/>
+          </a:p>
+        </p:txBody>
+      </p:sp>
+      <p:grpSp>
+        <p:nvGrpSpPr>
+          <p:cNvPr id="7" name="Group 6"/>
+          <p:cNvGrpSpPr/>
+          <p:nvPr/>
+        </p:nvGrpSpPr>
+        <p:grpSpPr>
+          <a:xfrm>
+            <a:off x="2785813" y="4393846"/>
+            <a:ext cx="3559296" cy="369332"/>
+            <a:chOff x="2119771" y="4386807"/>
+            <a:chExt cx="3559296" cy="369332"/>
+          </a:xfrm>
+        </p:grpSpPr>
+        <p:sp>
+          <p:nvSpPr>
+            <p:cNvPr id="4" name="TextBox 3"/>
+            <p:cNvSpPr txBox="1"/>
+            <p:nvPr/>
+          </p:nvSpPr>
+          <p:spPr>
+            <a:xfrm>
+              <a:off x="2346014" y="4386807"/>
+              <a:ext cx="1186543" cy="369332"/>
+            </a:xfrm>
+            <a:prstGeom prst="rect">
+              <a:avLst/>
+            </a:prstGeom>
+            <a:noFill/>
+          </p:spPr>
+          <p:txBody>
+            <a:bodyPr wrap="none" rtlCol="0">
+              <a:spAutoFit/>
+            </a:bodyPr>
+            <a:lstStyle/>
+            <a:p>
+              <a:r>
+                <a:rPr lang="en-US" dirty="0" smtClean="0">
+                  <a:latin typeface="Gill Sans"/>
+                  <a:cs typeface="Gill Sans"/>
+                </a:rPr>
+                <a:t>complaints</a:t>
+              </a:r>
+              <a:endParaRPr lang="en-US" dirty="0" smtClean="0">
+                <a:latin typeface="Gill Sans"/>
+                <a:cs typeface="Gill Sans"/>
+              </a:endParaRPr>
+            </a:p>
+          </p:txBody>
+        </p:sp>
+        <p:sp>
+          <p:nvSpPr>
+            <p:cNvPr id="5" name="TextBox 4"/>
+            <p:cNvSpPr txBox="1"/>
+            <p:nvPr/>
+          </p:nvSpPr>
+          <p:spPr>
+            <a:xfrm>
+              <a:off x="4059713" y="4386807"/>
+              <a:ext cx="1619354" cy="369332"/>
+            </a:xfrm>
+            <a:prstGeom prst="rect">
+              <a:avLst/>
+            </a:prstGeom>
+            <a:noFill/>
+          </p:spPr>
+          <p:txBody>
+            <a:bodyPr wrap="none" rtlCol="0">
+              <a:spAutoFit/>
+            </a:bodyPr>
+            <a:lstStyle/>
+            <a:p>
+              <a:r>
+                <a:rPr lang="en-US" smtClean="0">
+                  <a:latin typeface="Gill Sans"/>
+                  <a:cs typeface="Gill Sans"/>
+                </a:rPr>
+                <a:t>non-complaints</a:t>
+              </a:r>
+              <a:endParaRPr lang="en-US" dirty="0" err="1" smtClean="0">
+                <a:latin typeface="Gill Sans"/>
+                <a:cs typeface="Gill Sans"/>
+              </a:endParaRPr>
+            </a:p>
+          </p:txBody>
+        </p:sp>
+        <p:sp>
+          <p:nvSpPr>
+            <p:cNvPr id="71" name="Oval 70"/>
+            <p:cNvSpPr/>
+            <p:nvPr/>
+          </p:nvSpPr>
+          <p:spPr>
+            <a:xfrm>
+              <a:off x="2119771" y="4459931"/>
+              <a:ext cx="223084" cy="223084"/>
+            </a:xfrm>
+            <a:prstGeom prst="ellipse">
+              <a:avLst/>
+            </a:prstGeom>
+            <a:solidFill>
+              <a:schemeClr val="bg1">
+                <a:lumMod val="50000"/>
+              </a:schemeClr>
+            </a:solidFill>
+            <a:ln>
+              <a:noFill/>
+            </a:ln>
+            <a:effectLst/>
+          </p:spPr>
+          <p:style>
+            <a:lnRef idx="1">
+              <a:schemeClr val="accent1"/>
+            </a:lnRef>
+            <a:fillRef idx="3">
+              <a:schemeClr val="accent1"/>
+            </a:fillRef>
+            <a:effectRef idx="2">
+              <a:schemeClr val="accent1"/>
+            </a:effectRef>
+            <a:fontRef idx="minor">
+              <a:schemeClr val="lt1"/>
+            </a:fontRef>
+          </p:style>
+          <p:txBody>
+            <a:bodyPr rtlCol="0" anchor="ctr"/>
+            <a:lstStyle/>
+            <a:p>
+              <a:pPr algn="ctr"/>
+              <a:endParaRPr lang="en-US"/>
+            </a:p>
+          </p:txBody>
+        </p:sp>
+        <p:sp>
+          <p:nvSpPr>
+            <p:cNvPr id="72" name="Oval 71"/>
+            <p:cNvSpPr/>
+            <p:nvPr/>
+          </p:nvSpPr>
+          <p:spPr>
+            <a:xfrm>
+              <a:off x="3832866" y="4459931"/>
+              <a:ext cx="223084" cy="223084"/>
+            </a:xfrm>
+            <a:prstGeom prst="ellipse">
+              <a:avLst/>
+            </a:prstGeom>
+            <a:solidFill>
+              <a:schemeClr val="bg1"/>
+            </a:solidFill>
+            <a:ln w="28575">
+              <a:solidFill>
+                <a:schemeClr val="bg1">
+                  <a:lumMod val="50000"/>
+                </a:schemeClr>
+              </a:solidFill>
+            </a:ln>
+            <a:effectLst/>
+          </p:spPr>
+          <p:style>
+            <a:lnRef idx="1">
+              <a:schemeClr val="accent1"/>
+            </a:lnRef>
+            <a:fillRef idx="3">
+              <a:schemeClr val="accent1"/>
+            </a:fillRef>
+            <a:effectRef idx="2">
+              <a:schemeClr val="accent1"/>
+            </a:effectRef>
+            <a:fontRef idx="minor">
+              <a:schemeClr val="lt1"/>
+            </a:fontRef>
+          </p:style>
+          <p:txBody>
+            <a:bodyPr rtlCol="0" anchor="ctr"/>
+            <a:lstStyle/>
+            <a:p>
+              <a:pPr algn="ctr"/>
+              <a:endParaRPr lang="en-US" dirty="0"/>
+            </a:p>
+          </p:txBody>
+        </p:sp>
+      </p:grpSp>
     </p:spTree>
     <p:extLst>
       <p:ext uri="{BB962C8B-B14F-4D97-AF65-F5344CB8AC3E}">

</xml_diff>

<commit_message>
another pass on intro.  Fixed mentions of handling false positive complaints.  Still missing: summary of experiments in the end
</commit_message>
<xml_diff>
--- a/docs/sigmod15/figures/figs.pptx
+++ b/docs/sigmod15/figures/figs.pptx
@@ -11,7 +11,8 @@
     <p:sldId id="258" r:id="rId5"/>
     <p:sldId id="259" r:id="rId6"/>
     <p:sldId id="262" r:id="rId7"/>
-    <p:sldId id="261" r:id="rId8"/>
+    <p:sldId id="263" r:id="rId8"/>
+    <p:sldId id="261" r:id="rId9"/>
   </p:sldIdLst>
   <p:sldSz cx="9144000" cy="6858000" type="screen4x3"/>
   <p:notesSz cx="6858000" cy="9144000"/>
@@ -112,7 +113,7 @@
   </p:defaultTextStyle>
   <p:extLst>
     <p:ext uri="{EFAFB233-063F-42B5-8137-9DF3F51BA10A}">
-      <p15:sldGuideLst xmlns:p15="http://schemas.microsoft.com/office/powerpoint/2012/main">
+      <p15:sldGuideLst xmlns:p15="http://schemas.microsoft.com/office/powerpoint/2012/main" xmlns="">
         <p15:guide id="1" orient="horz" pos="2160">
           <p15:clr>
             <a:srgbClr val="A4A3A4"/>
@@ -310,7 +311,7 @@
           <a:p>
             <a:fld id="{E53DFF73-D480-144E-A535-5E58F29F2980}" type="datetimeFigureOut">
               <a:rPr lang="en-US" smtClean="0"/>
-              <a:t>11/17/15</a:t>
+              <a:t>11/19/15</a:t>
             </a:fld>
             <a:endParaRPr lang="en-US"/>
           </a:p>
@@ -480,7 +481,7 @@
           <a:p>
             <a:fld id="{E53DFF73-D480-144E-A535-5E58F29F2980}" type="datetimeFigureOut">
               <a:rPr lang="en-US" smtClean="0"/>
-              <a:t>11/17/15</a:t>
+              <a:t>11/19/15</a:t>
             </a:fld>
             <a:endParaRPr lang="en-US"/>
           </a:p>
@@ -660,7 +661,7 @@
           <a:p>
             <a:fld id="{E53DFF73-D480-144E-A535-5E58F29F2980}" type="datetimeFigureOut">
               <a:rPr lang="en-US" smtClean="0"/>
-              <a:t>11/17/15</a:t>
+              <a:t>11/19/15</a:t>
             </a:fld>
             <a:endParaRPr lang="en-US"/>
           </a:p>
@@ -830,7 +831,7 @@
           <a:p>
             <a:fld id="{E53DFF73-D480-144E-A535-5E58F29F2980}" type="datetimeFigureOut">
               <a:rPr lang="en-US" smtClean="0"/>
-              <a:t>11/17/15</a:t>
+              <a:t>11/19/15</a:t>
             </a:fld>
             <a:endParaRPr lang="en-US"/>
           </a:p>
@@ -1076,7 +1077,7 @@
           <a:p>
             <a:fld id="{E53DFF73-D480-144E-A535-5E58F29F2980}" type="datetimeFigureOut">
               <a:rPr lang="en-US" smtClean="0"/>
-              <a:t>11/17/15</a:t>
+              <a:t>11/19/15</a:t>
             </a:fld>
             <a:endParaRPr lang="en-US"/>
           </a:p>
@@ -1364,7 +1365,7 @@
           <a:p>
             <a:fld id="{E53DFF73-D480-144E-A535-5E58F29F2980}" type="datetimeFigureOut">
               <a:rPr lang="en-US" smtClean="0"/>
-              <a:t>11/17/15</a:t>
+              <a:t>11/19/15</a:t>
             </a:fld>
             <a:endParaRPr lang="en-US"/>
           </a:p>
@@ -1786,7 +1787,7 @@
           <a:p>
             <a:fld id="{E53DFF73-D480-144E-A535-5E58F29F2980}" type="datetimeFigureOut">
               <a:rPr lang="en-US" smtClean="0"/>
-              <a:t>11/17/15</a:t>
+              <a:t>11/19/15</a:t>
             </a:fld>
             <a:endParaRPr lang="en-US"/>
           </a:p>
@@ -1904,7 +1905,7 @@
           <a:p>
             <a:fld id="{E53DFF73-D480-144E-A535-5E58F29F2980}" type="datetimeFigureOut">
               <a:rPr lang="en-US" smtClean="0"/>
-              <a:t>11/17/15</a:t>
+              <a:t>11/19/15</a:t>
             </a:fld>
             <a:endParaRPr lang="en-US"/>
           </a:p>
@@ -1999,7 +2000,7 @@
           <a:p>
             <a:fld id="{E53DFF73-D480-144E-A535-5E58F29F2980}" type="datetimeFigureOut">
               <a:rPr lang="en-US" smtClean="0"/>
-              <a:t>11/17/15</a:t>
+              <a:t>11/19/15</a:t>
             </a:fld>
             <a:endParaRPr lang="en-US"/>
           </a:p>
@@ -2276,7 +2277,7 @@
           <a:p>
             <a:fld id="{E53DFF73-D480-144E-A535-5E58F29F2980}" type="datetimeFigureOut">
               <a:rPr lang="en-US" smtClean="0"/>
-              <a:t>11/17/15</a:t>
+              <a:t>11/19/15</a:t>
             </a:fld>
             <a:endParaRPr lang="en-US"/>
           </a:p>
@@ -2529,7 +2530,7 @@
           <a:p>
             <a:fld id="{E53DFF73-D480-144E-A535-5E58F29F2980}" type="datetimeFigureOut">
               <a:rPr lang="en-US" smtClean="0"/>
-              <a:t>11/17/15</a:t>
+              <a:t>11/19/15</a:t>
             </a:fld>
             <a:endParaRPr lang="en-US"/>
           </a:p>
@@ -2742,7 +2743,7 @@
           <a:p>
             <a:fld id="{E53DFF73-D480-144E-A535-5E58F29F2980}" type="datetimeFigureOut">
               <a:rPr lang="en-US" smtClean="0"/>
-              <a:t>11/17/15</a:t>
+              <a:t>11/19/15</a:t>
             </a:fld>
             <a:endParaRPr lang="en-US"/>
           </a:p>
@@ -3479,7 +3480,7 @@
   <p:timing>
     <p:tnLst>
       <p:par>
-        <p:cTn id="1" dur="indefinite" restart="never" nodeType="tmRoot"/>
+        <p:cTn xmlns:p14="http://schemas.microsoft.com/office/powerpoint/2010/main" id="1" dur="indefinite" restart="never" nodeType="tmRoot"/>
       </p:par>
     </p:tnLst>
   </p:timing>
@@ -4298,7 +4299,7 @@
   <p:timing>
     <p:tnLst>
       <p:par>
-        <p:cTn id="1" dur="indefinite" restart="never" nodeType="tmRoot"/>
+        <p:cTn xmlns:p14="http://schemas.microsoft.com/office/powerpoint/2010/main" id="1" dur="indefinite" restart="never" nodeType="tmRoot"/>
       </p:par>
     </p:tnLst>
   </p:timing>
@@ -5035,7 +5036,7 @@
   <p:timing>
     <p:tnLst>
       <p:par>
-        <p:cTn id="1" dur="indefinite" restart="never" nodeType="tmRoot"/>
+        <p:cTn xmlns:p14="http://schemas.microsoft.com/office/powerpoint/2010/main" id="1" dur="indefinite" restart="never" nodeType="tmRoot"/>
       </p:par>
     </p:tnLst>
   </p:timing>
@@ -9912,16 +9913,6 @@
               </a:rPr>
               <a:t>error tuple</a:t>
             </a:r>
-            <a:endParaRPr lang="en-US" sz="2000" dirty="0" smtClean="0">
-              <a:solidFill>
-                <a:schemeClr val="bg1">
-                  <a:lumMod val="50000"/>
-                </a:schemeClr>
-              </a:solidFill>
-              <a:latin typeface="Alegreya" charset="0"/>
-              <a:ea typeface="Alegreya" charset="0"/>
-              <a:cs typeface="Alegreya" charset="0"/>
-            </a:endParaRPr>
           </a:p>
         </p:txBody>
       </p:sp>
@@ -10012,16 +10003,6 @@
               </a:rPr>
               <a:t>tuple</a:t>
             </a:r>
-            <a:endParaRPr lang="en-US" sz="2000" dirty="0" smtClean="0">
-              <a:solidFill>
-                <a:schemeClr val="bg1">
-                  <a:lumMod val="50000"/>
-                </a:schemeClr>
-              </a:solidFill>
-              <a:latin typeface="Alegreya" charset="0"/>
-              <a:ea typeface="Alegreya" charset="0"/>
-              <a:cs typeface="Alegreya" charset="0"/>
-            </a:endParaRPr>
           </a:p>
         </p:txBody>
       </p:sp>
@@ -10628,15 +10609,7 @@
                 <a:ea typeface="Alegreya" charset="0"/>
                 <a:cs typeface="Alegreya" charset="0"/>
               </a:rPr>
-              <a:t>Query </a:t>
-            </a:r>
-            <a:r>
-              <a:rPr lang="en-US" sz="2000" dirty="0" smtClean="0">
-                <a:latin typeface="Alegreya" charset="0"/>
-                <a:ea typeface="Alegreya" charset="0"/>
-                <a:cs typeface="Alegreya" charset="0"/>
-              </a:rPr>
-              <a:t>log</a:t>
+              <a:t>Query log</a:t>
             </a:r>
             <a:endParaRPr lang="en-US" sz="2000" dirty="0">
               <a:latin typeface="Alegreya" charset="0"/>
@@ -11983,11 +11956,6 @@
               </a:rPr>
               <a:t>Tuple, Query, &amp; Attribute Slicing</a:t>
             </a:r>
-            <a:endParaRPr lang="en-US" sz="2000" dirty="0" smtClean="0">
-              <a:latin typeface="Alegreya" charset="0"/>
-              <a:ea typeface="Alegreya" charset="0"/>
-              <a:cs typeface="Alegreya" charset="0"/>
-            </a:endParaRPr>
           </a:p>
         </p:txBody>
       </p:sp>
@@ -12032,11 +12000,6 @@
               </a:rPr>
               <a:t>Incremental Repair</a:t>
             </a:r>
-            <a:endParaRPr lang="en-US" sz="2000" dirty="0" smtClean="0">
-              <a:latin typeface="Alegreya" charset="0"/>
-              <a:ea typeface="Alegreya" charset="0"/>
-              <a:cs typeface="Alegreya" charset="0"/>
-            </a:endParaRPr>
           </a:p>
         </p:txBody>
       </p:sp>
@@ -12157,11 +12120,6 @@
               </a:rPr>
               <a:t>diagnoses &amp;</a:t>
             </a:r>
-            <a:endParaRPr lang="en-US" sz="2000" dirty="0" smtClean="0">
-              <a:latin typeface="Alegreya" charset="0"/>
-              <a:ea typeface="Alegreya" charset="0"/>
-              <a:cs typeface="Alegreya" charset="0"/>
-            </a:endParaRPr>
           </a:p>
           <a:p>
             <a:pPr algn="ctr"/>
@@ -12210,14 +12168,6 @@
               </a:rPr>
               <a:t>Optimizer</a:t>
             </a:r>
-            <a:endParaRPr lang="en-US" sz="2000" dirty="0" smtClean="0">
-              <a:solidFill>
-                <a:srgbClr val="595959"/>
-              </a:solidFill>
-              <a:latin typeface="Alegreya" charset="0"/>
-              <a:ea typeface="Alegreya" charset="0"/>
-              <a:cs typeface="Alegreya" charset="0"/>
-            </a:endParaRPr>
           </a:p>
         </p:txBody>
       </p:sp>
@@ -12525,7 +12475,7 @@
   <p:timing>
     <p:tnLst>
       <p:par>
-        <p:cTn id="1" dur="indefinite" restart="never" nodeType="tmRoot"/>
+        <p:cTn xmlns:p14="http://schemas.microsoft.com/office/powerpoint/2010/main" id="1" dur="indefinite" restart="never" nodeType="tmRoot"/>
       </p:par>
     </p:tnLst>
   </p:timing>
@@ -12549,6 +12499,2679 @@
           <a:chExt cx="0" cy="0"/>
         </a:xfrm>
       </p:grpSpPr>
+      <p:sp>
+        <p:nvSpPr>
+          <p:cNvPr id="55" name="Oval 54"/>
+          <p:cNvSpPr/>
+          <p:nvPr/>
+        </p:nvSpPr>
+        <p:spPr>
+          <a:xfrm>
+            <a:off x="2875999" y="6243482"/>
+            <a:ext cx="178885" cy="178885"/>
+          </a:xfrm>
+          <a:prstGeom prst="ellipse">
+            <a:avLst/>
+          </a:prstGeom>
+          <a:solidFill>
+            <a:srgbClr val="595959"/>
+          </a:solidFill>
+          <a:ln>
+            <a:solidFill>
+              <a:srgbClr val="595959"/>
+            </a:solidFill>
+          </a:ln>
+          <a:effectLst/>
+        </p:spPr>
+        <p:style>
+          <a:lnRef idx="1">
+            <a:schemeClr val="accent1"/>
+          </a:lnRef>
+          <a:fillRef idx="3">
+            <a:schemeClr val="accent1"/>
+          </a:fillRef>
+          <a:effectRef idx="2">
+            <a:schemeClr val="accent1"/>
+          </a:effectRef>
+          <a:fontRef idx="minor">
+            <a:schemeClr val="lt1"/>
+          </a:fontRef>
+        </p:style>
+        <p:txBody>
+          <a:bodyPr rtlCol="0" anchor="ctr"/>
+          <a:lstStyle/>
+          <a:p>
+            <a:pPr algn="ctr"/>
+            <a:endParaRPr lang="en-US" sz="2000">
+              <a:latin typeface="Alegreya" charset="0"/>
+              <a:ea typeface="Alegreya" charset="0"/>
+              <a:cs typeface="Alegreya" charset="0"/>
+            </a:endParaRPr>
+          </a:p>
+        </p:txBody>
+      </p:sp>
+      <p:sp>
+        <p:nvSpPr>
+          <p:cNvPr id="46" name="TextBox 45"/>
+          <p:cNvSpPr txBox="1"/>
+          <p:nvPr/>
+        </p:nvSpPr>
+        <p:spPr>
+          <a:xfrm>
+            <a:off x="3095022" y="6074660"/>
+            <a:ext cx="1309974" cy="400110"/>
+          </a:xfrm>
+          <a:prstGeom prst="rect">
+            <a:avLst/>
+          </a:prstGeom>
+          <a:noFill/>
+          <a:effectLst/>
+        </p:spPr>
+        <p:txBody>
+          <a:bodyPr wrap="none" rtlCol="0">
+            <a:spAutoFit/>
+          </a:bodyPr>
+          <a:lstStyle/>
+          <a:p>
+            <a:r>
+              <a:rPr lang="en-US" sz="2000" dirty="0" smtClean="0">
+                <a:solidFill>
+                  <a:schemeClr val="bg1">
+                    <a:lumMod val="50000"/>
+                  </a:schemeClr>
+                </a:solidFill>
+                <a:latin typeface="Alegreya" charset="0"/>
+                <a:ea typeface="Alegreya" charset="0"/>
+                <a:cs typeface="Alegreya" charset="0"/>
+              </a:rPr>
+              <a:t>error tuple</a:t>
+            </a:r>
+          </a:p>
+        </p:txBody>
+      </p:sp>
+      <p:sp>
+        <p:nvSpPr>
+          <p:cNvPr id="56" name="Oval 55"/>
+          <p:cNvSpPr/>
+          <p:nvPr/>
+        </p:nvSpPr>
+        <p:spPr>
+          <a:xfrm>
+            <a:off x="4997498" y="6243482"/>
+            <a:ext cx="178885" cy="178885"/>
+          </a:xfrm>
+          <a:prstGeom prst="ellipse">
+            <a:avLst/>
+          </a:prstGeom>
+          <a:solidFill>
+            <a:srgbClr val="FFFFFF"/>
+          </a:solidFill>
+          <a:ln>
+            <a:solidFill>
+              <a:srgbClr val="595959"/>
+            </a:solidFill>
+          </a:ln>
+          <a:effectLst/>
+        </p:spPr>
+        <p:style>
+          <a:lnRef idx="1">
+            <a:schemeClr val="accent1"/>
+          </a:lnRef>
+          <a:fillRef idx="3">
+            <a:schemeClr val="accent1"/>
+          </a:fillRef>
+          <a:effectRef idx="2">
+            <a:schemeClr val="accent1"/>
+          </a:effectRef>
+          <a:fontRef idx="minor">
+            <a:schemeClr val="lt1"/>
+          </a:fontRef>
+        </p:style>
+        <p:txBody>
+          <a:bodyPr rtlCol="0" anchor="ctr"/>
+          <a:lstStyle/>
+          <a:p>
+            <a:pPr algn="ctr"/>
+            <a:endParaRPr lang="en-US" sz="2000">
+              <a:latin typeface="Alegreya" charset="0"/>
+              <a:ea typeface="Alegreya" charset="0"/>
+              <a:cs typeface="Alegreya" charset="0"/>
+            </a:endParaRPr>
+          </a:p>
+        </p:txBody>
+      </p:sp>
+      <p:sp>
+        <p:nvSpPr>
+          <p:cNvPr id="51" name="TextBox 50"/>
+          <p:cNvSpPr txBox="1"/>
+          <p:nvPr/>
+        </p:nvSpPr>
+        <p:spPr>
+          <a:xfrm>
+            <a:off x="5192697" y="6074660"/>
+            <a:ext cx="721672" cy="400110"/>
+          </a:xfrm>
+          <a:prstGeom prst="rect">
+            <a:avLst/>
+          </a:prstGeom>
+          <a:noFill/>
+          <a:effectLst/>
+        </p:spPr>
+        <p:txBody>
+          <a:bodyPr wrap="none" rtlCol="0">
+            <a:spAutoFit/>
+          </a:bodyPr>
+          <a:lstStyle/>
+          <a:p>
+            <a:r>
+              <a:rPr lang="en-US" sz="2000" dirty="0" smtClean="0">
+                <a:solidFill>
+                  <a:schemeClr val="bg1">
+                    <a:lumMod val="50000"/>
+                  </a:schemeClr>
+                </a:solidFill>
+                <a:latin typeface="Alegreya" charset="0"/>
+                <a:ea typeface="Alegreya" charset="0"/>
+                <a:cs typeface="Alegreya" charset="0"/>
+              </a:rPr>
+              <a:t>tuple</a:t>
+            </a:r>
+          </a:p>
+        </p:txBody>
+      </p:sp>
+      <p:sp>
+        <p:nvSpPr>
+          <p:cNvPr id="50" name="Rounded Rectangle 49"/>
+          <p:cNvSpPr/>
+          <p:nvPr/>
+        </p:nvSpPr>
+        <p:spPr>
+          <a:xfrm>
+            <a:off x="3067530" y="2617513"/>
+            <a:ext cx="5063801" cy="3100862"/>
+          </a:xfrm>
+          <a:custGeom>
+            <a:avLst/>
+            <a:gdLst/>
+            <a:ahLst/>
+            <a:cxnLst/>
+            <a:rect l="l" t="t" r="r" b="b"/>
+            <a:pathLst>
+              <a:path w="5137259" h="3305206">
+                <a:moveTo>
+                  <a:pt x="3088825" y="0"/>
+                </a:moveTo>
+                <a:lnTo>
+                  <a:pt x="4924404" y="0"/>
+                </a:lnTo>
+                <a:cubicBezTo>
+                  <a:pt x="5041961" y="0"/>
+                  <a:pt x="5137259" y="95298"/>
+                  <a:pt x="5137259" y="212855"/>
+                </a:cubicBezTo>
+                <a:lnTo>
+                  <a:pt x="5137259" y="754941"/>
+                </a:lnTo>
+                <a:lnTo>
+                  <a:pt x="5137259" y="2602411"/>
+                </a:lnTo>
+                <a:lnTo>
+                  <a:pt x="5137259" y="3040205"/>
+                </a:lnTo>
+                <a:cubicBezTo>
+                  <a:pt x="5137259" y="3186561"/>
+                  <a:pt x="5018614" y="3305206"/>
+                  <a:pt x="4872258" y="3305206"/>
+                </a:cubicBezTo>
+                <a:lnTo>
+                  <a:pt x="265001" y="3305206"/>
+                </a:lnTo>
+                <a:cubicBezTo>
+                  <a:pt x="118645" y="3305206"/>
+                  <a:pt x="0" y="3186561"/>
+                  <a:pt x="0" y="3040205"/>
+                </a:cubicBezTo>
+                <a:lnTo>
+                  <a:pt x="0" y="754941"/>
+                </a:lnTo>
+                <a:cubicBezTo>
+                  <a:pt x="0" y="608585"/>
+                  <a:pt x="118645" y="489940"/>
+                  <a:pt x="265001" y="489940"/>
+                </a:cubicBezTo>
+                <a:lnTo>
+                  <a:pt x="2875970" y="489940"/>
+                </a:lnTo>
+                <a:lnTo>
+                  <a:pt x="2875970" y="212855"/>
+                </a:lnTo>
+                <a:cubicBezTo>
+                  <a:pt x="2875970" y="95298"/>
+                  <a:pt x="2971268" y="0"/>
+                  <a:pt x="3088825" y="0"/>
+                </a:cubicBezTo>
+                <a:close/>
+              </a:path>
+            </a:pathLst>
+          </a:custGeom>
+          <a:solidFill>
+            <a:srgbClr val="FFFFFF"/>
+          </a:solidFill>
+          <a:ln w="28575">
+            <a:solidFill>
+              <a:schemeClr val="bg1">
+                <a:lumMod val="50000"/>
+              </a:schemeClr>
+            </a:solidFill>
+            <a:prstDash val="sysDash"/>
+          </a:ln>
+          <a:effectLst/>
+        </p:spPr>
+        <p:style>
+          <a:lnRef idx="1">
+            <a:schemeClr val="accent1"/>
+          </a:lnRef>
+          <a:fillRef idx="3">
+            <a:schemeClr val="accent1"/>
+          </a:fillRef>
+          <a:effectRef idx="2">
+            <a:schemeClr val="accent1"/>
+          </a:effectRef>
+          <a:fontRef idx="minor">
+            <a:schemeClr val="lt1"/>
+          </a:fontRef>
+        </p:style>
+        <p:txBody>
+          <a:bodyPr rtlCol="0" anchor="ctr"/>
+          <a:lstStyle/>
+          <a:p>
+            <a:pPr algn="ctr"/>
+            <a:endParaRPr lang="en-US" sz="2000">
+              <a:latin typeface="Alegreya" charset="0"/>
+              <a:ea typeface="Alegreya" charset="0"/>
+              <a:cs typeface="Alegreya" charset="0"/>
+            </a:endParaRPr>
+          </a:p>
+        </p:txBody>
+      </p:sp>
+      <p:sp>
+        <p:nvSpPr>
+          <p:cNvPr id="54" name="Rounded Rectangle 53"/>
+          <p:cNvSpPr/>
+          <p:nvPr/>
+        </p:nvSpPr>
+        <p:spPr>
+          <a:xfrm>
+            <a:off x="5637209" y="3175460"/>
+            <a:ext cx="2429185" cy="2453568"/>
+          </a:xfrm>
+          <a:custGeom>
+            <a:avLst/>
+            <a:gdLst/>
+            <a:ahLst/>
+            <a:cxnLst/>
+            <a:rect l="l" t="t" r="r" b="b"/>
+            <a:pathLst>
+              <a:path w="2429185" h="2673836">
+                <a:moveTo>
+                  <a:pt x="1027397" y="0"/>
+                </a:moveTo>
+                <a:lnTo>
+                  <a:pt x="2319171" y="0"/>
+                </a:lnTo>
+                <a:cubicBezTo>
+                  <a:pt x="2379930" y="0"/>
+                  <a:pt x="2429185" y="49255"/>
+                  <a:pt x="2429185" y="110014"/>
+                </a:cubicBezTo>
+                <a:lnTo>
+                  <a:pt x="2429185" y="625549"/>
+                </a:lnTo>
+                <a:lnTo>
+                  <a:pt x="2429185" y="1493214"/>
+                </a:lnTo>
+                <a:lnTo>
+                  <a:pt x="2429185" y="2513084"/>
+                </a:lnTo>
+                <a:cubicBezTo>
+                  <a:pt x="2429185" y="2601865"/>
+                  <a:pt x="2357214" y="2673836"/>
+                  <a:pt x="2268433" y="2673836"/>
+                </a:cubicBezTo>
+                <a:lnTo>
+                  <a:pt x="160752" y="2673836"/>
+                </a:lnTo>
+                <a:cubicBezTo>
+                  <a:pt x="71971" y="2673836"/>
+                  <a:pt x="0" y="2601865"/>
+                  <a:pt x="0" y="2513084"/>
+                </a:cubicBezTo>
+                <a:lnTo>
+                  <a:pt x="0" y="625549"/>
+                </a:lnTo>
+                <a:cubicBezTo>
+                  <a:pt x="0" y="536768"/>
+                  <a:pt x="71971" y="464797"/>
+                  <a:pt x="160752" y="464797"/>
+                </a:cubicBezTo>
+                <a:lnTo>
+                  <a:pt x="917383" y="464797"/>
+                </a:lnTo>
+                <a:lnTo>
+                  <a:pt x="917383" y="110014"/>
+                </a:lnTo>
+                <a:cubicBezTo>
+                  <a:pt x="917383" y="49255"/>
+                  <a:pt x="966638" y="0"/>
+                  <a:pt x="1027397" y="0"/>
+                </a:cubicBezTo>
+                <a:close/>
+              </a:path>
+            </a:pathLst>
+          </a:custGeom>
+          <a:solidFill>
+            <a:schemeClr val="bg1">
+              <a:lumMod val="95000"/>
+            </a:schemeClr>
+          </a:solidFill>
+          <a:ln w="28575">
+            <a:solidFill>
+              <a:schemeClr val="bg1">
+                <a:lumMod val="50000"/>
+              </a:schemeClr>
+            </a:solidFill>
+            <a:prstDash val="sysDash"/>
+          </a:ln>
+          <a:effectLst/>
+        </p:spPr>
+        <p:style>
+          <a:lnRef idx="1">
+            <a:schemeClr val="accent1"/>
+          </a:lnRef>
+          <a:fillRef idx="3">
+            <a:schemeClr val="accent1"/>
+          </a:fillRef>
+          <a:effectRef idx="2">
+            <a:schemeClr val="accent1"/>
+          </a:effectRef>
+          <a:fontRef idx="minor">
+            <a:schemeClr val="lt1"/>
+          </a:fontRef>
+        </p:style>
+        <p:txBody>
+          <a:bodyPr rtlCol="0" anchor="ctr"/>
+          <a:lstStyle/>
+          <a:p>
+            <a:pPr algn="ctr"/>
+            <a:endParaRPr lang="en-US" sz="2000">
+              <a:latin typeface="Alegreya" charset="0"/>
+              <a:ea typeface="Alegreya" charset="0"/>
+              <a:cs typeface="Alegreya" charset="0"/>
+            </a:endParaRPr>
+          </a:p>
+        </p:txBody>
+      </p:sp>
+      <p:sp>
+        <p:nvSpPr>
+          <p:cNvPr id="38" name="Down Arrow 37"/>
+          <p:cNvSpPr/>
+          <p:nvPr/>
+        </p:nvSpPr>
+        <p:spPr>
+          <a:xfrm>
+            <a:off x="4085664" y="2417342"/>
+            <a:ext cx="296173" cy="946530"/>
+          </a:xfrm>
+          <a:prstGeom prst="downArrow">
+            <a:avLst>
+              <a:gd name="adj1" fmla="val 63385"/>
+              <a:gd name="adj2" fmla="val 50000"/>
+            </a:avLst>
+          </a:prstGeom>
+          <a:solidFill>
+            <a:schemeClr val="bg1"/>
+          </a:solidFill>
+          <a:ln w="28575">
+            <a:solidFill>
+              <a:schemeClr val="bg1">
+                <a:lumMod val="50000"/>
+              </a:schemeClr>
+            </a:solidFill>
+            <a:prstDash val="solid"/>
+          </a:ln>
+          <a:effectLst/>
+        </p:spPr>
+        <p:style>
+          <a:lnRef idx="1">
+            <a:schemeClr val="accent1"/>
+          </a:lnRef>
+          <a:fillRef idx="3">
+            <a:schemeClr val="accent1"/>
+          </a:fillRef>
+          <a:effectRef idx="2">
+            <a:schemeClr val="accent1"/>
+          </a:effectRef>
+          <a:fontRef idx="minor">
+            <a:schemeClr val="lt1"/>
+          </a:fontRef>
+        </p:style>
+        <p:txBody>
+          <a:bodyPr rtlCol="0" anchor="ctr"/>
+          <a:lstStyle/>
+          <a:p>
+            <a:pPr algn="ctr"/>
+            <a:endParaRPr lang="en-US" sz="2000">
+              <a:latin typeface="Alegreya" charset="0"/>
+              <a:ea typeface="Alegreya" charset="0"/>
+              <a:cs typeface="Alegreya" charset="0"/>
+            </a:endParaRPr>
+          </a:p>
+        </p:txBody>
+      </p:sp>
+      <p:sp>
+        <p:nvSpPr>
+          <p:cNvPr id="5" name="Folded Corner 4"/>
+          <p:cNvSpPr/>
+          <p:nvPr/>
+        </p:nvSpPr>
+        <p:spPr>
+          <a:xfrm>
+            <a:off x="891367" y="3207045"/>
+            <a:ext cx="1438083" cy="2511330"/>
+          </a:xfrm>
+          <a:prstGeom prst="foldedCorner">
+            <a:avLst/>
+          </a:prstGeom>
+          <a:solidFill>
+            <a:schemeClr val="bg1"/>
+          </a:solidFill>
+          <a:ln w="28575">
+            <a:solidFill>
+              <a:schemeClr val="bg1">
+                <a:lumMod val="50000"/>
+              </a:schemeClr>
+            </a:solidFill>
+          </a:ln>
+          <a:effectLst/>
+        </p:spPr>
+        <p:style>
+          <a:lnRef idx="1">
+            <a:schemeClr val="accent1"/>
+          </a:lnRef>
+          <a:fillRef idx="3">
+            <a:schemeClr val="accent1"/>
+          </a:fillRef>
+          <a:effectRef idx="2">
+            <a:schemeClr val="accent1"/>
+          </a:effectRef>
+          <a:fontRef idx="minor">
+            <a:schemeClr val="lt1"/>
+          </a:fontRef>
+        </p:style>
+        <p:txBody>
+          <a:bodyPr rtlCol="0" anchor="ctr"/>
+          <a:lstStyle/>
+          <a:p>
+            <a:pPr algn="ctr"/>
+            <a:endParaRPr lang="en-US" sz="2000">
+              <a:latin typeface="Alegreya" charset="0"/>
+              <a:ea typeface="Alegreya" charset="0"/>
+              <a:cs typeface="Alegreya" charset="0"/>
+            </a:endParaRPr>
+          </a:p>
+        </p:txBody>
+      </p:sp>
+      <p:sp>
+        <p:nvSpPr>
+          <p:cNvPr id="4" name="TextBox 3"/>
+          <p:cNvSpPr txBox="1"/>
+          <p:nvPr/>
+        </p:nvSpPr>
+        <p:spPr>
+          <a:xfrm>
+            <a:off x="891367" y="3635689"/>
+            <a:ext cx="1484152" cy="1708160"/>
+          </a:xfrm>
+          <a:prstGeom prst="rect">
+            <a:avLst/>
+          </a:prstGeom>
+          <a:noFill/>
+          <a:effectLst/>
+        </p:spPr>
+        <p:txBody>
+          <a:bodyPr wrap="square" rtlCol="0">
+            <a:spAutoFit/>
+          </a:bodyPr>
+          <a:lstStyle/>
+          <a:p>
+            <a:r>
+              <a:rPr lang="en-US" sz="350" dirty="0" smtClean="0">
+                <a:solidFill>
+                  <a:schemeClr val="tx1">
+                    <a:lumMod val="65000"/>
+                    <a:lumOff val="35000"/>
+                  </a:schemeClr>
+                </a:solidFill>
+                <a:latin typeface="Alegreya" charset="0"/>
+                <a:ea typeface="Alegreya" charset="0"/>
+                <a:cs typeface="Alegreya" charset="0"/>
+              </a:rPr>
+              <a:t>UPDATE CUSTOMER SET C_BALANCE = C_BALANCE + ? WHERE C_ID = ? AND C_D_ID = ? AND C_W_ID = ? UPDATE CUSTOMER SET C_BALANCE = ?, C_YTD_PAYMENT = ?, C_PAYMENT_CNT = ?, C_DATA = ? WHERE C_W_ID = ? AND C_D_ID = ? AND C_ID = ?</a:t>
+            </a:r>
+          </a:p>
+          <a:p>
+            <a:r>
+              <a:rPr lang="en-US" sz="350" dirty="0" smtClean="0">
+                <a:solidFill>
+                  <a:schemeClr val="tx1">
+                    <a:lumMod val="65000"/>
+                    <a:lumOff val="35000"/>
+                  </a:schemeClr>
+                </a:solidFill>
+                <a:latin typeface="Alegreya" charset="0"/>
+                <a:ea typeface="Alegreya" charset="0"/>
+                <a:cs typeface="Alegreya" charset="0"/>
+              </a:rPr>
+              <a:t>UPDATE WAREHOUSE SET W_YTD = W_YTD + ? WHERE W_ID = ? </a:t>
+            </a:r>
+          </a:p>
+          <a:p>
+            <a:r>
+              <a:rPr lang="en-US" sz="350" dirty="0" smtClean="0">
+                <a:solidFill>
+                  <a:schemeClr val="tx1">
+                    <a:lumMod val="65000"/>
+                    <a:lumOff val="35000"/>
+                  </a:schemeClr>
+                </a:solidFill>
+                <a:latin typeface="Alegreya" charset="0"/>
+                <a:ea typeface="Alegreya" charset="0"/>
+                <a:cs typeface="Alegreya" charset="0"/>
+              </a:rPr>
+              <a:t>UPDATE ORDERS SET O_CARRIER_ID = ? WHERE O_ID = ? AND O_D_ID = ? AND O_W_ID = ?</a:t>
+            </a:r>
+          </a:p>
+          <a:p>
+            <a:r>
+              <a:rPr lang="en-US" sz="350" dirty="0" smtClean="0">
+                <a:solidFill>
+                  <a:schemeClr val="tx1">
+                    <a:lumMod val="65000"/>
+                    <a:lumOff val="35000"/>
+                  </a:schemeClr>
+                </a:solidFill>
+                <a:latin typeface="Alegreya" charset="0"/>
+                <a:ea typeface="Alegreya" charset="0"/>
+                <a:cs typeface="Alegreya" charset="0"/>
+              </a:rPr>
+              <a:t>UPDATE CUSTOMER SET C_BALANCE = ?, C_YTD_PAYMENT = ?, C_PAYMENT_CNT = ? WHERE C_W_ID = ? AND C_D_ID = ? AND C_ID = ?</a:t>
+            </a:r>
+          </a:p>
+          <a:p>
+            <a:r>
+              <a:rPr lang="en-US" sz="350" dirty="0" smtClean="0">
+                <a:solidFill>
+                  <a:schemeClr val="tx1">
+                    <a:lumMod val="65000"/>
+                    <a:lumOff val="35000"/>
+                  </a:schemeClr>
+                </a:solidFill>
+                <a:latin typeface="Alegreya" charset="0"/>
+                <a:ea typeface="Alegreya" charset="0"/>
+                <a:cs typeface="Alegreya" charset="0"/>
+              </a:rPr>
+              <a:t>INSERT INTO NEW_ORDER (NO_O_ID, NO_D_ID, NO_W_ID) VALUES (?, ?, ?)</a:t>
+            </a:r>
+          </a:p>
+          <a:p>
+            <a:r>
+              <a:rPr lang="en-US" sz="350" dirty="0" smtClean="0">
+                <a:solidFill>
+                  <a:schemeClr val="tx1">
+                    <a:lumMod val="65000"/>
+                    <a:lumOff val="35000"/>
+                  </a:schemeClr>
+                </a:solidFill>
+                <a:latin typeface="Alegreya" charset="0"/>
+                <a:ea typeface="Alegreya" charset="0"/>
+                <a:cs typeface="Alegreya" charset="0"/>
+              </a:rPr>
+              <a:t>UPDATE STOCK SET S_QUANTITY = ?, S_YTD = ?, S_ORDER_CNT = ?, S_REMOTE_CNT = ? WHERE S_I_ID = ? AND S_W_ID = ?</a:t>
+            </a:r>
+          </a:p>
+          <a:p>
+            <a:r>
+              <a:rPr lang="en-US" sz="350" dirty="0" smtClean="0">
+                <a:solidFill>
+                  <a:schemeClr val="tx1">
+                    <a:lumMod val="65000"/>
+                    <a:lumOff val="35000"/>
+                  </a:schemeClr>
+                </a:solidFill>
+                <a:latin typeface="Alegreya" charset="0"/>
+                <a:ea typeface="Alegreya" charset="0"/>
+                <a:cs typeface="Alegreya" charset="0"/>
+              </a:rPr>
+              <a:t>UPDATE DISTRICT SET D_YTD = D_YTD + ? WHERE D_W_ID  = ? AND D_ID = ?</a:t>
+            </a:r>
+          </a:p>
+          <a:p>
+            <a:r>
+              <a:rPr lang="en-US" sz="350" dirty="0" smtClean="0">
+                <a:solidFill>
+                  <a:schemeClr val="tx1">
+                    <a:lumMod val="65000"/>
+                    <a:lumOff val="35000"/>
+                  </a:schemeClr>
+                </a:solidFill>
+                <a:latin typeface="Alegreya" charset="0"/>
+                <a:ea typeface="Alegreya" charset="0"/>
+                <a:cs typeface="Alegreya" charset="0"/>
+              </a:rPr>
+              <a:t>UPDATE DISTRICT SET D_NEXT_O_ID = ? WHERE D_ID = ? AND D_W_ID = ?</a:t>
+            </a:r>
+          </a:p>
+          <a:p>
+            <a:r>
+              <a:rPr lang="en-US" sz="350" dirty="0" smtClean="0">
+                <a:solidFill>
+                  <a:schemeClr val="tx1">
+                    <a:lumMod val="65000"/>
+                    <a:lumOff val="35000"/>
+                  </a:schemeClr>
+                </a:solidFill>
+                <a:latin typeface="Alegreya" charset="0"/>
+                <a:ea typeface="Alegreya" charset="0"/>
+                <a:cs typeface="Alegreya" charset="0"/>
+              </a:rPr>
+              <a:t>INSERT INTO HISTORY VALUES (?, ?, ?, ?, ?, ?, ?, ?)</a:t>
+            </a:r>
+          </a:p>
+          <a:p>
+            <a:r>
+              <a:rPr lang="en-US" sz="350" dirty="0" smtClean="0">
+                <a:solidFill>
+                  <a:schemeClr val="tx1">
+                    <a:lumMod val="65000"/>
+                    <a:lumOff val="35000"/>
+                  </a:schemeClr>
+                </a:solidFill>
+                <a:latin typeface="Alegreya" charset="0"/>
+                <a:ea typeface="Alegreya" charset="0"/>
+                <a:cs typeface="Alegreya" charset="0"/>
+              </a:rPr>
+              <a:t>INSERT INTO ORDERS (O_ID, O_D_ID, O_W_ID, O_C_ID, O_ENTRY_D, O_CARRIER_ID, O_OL_CNT, O_ALL_LOCAL) VALUES (?, ?, ?, ?, ?, ?, ?, ?)</a:t>
+            </a:r>
+          </a:p>
+          <a:p>
+            <a:r>
+              <a:rPr lang="en-US" sz="350" dirty="0" smtClean="0">
+                <a:solidFill>
+                  <a:schemeClr val="tx1">
+                    <a:lumMod val="65000"/>
+                    <a:lumOff val="35000"/>
+                  </a:schemeClr>
+                </a:solidFill>
+                <a:latin typeface="Alegreya" charset="0"/>
+                <a:ea typeface="Alegreya" charset="0"/>
+                <a:cs typeface="Alegreya" charset="0"/>
+              </a:rPr>
+              <a:t>DELETE FROM NEW_ORDER WHERE NO_D_ID = ? AND NO_W_ID = ? AND NO_O_ID = ?</a:t>
+            </a:r>
+          </a:p>
+          <a:p>
+            <a:r>
+              <a:rPr lang="en-US" sz="350" dirty="0" smtClean="0">
+                <a:solidFill>
+                  <a:schemeClr val="tx1">
+                    <a:lumMod val="65000"/>
+                    <a:lumOff val="35000"/>
+                  </a:schemeClr>
+                </a:solidFill>
+                <a:latin typeface="Alegreya" charset="0"/>
+                <a:ea typeface="Alegreya" charset="0"/>
+                <a:cs typeface="Alegreya" charset="0"/>
+              </a:rPr>
+              <a:t>INSERT INTO ORDER_LINE (OL_O_ID, OL_D_ID, OL_W_ID, OL_NUMBER, OL_I_ID, OL_SUPPLY_W_ID, OL_DELIVERY_D, OL_QUANTITY, OL_AMOUNT, OL_DIST_INFO) VALUES (?, ?, ?, ?, ?, ?, ?, ?, ?, ?)</a:t>
+            </a:r>
+          </a:p>
+          <a:p>
+            <a:r>
+              <a:rPr lang="en-US" sz="350" dirty="0" smtClean="0">
+                <a:solidFill>
+                  <a:schemeClr val="tx1">
+                    <a:lumMod val="65000"/>
+                    <a:lumOff val="35000"/>
+                  </a:schemeClr>
+                </a:solidFill>
+                <a:latin typeface="Alegreya" charset="0"/>
+                <a:ea typeface="Alegreya" charset="0"/>
+                <a:cs typeface="Alegreya" charset="0"/>
+              </a:rPr>
+              <a:t>UPDATE ORDER_LINE SET OL_DELIVERY_D = ? WHERE OL_O_ID = ? AND OL_D_ID = ? AND OL_W_ID = ?</a:t>
+            </a:r>
+          </a:p>
+        </p:txBody>
+      </p:sp>
+      <p:sp>
+        <p:nvSpPr>
+          <p:cNvPr id="6" name="TextBox 5"/>
+          <p:cNvSpPr txBox="1"/>
+          <p:nvPr/>
+        </p:nvSpPr>
+        <p:spPr>
+          <a:xfrm>
+            <a:off x="891464" y="3235582"/>
+            <a:ext cx="1202573" cy="400110"/>
+          </a:xfrm>
+          <a:prstGeom prst="rect">
+            <a:avLst/>
+          </a:prstGeom>
+          <a:noFill/>
+          <a:effectLst/>
+        </p:spPr>
+        <p:txBody>
+          <a:bodyPr wrap="none" rtlCol="0">
+            <a:spAutoFit/>
+          </a:bodyPr>
+          <a:lstStyle/>
+          <a:p>
+            <a:r>
+              <a:rPr lang="en-US" sz="2000" dirty="0" smtClean="0">
+                <a:latin typeface="Alegreya" charset="0"/>
+                <a:ea typeface="Alegreya" charset="0"/>
+                <a:cs typeface="Alegreya" charset="0"/>
+              </a:rPr>
+              <a:t>Query log</a:t>
+            </a:r>
+            <a:endParaRPr lang="en-US" sz="2000" dirty="0">
+              <a:latin typeface="Alegreya" charset="0"/>
+              <a:ea typeface="Alegreya" charset="0"/>
+              <a:cs typeface="Alegreya" charset="0"/>
+            </a:endParaRPr>
+          </a:p>
+        </p:txBody>
+      </p:sp>
+      <p:grpSp>
+        <p:nvGrpSpPr>
+          <p:cNvPr id="44" name="Group 43"/>
+          <p:cNvGrpSpPr/>
+          <p:nvPr/>
+        </p:nvGrpSpPr>
+        <p:grpSpPr>
+          <a:xfrm>
+            <a:off x="3157134" y="1448032"/>
+            <a:ext cx="2139217" cy="178885"/>
+            <a:chOff x="3157134" y="1063984"/>
+            <a:chExt cx="2139217" cy="178885"/>
+          </a:xfrm>
+          <a:effectLst/>
+        </p:grpSpPr>
+        <p:sp>
+          <p:nvSpPr>
+            <p:cNvPr id="2" name="Oval 1"/>
+            <p:cNvSpPr/>
+            <p:nvPr/>
+          </p:nvSpPr>
+          <p:spPr>
+            <a:xfrm>
+              <a:off x="3157134" y="1063984"/>
+              <a:ext cx="178885" cy="178885"/>
+            </a:xfrm>
+            <a:prstGeom prst="ellipse">
+              <a:avLst/>
+            </a:prstGeom>
+            <a:solidFill>
+              <a:srgbClr val="FFFFFF"/>
+            </a:solidFill>
+            <a:ln>
+              <a:solidFill>
+                <a:srgbClr val="595959"/>
+              </a:solidFill>
+            </a:ln>
+            <a:effectLst/>
+          </p:spPr>
+          <p:style>
+            <a:lnRef idx="1">
+              <a:schemeClr val="accent1"/>
+            </a:lnRef>
+            <a:fillRef idx="3">
+              <a:schemeClr val="accent1"/>
+            </a:fillRef>
+            <a:effectRef idx="2">
+              <a:schemeClr val="accent1"/>
+            </a:effectRef>
+            <a:fontRef idx="minor">
+              <a:schemeClr val="lt1"/>
+            </a:fontRef>
+          </p:style>
+          <p:txBody>
+            <a:bodyPr rtlCol="0" anchor="ctr"/>
+            <a:lstStyle/>
+            <a:p>
+              <a:pPr algn="ctr"/>
+              <a:endParaRPr lang="en-US" sz="2000">
+                <a:latin typeface="Alegreya" charset="0"/>
+                <a:ea typeface="Alegreya" charset="0"/>
+                <a:cs typeface="Alegreya" charset="0"/>
+              </a:endParaRPr>
+            </a:p>
+          </p:txBody>
+        </p:sp>
+        <p:sp>
+          <p:nvSpPr>
+            <p:cNvPr id="8" name="Oval 7"/>
+            <p:cNvSpPr/>
+            <p:nvPr/>
+          </p:nvSpPr>
+          <p:spPr>
+            <a:xfrm>
+              <a:off x="3483856" y="1063984"/>
+              <a:ext cx="178885" cy="178885"/>
+            </a:xfrm>
+            <a:prstGeom prst="ellipse">
+              <a:avLst/>
+            </a:prstGeom>
+            <a:solidFill>
+              <a:srgbClr val="FFFFFF"/>
+            </a:solidFill>
+            <a:ln>
+              <a:solidFill>
+                <a:srgbClr val="595959"/>
+              </a:solidFill>
+            </a:ln>
+            <a:effectLst/>
+          </p:spPr>
+          <p:style>
+            <a:lnRef idx="1">
+              <a:schemeClr val="accent1"/>
+            </a:lnRef>
+            <a:fillRef idx="3">
+              <a:schemeClr val="accent1"/>
+            </a:fillRef>
+            <a:effectRef idx="2">
+              <a:schemeClr val="accent1"/>
+            </a:effectRef>
+            <a:fontRef idx="minor">
+              <a:schemeClr val="lt1"/>
+            </a:fontRef>
+          </p:style>
+          <p:txBody>
+            <a:bodyPr rtlCol="0" anchor="ctr"/>
+            <a:lstStyle/>
+            <a:p>
+              <a:pPr algn="ctr"/>
+              <a:endParaRPr lang="en-US" sz="2000">
+                <a:latin typeface="Alegreya" charset="0"/>
+                <a:ea typeface="Alegreya" charset="0"/>
+                <a:cs typeface="Alegreya" charset="0"/>
+              </a:endParaRPr>
+            </a:p>
+          </p:txBody>
+        </p:sp>
+        <p:sp>
+          <p:nvSpPr>
+            <p:cNvPr id="9" name="Oval 8"/>
+            <p:cNvSpPr/>
+            <p:nvPr/>
+          </p:nvSpPr>
+          <p:spPr>
+            <a:xfrm>
+              <a:off x="3810578" y="1063984"/>
+              <a:ext cx="178885" cy="178885"/>
+            </a:xfrm>
+            <a:prstGeom prst="ellipse">
+              <a:avLst/>
+            </a:prstGeom>
+            <a:solidFill>
+              <a:schemeClr val="tx1">
+                <a:lumMod val="65000"/>
+                <a:lumOff val="35000"/>
+              </a:schemeClr>
+            </a:solidFill>
+            <a:ln>
+              <a:solidFill>
+                <a:srgbClr val="595959"/>
+              </a:solidFill>
+            </a:ln>
+            <a:effectLst/>
+          </p:spPr>
+          <p:style>
+            <a:lnRef idx="1">
+              <a:schemeClr val="accent1"/>
+            </a:lnRef>
+            <a:fillRef idx="3">
+              <a:schemeClr val="accent1"/>
+            </a:fillRef>
+            <a:effectRef idx="2">
+              <a:schemeClr val="accent1"/>
+            </a:effectRef>
+            <a:fontRef idx="minor">
+              <a:schemeClr val="lt1"/>
+            </a:fontRef>
+          </p:style>
+          <p:txBody>
+            <a:bodyPr rtlCol="0" anchor="ctr"/>
+            <a:lstStyle/>
+            <a:p>
+              <a:pPr algn="ctr"/>
+              <a:endParaRPr lang="en-US" sz="2000">
+                <a:latin typeface="Alegreya" charset="0"/>
+                <a:ea typeface="Alegreya" charset="0"/>
+                <a:cs typeface="Alegreya" charset="0"/>
+              </a:endParaRPr>
+            </a:p>
+          </p:txBody>
+        </p:sp>
+        <p:sp>
+          <p:nvSpPr>
+            <p:cNvPr id="10" name="Oval 9"/>
+            <p:cNvSpPr/>
+            <p:nvPr/>
+          </p:nvSpPr>
+          <p:spPr>
+            <a:xfrm>
+              <a:off x="4137300" y="1063984"/>
+              <a:ext cx="178885" cy="178885"/>
+            </a:xfrm>
+            <a:prstGeom prst="ellipse">
+              <a:avLst/>
+            </a:prstGeom>
+            <a:solidFill>
+              <a:srgbClr val="595959"/>
+            </a:solidFill>
+            <a:ln>
+              <a:solidFill>
+                <a:srgbClr val="595959"/>
+              </a:solidFill>
+            </a:ln>
+            <a:effectLst/>
+          </p:spPr>
+          <p:style>
+            <a:lnRef idx="1">
+              <a:schemeClr val="accent1"/>
+            </a:lnRef>
+            <a:fillRef idx="3">
+              <a:schemeClr val="accent1"/>
+            </a:fillRef>
+            <a:effectRef idx="2">
+              <a:schemeClr val="accent1"/>
+            </a:effectRef>
+            <a:fontRef idx="minor">
+              <a:schemeClr val="lt1"/>
+            </a:fontRef>
+          </p:style>
+          <p:txBody>
+            <a:bodyPr rtlCol="0" anchor="ctr"/>
+            <a:lstStyle/>
+            <a:p>
+              <a:pPr algn="ctr"/>
+              <a:endParaRPr lang="en-US" sz="2000">
+                <a:latin typeface="Alegreya" charset="0"/>
+                <a:ea typeface="Alegreya" charset="0"/>
+                <a:cs typeface="Alegreya" charset="0"/>
+              </a:endParaRPr>
+            </a:p>
+          </p:txBody>
+        </p:sp>
+        <p:sp>
+          <p:nvSpPr>
+            <p:cNvPr id="11" name="Oval 10"/>
+            <p:cNvSpPr/>
+            <p:nvPr/>
+          </p:nvSpPr>
+          <p:spPr>
+            <a:xfrm>
+              <a:off x="4464022" y="1063984"/>
+              <a:ext cx="178885" cy="178885"/>
+            </a:xfrm>
+            <a:prstGeom prst="ellipse">
+              <a:avLst/>
+            </a:prstGeom>
+            <a:solidFill>
+              <a:srgbClr val="595959"/>
+            </a:solidFill>
+            <a:ln>
+              <a:solidFill>
+                <a:srgbClr val="595959"/>
+              </a:solidFill>
+            </a:ln>
+            <a:effectLst/>
+          </p:spPr>
+          <p:style>
+            <a:lnRef idx="1">
+              <a:schemeClr val="accent1"/>
+            </a:lnRef>
+            <a:fillRef idx="3">
+              <a:schemeClr val="accent1"/>
+            </a:fillRef>
+            <a:effectRef idx="2">
+              <a:schemeClr val="accent1"/>
+            </a:effectRef>
+            <a:fontRef idx="minor">
+              <a:schemeClr val="lt1"/>
+            </a:fontRef>
+          </p:style>
+          <p:txBody>
+            <a:bodyPr rtlCol="0" anchor="ctr"/>
+            <a:lstStyle/>
+            <a:p>
+              <a:pPr algn="ctr"/>
+              <a:endParaRPr lang="en-US" sz="2000">
+                <a:latin typeface="Alegreya" charset="0"/>
+                <a:ea typeface="Alegreya" charset="0"/>
+                <a:cs typeface="Alegreya" charset="0"/>
+              </a:endParaRPr>
+            </a:p>
+          </p:txBody>
+        </p:sp>
+        <p:sp>
+          <p:nvSpPr>
+            <p:cNvPr id="12" name="Oval 11"/>
+            <p:cNvSpPr/>
+            <p:nvPr/>
+          </p:nvSpPr>
+          <p:spPr>
+            <a:xfrm>
+              <a:off x="4790744" y="1063984"/>
+              <a:ext cx="178885" cy="178885"/>
+            </a:xfrm>
+            <a:prstGeom prst="ellipse">
+              <a:avLst/>
+            </a:prstGeom>
+            <a:solidFill>
+              <a:srgbClr val="FFFFFF"/>
+            </a:solidFill>
+            <a:ln>
+              <a:solidFill>
+                <a:srgbClr val="595959"/>
+              </a:solidFill>
+            </a:ln>
+            <a:effectLst/>
+          </p:spPr>
+          <p:style>
+            <a:lnRef idx="1">
+              <a:schemeClr val="accent1"/>
+            </a:lnRef>
+            <a:fillRef idx="3">
+              <a:schemeClr val="accent1"/>
+            </a:fillRef>
+            <a:effectRef idx="2">
+              <a:schemeClr val="accent1"/>
+            </a:effectRef>
+            <a:fontRef idx="minor">
+              <a:schemeClr val="lt1"/>
+            </a:fontRef>
+          </p:style>
+          <p:txBody>
+            <a:bodyPr rtlCol="0" anchor="ctr"/>
+            <a:lstStyle/>
+            <a:p>
+              <a:pPr algn="ctr"/>
+              <a:endParaRPr lang="en-US" sz="2000">
+                <a:latin typeface="Alegreya" charset="0"/>
+                <a:ea typeface="Alegreya" charset="0"/>
+                <a:cs typeface="Alegreya" charset="0"/>
+              </a:endParaRPr>
+            </a:p>
+          </p:txBody>
+        </p:sp>
+        <p:sp>
+          <p:nvSpPr>
+            <p:cNvPr id="13" name="Oval 12"/>
+            <p:cNvSpPr/>
+            <p:nvPr/>
+          </p:nvSpPr>
+          <p:spPr>
+            <a:xfrm>
+              <a:off x="5117466" y="1063984"/>
+              <a:ext cx="178885" cy="178885"/>
+            </a:xfrm>
+            <a:prstGeom prst="ellipse">
+              <a:avLst/>
+            </a:prstGeom>
+            <a:solidFill>
+              <a:srgbClr val="FFFFFF"/>
+            </a:solidFill>
+            <a:ln>
+              <a:solidFill>
+                <a:srgbClr val="595959"/>
+              </a:solidFill>
+            </a:ln>
+            <a:effectLst/>
+          </p:spPr>
+          <p:style>
+            <a:lnRef idx="1">
+              <a:schemeClr val="accent1"/>
+            </a:lnRef>
+            <a:fillRef idx="3">
+              <a:schemeClr val="accent1"/>
+            </a:fillRef>
+            <a:effectRef idx="2">
+              <a:schemeClr val="accent1"/>
+            </a:effectRef>
+            <a:fontRef idx="minor">
+              <a:schemeClr val="lt1"/>
+            </a:fontRef>
+          </p:style>
+          <p:txBody>
+            <a:bodyPr rtlCol="0" anchor="ctr"/>
+            <a:lstStyle/>
+            <a:p>
+              <a:pPr algn="ctr"/>
+              <a:endParaRPr lang="en-US" sz="2000">
+                <a:latin typeface="Alegreya" charset="0"/>
+                <a:ea typeface="Alegreya" charset="0"/>
+                <a:cs typeface="Alegreya" charset="0"/>
+              </a:endParaRPr>
+            </a:p>
+          </p:txBody>
+        </p:sp>
+      </p:grpSp>
+      <p:grpSp>
+        <p:nvGrpSpPr>
+          <p:cNvPr id="36" name="Group 35"/>
+          <p:cNvGrpSpPr/>
+          <p:nvPr/>
+        </p:nvGrpSpPr>
+        <p:grpSpPr>
+          <a:xfrm>
+            <a:off x="3157134" y="1696816"/>
+            <a:ext cx="2139217" cy="178885"/>
+            <a:chOff x="3157134" y="1312768"/>
+            <a:chExt cx="2139217" cy="178885"/>
+          </a:xfrm>
+          <a:effectLst/>
+        </p:grpSpPr>
+        <p:sp>
+          <p:nvSpPr>
+            <p:cNvPr id="14" name="Oval 13"/>
+            <p:cNvSpPr/>
+            <p:nvPr/>
+          </p:nvSpPr>
+          <p:spPr>
+            <a:xfrm>
+              <a:off x="3157134" y="1312768"/>
+              <a:ext cx="178885" cy="178885"/>
+            </a:xfrm>
+            <a:prstGeom prst="ellipse">
+              <a:avLst/>
+            </a:prstGeom>
+            <a:solidFill>
+              <a:srgbClr val="FFFFFF"/>
+            </a:solidFill>
+            <a:ln>
+              <a:solidFill>
+                <a:srgbClr val="595959"/>
+              </a:solidFill>
+            </a:ln>
+            <a:effectLst/>
+          </p:spPr>
+          <p:style>
+            <a:lnRef idx="1">
+              <a:schemeClr val="accent1"/>
+            </a:lnRef>
+            <a:fillRef idx="3">
+              <a:schemeClr val="accent1"/>
+            </a:fillRef>
+            <a:effectRef idx="2">
+              <a:schemeClr val="accent1"/>
+            </a:effectRef>
+            <a:fontRef idx="minor">
+              <a:schemeClr val="lt1"/>
+            </a:fontRef>
+          </p:style>
+          <p:txBody>
+            <a:bodyPr rtlCol="0" anchor="ctr"/>
+            <a:lstStyle/>
+            <a:p>
+              <a:pPr algn="ctr"/>
+              <a:endParaRPr lang="en-US" sz="2000">
+                <a:latin typeface="Alegreya" charset="0"/>
+                <a:ea typeface="Alegreya" charset="0"/>
+                <a:cs typeface="Alegreya" charset="0"/>
+              </a:endParaRPr>
+            </a:p>
+          </p:txBody>
+        </p:sp>
+        <p:sp>
+          <p:nvSpPr>
+            <p:cNvPr id="15" name="Oval 14"/>
+            <p:cNvSpPr/>
+            <p:nvPr/>
+          </p:nvSpPr>
+          <p:spPr>
+            <a:xfrm>
+              <a:off x="3483856" y="1312768"/>
+              <a:ext cx="178885" cy="178885"/>
+            </a:xfrm>
+            <a:prstGeom prst="ellipse">
+              <a:avLst/>
+            </a:prstGeom>
+            <a:solidFill>
+              <a:srgbClr val="FFFFFF"/>
+            </a:solidFill>
+            <a:ln>
+              <a:solidFill>
+                <a:srgbClr val="595959"/>
+              </a:solidFill>
+            </a:ln>
+            <a:effectLst/>
+          </p:spPr>
+          <p:style>
+            <a:lnRef idx="1">
+              <a:schemeClr val="accent1"/>
+            </a:lnRef>
+            <a:fillRef idx="3">
+              <a:schemeClr val="accent1"/>
+            </a:fillRef>
+            <a:effectRef idx="2">
+              <a:schemeClr val="accent1"/>
+            </a:effectRef>
+            <a:fontRef idx="minor">
+              <a:schemeClr val="lt1"/>
+            </a:fontRef>
+          </p:style>
+          <p:txBody>
+            <a:bodyPr rtlCol="0" anchor="ctr"/>
+            <a:lstStyle/>
+            <a:p>
+              <a:pPr algn="ctr"/>
+              <a:endParaRPr lang="en-US" sz="2000">
+                <a:latin typeface="Alegreya" charset="0"/>
+                <a:ea typeface="Alegreya" charset="0"/>
+                <a:cs typeface="Alegreya" charset="0"/>
+              </a:endParaRPr>
+            </a:p>
+          </p:txBody>
+        </p:sp>
+        <p:sp>
+          <p:nvSpPr>
+            <p:cNvPr id="16" name="Oval 15"/>
+            <p:cNvSpPr/>
+            <p:nvPr/>
+          </p:nvSpPr>
+          <p:spPr>
+            <a:xfrm>
+              <a:off x="3810578" y="1312768"/>
+              <a:ext cx="178885" cy="178885"/>
+            </a:xfrm>
+            <a:prstGeom prst="ellipse">
+              <a:avLst/>
+            </a:prstGeom>
+            <a:solidFill>
+              <a:srgbClr val="FFFFFF"/>
+            </a:solidFill>
+            <a:ln>
+              <a:solidFill>
+                <a:srgbClr val="595959"/>
+              </a:solidFill>
+            </a:ln>
+            <a:effectLst/>
+          </p:spPr>
+          <p:style>
+            <a:lnRef idx="1">
+              <a:schemeClr val="accent1"/>
+            </a:lnRef>
+            <a:fillRef idx="3">
+              <a:schemeClr val="accent1"/>
+            </a:fillRef>
+            <a:effectRef idx="2">
+              <a:schemeClr val="accent1"/>
+            </a:effectRef>
+            <a:fontRef idx="minor">
+              <a:schemeClr val="lt1"/>
+            </a:fontRef>
+          </p:style>
+          <p:txBody>
+            <a:bodyPr rtlCol="0" anchor="ctr"/>
+            <a:lstStyle/>
+            <a:p>
+              <a:pPr algn="ctr"/>
+              <a:endParaRPr lang="en-US" sz="2000">
+                <a:latin typeface="Alegreya" charset="0"/>
+                <a:ea typeface="Alegreya" charset="0"/>
+                <a:cs typeface="Alegreya" charset="0"/>
+              </a:endParaRPr>
+            </a:p>
+          </p:txBody>
+        </p:sp>
+        <p:sp>
+          <p:nvSpPr>
+            <p:cNvPr id="17" name="Oval 16"/>
+            <p:cNvSpPr/>
+            <p:nvPr/>
+          </p:nvSpPr>
+          <p:spPr>
+            <a:xfrm>
+              <a:off x="4137300" y="1312768"/>
+              <a:ext cx="178885" cy="178885"/>
+            </a:xfrm>
+            <a:prstGeom prst="ellipse">
+              <a:avLst/>
+            </a:prstGeom>
+            <a:solidFill>
+              <a:srgbClr val="FFFFFF"/>
+            </a:solidFill>
+            <a:ln>
+              <a:solidFill>
+                <a:srgbClr val="595959"/>
+              </a:solidFill>
+            </a:ln>
+            <a:effectLst/>
+          </p:spPr>
+          <p:style>
+            <a:lnRef idx="1">
+              <a:schemeClr val="accent1"/>
+            </a:lnRef>
+            <a:fillRef idx="3">
+              <a:schemeClr val="accent1"/>
+            </a:fillRef>
+            <a:effectRef idx="2">
+              <a:schemeClr val="accent1"/>
+            </a:effectRef>
+            <a:fontRef idx="minor">
+              <a:schemeClr val="lt1"/>
+            </a:fontRef>
+          </p:style>
+          <p:txBody>
+            <a:bodyPr rtlCol="0" anchor="ctr"/>
+            <a:lstStyle/>
+            <a:p>
+              <a:pPr algn="ctr"/>
+              <a:endParaRPr lang="en-US" sz="2000">
+                <a:latin typeface="Alegreya" charset="0"/>
+                <a:ea typeface="Alegreya" charset="0"/>
+                <a:cs typeface="Alegreya" charset="0"/>
+              </a:endParaRPr>
+            </a:p>
+          </p:txBody>
+        </p:sp>
+        <p:sp>
+          <p:nvSpPr>
+            <p:cNvPr id="18" name="Oval 17"/>
+            <p:cNvSpPr/>
+            <p:nvPr/>
+          </p:nvSpPr>
+          <p:spPr>
+            <a:xfrm>
+              <a:off x="4464022" y="1312768"/>
+              <a:ext cx="178885" cy="178885"/>
+            </a:xfrm>
+            <a:prstGeom prst="ellipse">
+              <a:avLst/>
+            </a:prstGeom>
+            <a:solidFill>
+              <a:srgbClr val="FFFFFF"/>
+            </a:solidFill>
+            <a:ln>
+              <a:solidFill>
+                <a:srgbClr val="595959"/>
+              </a:solidFill>
+            </a:ln>
+            <a:effectLst/>
+          </p:spPr>
+          <p:style>
+            <a:lnRef idx="1">
+              <a:schemeClr val="accent1"/>
+            </a:lnRef>
+            <a:fillRef idx="3">
+              <a:schemeClr val="accent1"/>
+            </a:fillRef>
+            <a:effectRef idx="2">
+              <a:schemeClr val="accent1"/>
+            </a:effectRef>
+            <a:fontRef idx="minor">
+              <a:schemeClr val="lt1"/>
+            </a:fontRef>
+          </p:style>
+          <p:txBody>
+            <a:bodyPr rtlCol="0" anchor="ctr"/>
+            <a:lstStyle/>
+            <a:p>
+              <a:pPr algn="ctr"/>
+              <a:endParaRPr lang="en-US" sz="2000">
+                <a:latin typeface="Alegreya" charset="0"/>
+                <a:ea typeface="Alegreya" charset="0"/>
+                <a:cs typeface="Alegreya" charset="0"/>
+              </a:endParaRPr>
+            </a:p>
+          </p:txBody>
+        </p:sp>
+        <p:sp>
+          <p:nvSpPr>
+            <p:cNvPr id="19" name="Oval 18"/>
+            <p:cNvSpPr/>
+            <p:nvPr/>
+          </p:nvSpPr>
+          <p:spPr>
+            <a:xfrm>
+              <a:off x="4790744" y="1312768"/>
+              <a:ext cx="178885" cy="178885"/>
+            </a:xfrm>
+            <a:prstGeom prst="ellipse">
+              <a:avLst/>
+            </a:prstGeom>
+            <a:solidFill>
+              <a:srgbClr val="595959"/>
+            </a:solidFill>
+            <a:ln>
+              <a:solidFill>
+                <a:srgbClr val="595959"/>
+              </a:solidFill>
+            </a:ln>
+            <a:effectLst/>
+          </p:spPr>
+          <p:style>
+            <a:lnRef idx="1">
+              <a:schemeClr val="accent1"/>
+            </a:lnRef>
+            <a:fillRef idx="3">
+              <a:schemeClr val="accent1"/>
+            </a:fillRef>
+            <a:effectRef idx="2">
+              <a:schemeClr val="accent1"/>
+            </a:effectRef>
+            <a:fontRef idx="minor">
+              <a:schemeClr val="lt1"/>
+            </a:fontRef>
+          </p:style>
+          <p:txBody>
+            <a:bodyPr rtlCol="0" anchor="ctr"/>
+            <a:lstStyle/>
+            <a:p>
+              <a:pPr algn="ctr"/>
+              <a:endParaRPr lang="en-US" sz="2000">
+                <a:latin typeface="Alegreya" charset="0"/>
+                <a:ea typeface="Alegreya" charset="0"/>
+                <a:cs typeface="Alegreya" charset="0"/>
+              </a:endParaRPr>
+            </a:p>
+          </p:txBody>
+        </p:sp>
+        <p:sp>
+          <p:nvSpPr>
+            <p:cNvPr id="20" name="Oval 19"/>
+            <p:cNvSpPr/>
+            <p:nvPr/>
+          </p:nvSpPr>
+          <p:spPr>
+            <a:xfrm>
+              <a:off x="5117466" y="1312768"/>
+              <a:ext cx="178885" cy="178885"/>
+            </a:xfrm>
+            <a:prstGeom prst="ellipse">
+              <a:avLst/>
+            </a:prstGeom>
+            <a:solidFill>
+              <a:srgbClr val="FFFFFF"/>
+            </a:solidFill>
+            <a:ln>
+              <a:solidFill>
+                <a:srgbClr val="595959"/>
+              </a:solidFill>
+            </a:ln>
+            <a:effectLst/>
+          </p:spPr>
+          <p:style>
+            <a:lnRef idx="1">
+              <a:schemeClr val="accent1"/>
+            </a:lnRef>
+            <a:fillRef idx="3">
+              <a:schemeClr val="accent1"/>
+            </a:fillRef>
+            <a:effectRef idx="2">
+              <a:schemeClr val="accent1"/>
+            </a:effectRef>
+            <a:fontRef idx="minor">
+              <a:schemeClr val="lt1"/>
+            </a:fontRef>
+          </p:style>
+          <p:txBody>
+            <a:bodyPr rtlCol="0" anchor="ctr"/>
+            <a:lstStyle/>
+            <a:p>
+              <a:pPr algn="ctr"/>
+              <a:endParaRPr lang="en-US" sz="2000">
+                <a:latin typeface="Alegreya" charset="0"/>
+                <a:ea typeface="Alegreya" charset="0"/>
+                <a:cs typeface="Alegreya" charset="0"/>
+              </a:endParaRPr>
+            </a:p>
+          </p:txBody>
+        </p:sp>
+      </p:grpSp>
+      <p:grpSp>
+        <p:nvGrpSpPr>
+          <p:cNvPr id="30" name="Group 29"/>
+          <p:cNvGrpSpPr/>
+          <p:nvPr/>
+        </p:nvGrpSpPr>
+        <p:grpSpPr>
+          <a:xfrm>
+            <a:off x="3157134" y="1945600"/>
+            <a:ext cx="2139217" cy="178885"/>
+            <a:chOff x="3157134" y="1561552"/>
+            <a:chExt cx="2139217" cy="178885"/>
+          </a:xfrm>
+          <a:effectLst/>
+        </p:grpSpPr>
+        <p:sp>
+          <p:nvSpPr>
+            <p:cNvPr id="21" name="Oval 20"/>
+            <p:cNvSpPr/>
+            <p:nvPr/>
+          </p:nvSpPr>
+          <p:spPr>
+            <a:xfrm>
+              <a:off x="3157134" y="1561552"/>
+              <a:ext cx="178885" cy="178885"/>
+            </a:xfrm>
+            <a:prstGeom prst="ellipse">
+              <a:avLst/>
+            </a:prstGeom>
+            <a:solidFill>
+              <a:srgbClr val="FFFFFF"/>
+            </a:solidFill>
+            <a:ln>
+              <a:solidFill>
+                <a:srgbClr val="595959"/>
+              </a:solidFill>
+            </a:ln>
+            <a:effectLst/>
+          </p:spPr>
+          <p:style>
+            <a:lnRef idx="1">
+              <a:schemeClr val="accent1"/>
+            </a:lnRef>
+            <a:fillRef idx="3">
+              <a:schemeClr val="accent1"/>
+            </a:fillRef>
+            <a:effectRef idx="2">
+              <a:schemeClr val="accent1"/>
+            </a:effectRef>
+            <a:fontRef idx="minor">
+              <a:schemeClr val="lt1"/>
+            </a:fontRef>
+          </p:style>
+          <p:txBody>
+            <a:bodyPr rtlCol="0" anchor="ctr"/>
+            <a:lstStyle/>
+            <a:p>
+              <a:pPr algn="ctr"/>
+              <a:endParaRPr lang="en-US" sz="2000">
+                <a:latin typeface="Alegreya" charset="0"/>
+                <a:ea typeface="Alegreya" charset="0"/>
+                <a:cs typeface="Alegreya" charset="0"/>
+              </a:endParaRPr>
+            </a:p>
+          </p:txBody>
+        </p:sp>
+        <p:sp>
+          <p:nvSpPr>
+            <p:cNvPr id="22" name="Oval 21"/>
+            <p:cNvSpPr/>
+            <p:nvPr/>
+          </p:nvSpPr>
+          <p:spPr>
+            <a:xfrm>
+              <a:off x="3483856" y="1561552"/>
+              <a:ext cx="178885" cy="178885"/>
+            </a:xfrm>
+            <a:prstGeom prst="ellipse">
+              <a:avLst/>
+            </a:prstGeom>
+            <a:solidFill>
+              <a:srgbClr val="595959"/>
+            </a:solidFill>
+            <a:ln>
+              <a:solidFill>
+                <a:srgbClr val="595959"/>
+              </a:solidFill>
+            </a:ln>
+            <a:effectLst/>
+          </p:spPr>
+          <p:style>
+            <a:lnRef idx="1">
+              <a:schemeClr val="accent1"/>
+            </a:lnRef>
+            <a:fillRef idx="3">
+              <a:schemeClr val="accent1"/>
+            </a:fillRef>
+            <a:effectRef idx="2">
+              <a:schemeClr val="accent1"/>
+            </a:effectRef>
+            <a:fontRef idx="minor">
+              <a:schemeClr val="lt1"/>
+            </a:fontRef>
+          </p:style>
+          <p:txBody>
+            <a:bodyPr rtlCol="0" anchor="ctr"/>
+            <a:lstStyle/>
+            <a:p>
+              <a:pPr algn="ctr"/>
+              <a:endParaRPr lang="en-US" sz="2000">
+                <a:latin typeface="Alegreya" charset="0"/>
+                <a:ea typeface="Alegreya" charset="0"/>
+                <a:cs typeface="Alegreya" charset="0"/>
+              </a:endParaRPr>
+            </a:p>
+          </p:txBody>
+        </p:sp>
+        <p:sp>
+          <p:nvSpPr>
+            <p:cNvPr id="23" name="Oval 22"/>
+            <p:cNvSpPr/>
+            <p:nvPr/>
+          </p:nvSpPr>
+          <p:spPr>
+            <a:xfrm>
+              <a:off x="3810578" y="1561552"/>
+              <a:ext cx="178885" cy="178885"/>
+            </a:xfrm>
+            <a:prstGeom prst="ellipse">
+              <a:avLst/>
+            </a:prstGeom>
+            <a:solidFill>
+              <a:srgbClr val="FFFFFF"/>
+            </a:solidFill>
+            <a:ln>
+              <a:solidFill>
+                <a:srgbClr val="595959"/>
+              </a:solidFill>
+            </a:ln>
+            <a:effectLst/>
+          </p:spPr>
+          <p:style>
+            <a:lnRef idx="1">
+              <a:schemeClr val="accent1"/>
+            </a:lnRef>
+            <a:fillRef idx="3">
+              <a:schemeClr val="accent1"/>
+            </a:fillRef>
+            <a:effectRef idx="2">
+              <a:schemeClr val="accent1"/>
+            </a:effectRef>
+            <a:fontRef idx="minor">
+              <a:schemeClr val="lt1"/>
+            </a:fontRef>
+          </p:style>
+          <p:txBody>
+            <a:bodyPr rtlCol="0" anchor="ctr"/>
+            <a:lstStyle/>
+            <a:p>
+              <a:pPr algn="ctr"/>
+              <a:endParaRPr lang="en-US" sz="2000">
+                <a:latin typeface="Alegreya" charset="0"/>
+                <a:ea typeface="Alegreya" charset="0"/>
+                <a:cs typeface="Alegreya" charset="0"/>
+              </a:endParaRPr>
+            </a:p>
+          </p:txBody>
+        </p:sp>
+        <p:sp>
+          <p:nvSpPr>
+            <p:cNvPr id="24" name="Oval 23"/>
+            <p:cNvSpPr/>
+            <p:nvPr/>
+          </p:nvSpPr>
+          <p:spPr>
+            <a:xfrm>
+              <a:off x="4137300" y="1561552"/>
+              <a:ext cx="178885" cy="178885"/>
+            </a:xfrm>
+            <a:prstGeom prst="ellipse">
+              <a:avLst/>
+            </a:prstGeom>
+            <a:solidFill>
+              <a:srgbClr val="FFFFFF"/>
+            </a:solidFill>
+            <a:ln>
+              <a:solidFill>
+                <a:srgbClr val="595959"/>
+              </a:solidFill>
+            </a:ln>
+            <a:effectLst/>
+          </p:spPr>
+          <p:style>
+            <a:lnRef idx="1">
+              <a:schemeClr val="accent1"/>
+            </a:lnRef>
+            <a:fillRef idx="3">
+              <a:schemeClr val="accent1"/>
+            </a:fillRef>
+            <a:effectRef idx="2">
+              <a:schemeClr val="accent1"/>
+            </a:effectRef>
+            <a:fontRef idx="minor">
+              <a:schemeClr val="lt1"/>
+            </a:fontRef>
+          </p:style>
+          <p:txBody>
+            <a:bodyPr rtlCol="0" anchor="ctr"/>
+            <a:lstStyle/>
+            <a:p>
+              <a:pPr algn="ctr"/>
+              <a:endParaRPr lang="en-US" sz="2000">
+                <a:latin typeface="Alegreya" charset="0"/>
+                <a:ea typeface="Alegreya" charset="0"/>
+                <a:cs typeface="Alegreya" charset="0"/>
+              </a:endParaRPr>
+            </a:p>
+          </p:txBody>
+        </p:sp>
+        <p:sp>
+          <p:nvSpPr>
+            <p:cNvPr id="25" name="Oval 24"/>
+            <p:cNvSpPr/>
+            <p:nvPr/>
+          </p:nvSpPr>
+          <p:spPr>
+            <a:xfrm>
+              <a:off x="4464022" y="1561552"/>
+              <a:ext cx="178885" cy="178885"/>
+            </a:xfrm>
+            <a:prstGeom prst="ellipse">
+              <a:avLst/>
+            </a:prstGeom>
+            <a:solidFill>
+              <a:srgbClr val="FFFFFF"/>
+            </a:solidFill>
+            <a:ln>
+              <a:solidFill>
+                <a:srgbClr val="595959"/>
+              </a:solidFill>
+            </a:ln>
+            <a:effectLst/>
+          </p:spPr>
+          <p:style>
+            <a:lnRef idx="1">
+              <a:schemeClr val="accent1"/>
+            </a:lnRef>
+            <a:fillRef idx="3">
+              <a:schemeClr val="accent1"/>
+            </a:fillRef>
+            <a:effectRef idx="2">
+              <a:schemeClr val="accent1"/>
+            </a:effectRef>
+            <a:fontRef idx="minor">
+              <a:schemeClr val="lt1"/>
+            </a:fontRef>
+          </p:style>
+          <p:txBody>
+            <a:bodyPr rtlCol="0" anchor="ctr"/>
+            <a:lstStyle/>
+            <a:p>
+              <a:pPr algn="ctr"/>
+              <a:endParaRPr lang="en-US" sz="2000">
+                <a:latin typeface="Alegreya" charset="0"/>
+                <a:ea typeface="Alegreya" charset="0"/>
+                <a:cs typeface="Alegreya" charset="0"/>
+              </a:endParaRPr>
+            </a:p>
+          </p:txBody>
+        </p:sp>
+        <p:sp>
+          <p:nvSpPr>
+            <p:cNvPr id="26" name="Oval 25"/>
+            <p:cNvSpPr/>
+            <p:nvPr/>
+          </p:nvSpPr>
+          <p:spPr>
+            <a:xfrm>
+              <a:off x="4790744" y="1561552"/>
+              <a:ext cx="178885" cy="178885"/>
+            </a:xfrm>
+            <a:prstGeom prst="ellipse">
+              <a:avLst/>
+            </a:prstGeom>
+            <a:solidFill>
+              <a:srgbClr val="FFFFFF"/>
+            </a:solidFill>
+            <a:ln>
+              <a:solidFill>
+                <a:srgbClr val="595959"/>
+              </a:solidFill>
+            </a:ln>
+            <a:effectLst/>
+          </p:spPr>
+          <p:style>
+            <a:lnRef idx="1">
+              <a:schemeClr val="accent1"/>
+            </a:lnRef>
+            <a:fillRef idx="3">
+              <a:schemeClr val="accent1"/>
+            </a:fillRef>
+            <a:effectRef idx="2">
+              <a:schemeClr val="accent1"/>
+            </a:effectRef>
+            <a:fontRef idx="minor">
+              <a:schemeClr val="lt1"/>
+            </a:fontRef>
+          </p:style>
+          <p:txBody>
+            <a:bodyPr rtlCol="0" anchor="ctr"/>
+            <a:lstStyle/>
+            <a:p>
+              <a:pPr algn="ctr"/>
+              <a:endParaRPr lang="en-US" sz="2000">
+                <a:latin typeface="Alegreya" charset="0"/>
+                <a:ea typeface="Alegreya" charset="0"/>
+                <a:cs typeface="Alegreya" charset="0"/>
+              </a:endParaRPr>
+            </a:p>
+          </p:txBody>
+        </p:sp>
+        <p:sp>
+          <p:nvSpPr>
+            <p:cNvPr id="27" name="Oval 26"/>
+            <p:cNvSpPr/>
+            <p:nvPr/>
+          </p:nvSpPr>
+          <p:spPr>
+            <a:xfrm>
+              <a:off x="5117466" y="1561552"/>
+              <a:ext cx="178885" cy="178885"/>
+            </a:xfrm>
+            <a:prstGeom prst="ellipse">
+              <a:avLst/>
+            </a:prstGeom>
+            <a:solidFill>
+              <a:srgbClr val="FFFFFF"/>
+            </a:solidFill>
+            <a:ln>
+              <a:solidFill>
+                <a:srgbClr val="595959"/>
+              </a:solidFill>
+            </a:ln>
+            <a:effectLst/>
+          </p:spPr>
+          <p:style>
+            <a:lnRef idx="1">
+              <a:schemeClr val="accent1"/>
+            </a:lnRef>
+            <a:fillRef idx="3">
+              <a:schemeClr val="accent1"/>
+            </a:fillRef>
+            <a:effectRef idx="2">
+              <a:schemeClr val="accent1"/>
+            </a:effectRef>
+            <a:fontRef idx="minor">
+              <a:schemeClr val="lt1"/>
+            </a:fontRef>
+          </p:style>
+          <p:txBody>
+            <a:bodyPr rtlCol="0" anchor="ctr"/>
+            <a:lstStyle/>
+            <a:p>
+              <a:pPr algn="ctr"/>
+              <a:endParaRPr lang="en-US" sz="2000">
+                <a:latin typeface="Alegreya" charset="0"/>
+                <a:ea typeface="Alegreya" charset="0"/>
+                <a:cs typeface="Alegreya" charset="0"/>
+              </a:endParaRPr>
+            </a:p>
+          </p:txBody>
+        </p:sp>
+      </p:grpSp>
+      <p:sp>
+        <p:nvSpPr>
+          <p:cNvPr id="28" name="TextBox 27"/>
+          <p:cNvSpPr txBox="1"/>
+          <p:nvPr/>
+        </p:nvSpPr>
+        <p:spPr>
+          <a:xfrm>
+            <a:off x="3054884" y="918644"/>
+            <a:ext cx="1157689" cy="400110"/>
+          </a:xfrm>
+          <a:prstGeom prst="rect">
+            <a:avLst/>
+          </a:prstGeom>
+          <a:noFill/>
+          <a:effectLst/>
+        </p:spPr>
+        <p:txBody>
+          <a:bodyPr wrap="none" rtlCol="0">
+            <a:spAutoFit/>
+          </a:bodyPr>
+          <a:lstStyle/>
+          <a:p>
+            <a:r>
+              <a:rPr lang="en-US" sz="2000" dirty="0" smtClean="0">
+                <a:latin typeface="Alegreya" charset="0"/>
+                <a:ea typeface="Alegreya" charset="0"/>
+                <a:cs typeface="Alegreya" charset="0"/>
+              </a:rPr>
+              <a:t>Database</a:t>
+            </a:r>
+            <a:endParaRPr lang="en-US" sz="2000" dirty="0">
+              <a:latin typeface="Alegreya" charset="0"/>
+              <a:ea typeface="Alegreya" charset="0"/>
+              <a:cs typeface="Alegreya" charset="0"/>
+            </a:endParaRPr>
+          </a:p>
+        </p:txBody>
+      </p:sp>
+      <p:pic>
+        <p:nvPicPr>
+          <p:cNvPr id="3" name="Picture 2"/>
+          <p:cNvPicPr>
+            <a:picLocks noChangeAspect="1"/>
+          </p:cNvPicPr>
+          <p:nvPr/>
+        </p:nvPicPr>
+        <p:blipFill>
+          <a:blip r:embed="rId2"/>
+          <a:stretch>
+            <a:fillRect/>
+          </a:stretch>
+        </p:blipFill>
+        <p:spPr>
+          <a:xfrm>
+            <a:off x="764836" y="1084645"/>
+            <a:ext cx="1230822" cy="1230822"/>
+          </a:xfrm>
+          <a:prstGeom prst="rect">
+            <a:avLst/>
+          </a:prstGeom>
+          <a:effectLst/>
+        </p:spPr>
+      </p:pic>
+      <p:sp>
+        <p:nvSpPr>
+          <p:cNvPr id="29" name="TextBox 28"/>
+          <p:cNvSpPr txBox="1"/>
+          <p:nvPr/>
+        </p:nvSpPr>
+        <p:spPr>
+          <a:xfrm>
+            <a:off x="984209" y="919609"/>
+            <a:ext cx="792076" cy="400110"/>
+          </a:xfrm>
+          <a:prstGeom prst="rect">
+            <a:avLst/>
+          </a:prstGeom>
+          <a:noFill/>
+          <a:effectLst/>
+        </p:spPr>
+        <p:txBody>
+          <a:bodyPr wrap="none" rtlCol="0">
+            <a:spAutoFit/>
+          </a:bodyPr>
+          <a:lstStyle/>
+          <a:p>
+            <a:r>
+              <a:rPr lang="en-US" sz="2000" dirty="0" smtClean="0">
+                <a:latin typeface="Alegreya" charset="0"/>
+                <a:ea typeface="Alegreya" charset="0"/>
+                <a:cs typeface="Alegreya" charset="0"/>
+              </a:rPr>
+              <a:t>Users</a:t>
+            </a:r>
+          </a:p>
+        </p:txBody>
+      </p:sp>
+      <p:cxnSp>
+        <p:nvCxnSpPr>
+          <p:cNvPr id="33" name="Straight Arrow Connector 32"/>
+          <p:cNvCxnSpPr/>
+          <p:nvPr/>
+        </p:nvCxnSpPr>
+        <p:spPr>
+          <a:xfrm>
+            <a:off x="2143495" y="1711427"/>
+            <a:ext cx="704971" cy="0"/>
+          </a:xfrm>
+          <a:prstGeom prst="straightConnector1">
+            <a:avLst/>
+          </a:prstGeom>
+          <a:ln>
+            <a:solidFill>
+              <a:srgbClr val="595959"/>
+            </a:solidFill>
+            <a:tailEnd type="arrow"/>
+          </a:ln>
+          <a:effectLst/>
+        </p:spPr>
+        <p:style>
+          <a:lnRef idx="2">
+            <a:schemeClr val="accent1"/>
+          </a:lnRef>
+          <a:fillRef idx="0">
+            <a:schemeClr val="accent1"/>
+          </a:fillRef>
+          <a:effectRef idx="1">
+            <a:schemeClr val="accent1"/>
+          </a:effectRef>
+          <a:fontRef idx="minor">
+            <a:schemeClr val="tx1"/>
+          </a:fontRef>
+        </p:style>
+      </p:cxnSp>
+      <p:sp>
+        <p:nvSpPr>
+          <p:cNvPr id="37" name="TextBox 36"/>
+          <p:cNvSpPr txBox="1"/>
+          <p:nvPr/>
+        </p:nvSpPr>
+        <p:spPr>
+          <a:xfrm>
+            <a:off x="6262290" y="2656809"/>
+            <a:ext cx="1301057" cy="400110"/>
+          </a:xfrm>
+          <a:prstGeom prst="rect">
+            <a:avLst/>
+          </a:prstGeom>
+          <a:noFill/>
+          <a:effectLst/>
+        </p:spPr>
+        <p:txBody>
+          <a:bodyPr wrap="none" rtlCol="0">
+            <a:spAutoFit/>
+          </a:bodyPr>
+          <a:lstStyle/>
+          <a:p>
+            <a:r>
+              <a:rPr lang="en-US" sz="2000" cap="small" dirty="0" err="1" smtClean="0">
+                <a:latin typeface="Alegreya" charset="0"/>
+                <a:ea typeface="Alegreya" charset="0"/>
+                <a:cs typeface="Alegreya" charset="0"/>
+              </a:rPr>
+              <a:t>QueryFix</a:t>
+            </a:r>
+            <a:endParaRPr lang="en-US" sz="2000" cap="small" dirty="0" smtClean="0">
+              <a:latin typeface="Alegreya" charset="0"/>
+              <a:ea typeface="Alegreya" charset="0"/>
+              <a:cs typeface="Alegreya" charset="0"/>
+            </a:endParaRPr>
+          </a:p>
+        </p:txBody>
+      </p:sp>
+      <p:sp>
+        <p:nvSpPr>
+          <p:cNvPr id="42" name="TextBox 41"/>
+          <p:cNvSpPr txBox="1"/>
+          <p:nvPr/>
+        </p:nvSpPr>
+        <p:spPr>
+          <a:xfrm>
+            <a:off x="5871635" y="3799711"/>
+            <a:ext cx="1960332" cy="707886"/>
+          </a:xfrm>
+          <a:prstGeom prst="rect">
+            <a:avLst/>
+          </a:prstGeom>
+          <a:solidFill>
+            <a:schemeClr val="bg1"/>
+          </a:solidFill>
+          <a:ln w="28575">
+            <a:solidFill>
+              <a:schemeClr val="bg1">
+                <a:lumMod val="50000"/>
+              </a:schemeClr>
+            </a:solidFill>
+          </a:ln>
+          <a:effectLst/>
+        </p:spPr>
+        <p:txBody>
+          <a:bodyPr wrap="square" rtlCol="0">
+            <a:spAutoFit/>
+          </a:bodyPr>
+          <a:lstStyle/>
+          <a:p>
+            <a:pPr algn="ctr"/>
+            <a:r>
+              <a:rPr lang="en-US" sz="2000" dirty="0" smtClean="0">
+                <a:latin typeface="Alegreya" charset="0"/>
+                <a:ea typeface="Alegreya" charset="0"/>
+                <a:cs typeface="Alegreya" charset="0"/>
+              </a:rPr>
+              <a:t>Tuple, Query, &amp; Attribute Slicing</a:t>
+            </a:r>
+          </a:p>
+        </p:txBody>
+      </p:sp>
+      <p:sp>
+        <p:nvSpPr>
+          <p:cNvPr id="43" name="TextBox 42"/>
+          <p:cNvSpPr txBox="1"/>
+          <p:nvPr/>
+        </p:nvSpPr>
+        <p:spPr>
+          <a:xfrm>
+            <a:off x="5871635" y="4704117"/>
+            <a:ext cx="1960332" cy="707886"/>
+          </a:xfrm>
+          <a:prstGeom prst="rect">
+            <a:avLst/>
+          </a:prstGeom>
+          <a:solidFill>
+            <a:schemeClr val="bg1"/>
+          </a:solidFill>
+          <a:ln w="28575">
+            <a:solidFill>
+              <a:schemeClr val="bg1">
+                <a:lumMod val="50000"/>
+              </a:schemeClr>
+            </a:solidFill>
+          </a:ln>
+          <a:effectLst/>
+        </p:spPr>
+        <p:txBody>
+          <a:bodyPr wrap="square" rtlCol="0">
+            <a:spAutoFit/>
+          </a:bodyPr>
+          <a:lstStyle/>
+          <a:p>
+            <a:pPr algn="ctr"/>
+            <a:r>
+              <a:rPr lang="en-US" sz="2000" dirty="0" smtClean="0">
+                <a:latin typeface="Alegreya" charset="0"/>
+                <a:ea typeface="Alegreya" charset="0"/>
+                <a:cs typeface="Alegreya" charset="0"/>
+              </a:rPr>
+              <a:t>Incremental Repair</a:t>
+            </a:r>
+          </a:p>
+        </p:txBody>
+      </p:sp>
+      <p:cxnSp>
+        <p:nvCxnSpPr>
+          <p:cNvPr id="45" name="Straight Arrow Connector 44"/>
+          <p:cNvCxnSpPr>
+            <a:stCxn id="64" idx="2"/>
+            <a:endCxn id="65" idx="0"/>
+          </p:cNvCxnSpPr>
+          <p:nvPr/>
+        </p:nvCxnSpPr>
+        <p:spPr>
+          <a:xfrm>
+            <a:off x="4257769" y="4043706"/>
+            <a:ext cx="1633" cy="419004"/>
+          </a:xfrm>
+          <a:prstGeom prst="straightConnector1">
+            <a:avLst/>
+          </a:prstGeom>
+          <a:ln w="38100">
+            <a:solidFill>
+              <a:schemeClr val="bg1">
+                <a:lumMod val="50000"/>
+              </a:schemeClr>
+            </a:solidFill>
+            <a:headEnd type="none" w="med" len="med"/>
+            <a:tailEnd type="triangle" w="med" len="med"/>
+          </a:ln>
+          <a:effectLst/>
+        </p:spPr>
+        <p:style>
+          <a:lnRef idx="2">
+            <a:schemeClr val="accent1"/>
+          </a:lnRef>
+          <a:fillRef idx="0">
+            <a:schemeClr val="accent1"/>
+          </a:fillRef>
+          <a:effectRef idx="1">
+            <a:schemeClr val="accent1"/>
+          </a:effectRef>
+          <a:fontRef idx="minor">
+            <a:schemeClr val="tx1"/>
+          </a:fontRef>
+        </p:style>
+      </p:cxnSp>
+      <p:cxnSp>
+        <p:nvCxnSpPr>
+          <p:cNvPr id="49" name="Straight Arrow Connector 48"/>
+          <p:cNvCxnSpPr>
+            <a:stCxn id="65" idx="3"/>
+          </p:cNvCxnSpPr>
+          <p:nvPr/>
+        </p:nvCxnSpPr>
+        <p:spPr>
+          <a:xfrm>
+            <a:off x="5222635" y="4788071"/>
+            <a:ext cx="414573" cy="3385"/>
+          </a:xfrm>
+          <a:prstGeom prst="straightConnector1">
+            <a:avLst/>
+          </a:prstGeom>
+          <a:ln w="38100">
+            <a:solidFill>
+              <a:schemeClr val="bg1">
+                <a:lumMod val="50000"/>
+              </a:schemeClr>
+            </a:solidFill>
+            <a:headEnd type="none" w="med" len="med"/>
+            <a:tailEnd type="triangle" w="med" len="med"/>
+          </a:ln>
+          <a:effectLst/>
+        </p:spPr>
+        <p:style>
+          <a:lnRef idx="2">
+            <a:schemeClr val="accent1"/>
+          </a:lnRef>
+          <a:fillRef idx="0">
+            <a:schemeClr val="accent1"/>
+          </a:fillRef>
+          <a:effectRef idx="1">
+            <a:schemeClr val="accent1"/>
+          </a:effectRef>
+          <a:fontRef idx="minor">
+            <a:schemeClr val="tx1"/>
+          </a:fontRef>
+        </p:style>
+      </p:cxnSp>
+      <p:sp>
+        <p:nvSpPr>
+          <p:cNvPr id="53" name="TextBox 52"/>
+          <p:cNvSpPr txBox="1"/>
+          <p:nvPr/>
+        </p:nvSpPr>
+        <p:spPr>
+          <a:xfrm>
+            <a:off x="6209120" y="932479"/>
+            <a:ext cx="1576072" cy="707886"/>
+          </a:xfrm>
+          <a:prstGeom prst="rect">
+            <a:avLst/>
+          </a:prstGeom>
+          <a:noFill/>
+          <a:effectLst/>
+        </p:spPr>
+        <p:txBody>
+          <a:bodyPr wrap="none" rtlCol="0">
+            <a:spAutoFit/>
+          </a:bodyPr>
+          <a:lstStyle/>
+          <a:p>
+            <a:pPr algn="ctr"/>
+            <a:r>
+              <a:rPr lang="en-US" sz="2000" dirty="0" smtClean="0">
+                <a:latin typeface="Alegreya" charset="0"/>
+                <a:ea typeface="Alegreya" charset="0"/>
+                <a:cs typeface="Alegreya" charset="0"/>
+              </a:rPr>
+              <a:t>diagnoses &amp;</a:t>
+            </a:r>
+          </a:p>
+          <a:p>
+            <a:pPr algn="ctr"/>
+            <a:r>
+              <a:rPr lang="en-US" sz="2000" dirty="0" smtClean="0">
+                <a:latin typeface="Alegreya" charset="0"/>
+                <a:ea typeface="Alegreya" charset="0"/>
+                <a:cs typeface="Alegreya" charset="0"/>
+              </a:rPr>
+              <a:t>query repairs</a:t>
+            </a:r>
+          </a:p>
+        </p:txBody>
+      </p:sp>
+      <p:sp>
+        <p:nvSpPr>
+          <p:cNvPr id="47" name="TextBox 46"/>
+          <p:cNvSpPr txBox="1"/>
+          <p:nvPr/>
+        </p:nvSpPr>
+        <p:spPr>
+          <a:xfrm>
+            <a:off x="6673464" y="3195668"/>
+            <a:ext cx="1271502" cy="400110"/>
+          </a:xfrm>
+          <a:prstGeom prst="rect">
+            <a:avLst/>
+          </a:prstGeom>
+          <a:noFill/>
+          <a:effectLst/>
+        </p:spPr>
+        <p:txBody>
+          <a:bodyPr wrap="none" rtlCol="0">
+            <a:spAutoFit/>
+          </a:bodyPr>
+          <a:lstStyle/>
+          <a:p>
+            <a:r>
+              <a:rPr lang="en-US" sz="2000" dirty="0" smtClean="0">
+                <a:solidFill>
+                  <a:srgbClr val="595959"/>
+                </a:solidFill>
+                <a:latin typeface="Alegreya" charset="0"/>
+                <a:ea typeface="Alegreya" charset="0"/>
+                <a:cs typeface="Alegreya" charset="0"/>
+              </a:rPr>
+              <a:t>Optimizer</a:t>
+            </a:r>
+          </a:p>
+        </p:txBody>
+      </p:sp>
+      <p:sp>
+        <p:nvSpPr>
+          <p:cNvPr id="57" name="Down Arrow 56"/>
+          <p:cNvSpPr/>
+          <p:nvPr/>
+        </p:nvSpPr>
+        <p:spPr>
+          <a:xfrm rot="16200000">
+            <a:off x="2652358" y="4344052"/>
+            <a:ext cx="296173" cy="923715"/>
+          </a:xfrm>
+          <a:prstGeom prst="downArrow">
+            <a:avLst>
+              <a:gd name="adj1" fmla="val 63385"/>
+              <a:gd name="adj2" fmla="val 50000"/>
+            </a:avLst>
+          </a:prstGeom>
+          <a:solidFill>
+            <a:schemeClr val="bg1"/>
+          </a:solidFill>
+          <a:ln w="28575">
+            <a:solidFill>
+              <a:schemeClr val="bg1">
+                <a:lumMod val="50000"/>
+              </a:schemeClr>
+            </a:solidFill>
+            <a:prstDash val="solid"/>
+          </a:ln>
+          <a:effectLst/>
+        </p:spPr>
+        <p:style>
+          <a:lnRef idx="1">
+            <a:schemeClr val="accent1"/>
+          </a:lnRef>
+          <a:fillRef idx="3">
+            <a:schemeClr val="accent1"/>
+          </a:fillRef>
+          <a:effectRef idx="2">
+            <a:schemeClr val="accent1"/>
+          </a:effectRef>
+          <a:fontRef idx="minor">
+            <a:schemeClr val="lt1"/>
+          </a:fontRef>
+        </p:style>
+        <p:txBody>
+          <a:bodyPr rtlCol="0" anchor="ctr"/>
+          <a:lstStyle/>
+          <a:p>
+            <a:pPr algn="ctr"/>
+            <a:endParaRPr lang="en-US" sz="2000">
+              <a:latin typeface="Alegreya" charset="0"/>
+              <a:ea typeface="Alegreya" charset="0"/>
+              <a:cs typeface="Alegreya" charset="0"/>
+            </a:endParaRPr>
+          </a:p>
+        </p:txBody>
+      </p:sp>
+      <p:sp>
+        <p:nvSpPr>
+          <p:cNvPr id="58" name="Down Arrow 57"/>
+          <p:cNvSpPr/>
+          <p:nvPr/>
+        </p:nvSpPr>
+        <p:spPr>
+          <a:xfrm rot="10800000">
+            <a:off x="6851801" y="1665376"/>
+            <a:ext cx="296173" cy="946530"/>
+          </a:xfrm>
+          <a:prstGeom prst="downArrow">
+            <a:avLst>
+              <a:gd name="adj1" fmla="val 63385"/>
+              <a:gd name="adj2" fmla="val 50000"/>
+            </a:avLst>
+          </a:prstGeom>
+          <a:solidFill>
+            <a:schemeClr val="bg1"/>
+          </a:solidFill>
+          <a:ln w="28575">
+            <a:solidFill>
+              <a:schemeClr val="bg1">
+                <a:lumMod val="50000"/>
+              </a:schemeClr>
+            </a:solidFill>
+            <a:prstDash val="solid"/>
+          </a:ln>
+          <a:effectLst/>
+        </p:spPr>
+        <p:style>
+          <a:lnRef idx="1">
+            <a:schemeClr val="accent1"/>
+          </a:lnRef>
+          <a:fillRef idx="3">
+            <a:schemeClr val="accent1"/>
+          </a:fillRef>
+          <a:effectRef idx="2">
+            <a:schemeClr val="accent1"/>
+          </a:effectRef>
+          <a:fontRef idx="minor">
+            <a:schemeClr val="lt1"/>
+          </a:fontRef>
+        </p:style>
+        <p:txBody>
+          <a:bodyPr rtlCol="0" anchor="ctr"/>
+          <a:lstStyle/>
+          <a:p>
+            <a:pPr algn="ctr"/>
+            <a:endParaRPr lang="en-US" sz="2000">
+              <a:latin typeface="Alegreya" charset="0"/>
+              <a:ea typeface="Alegreya" charset="0"/>
+              <a:cs typeface="Alegreya" charset="0"/>
+            </a:endParaRPr>
+          </a:p>
+        </p:txBody>
+      </p:sp>
+      <p:sp>
+        <p:nvSpPr>
+          <p:cNvPr id="60" name="Rectangle 59"/>
+          <p:cNvSpPr/>
+          <p:nvPr/>
+        </p:nvSpPr>
+        <p:spPr>
+          <a:xfrm>
+            <a:off x="2848466" y="886759"/>
+            <a:ext cx="2788743" cy="1531199"/>
+          </a:xfrm>
+          <a:prstGeom prst="rect">
+            <a:avLst/>
+          </a:prstGeom>
+          <a:noFill/>
+          <a:ln w="28575">
+            <a:solidFill>
+              <a:schemeClr val="bg1">
+                <a:lumMod val="50000"/>
+              </a:schemeClr>
+            </a:solidFill>
+          </a:ln>
+          <a:effectLst/>
+        </p:spPr>
+        <p:style>
+          <a:lnRef idx="1">
+            <a:schemeClr val="accent1"/>
+          </a:lnRef>
+          <a:fillRef idx="3">
+            <a:schemeClr val="accent1"/>
+          </a:fillRef>
+          <a:effectRef idx="2">
+            <a:schemeClr val="accent1"/>
+          </a:effectRef>
+          <a:fontRef idx="minor">
+            <a:schemeClr val="lt1"/>
+          </a:fontRef>
+        </p:style>
+        <p:txBody>
+          <a:bodyPr rtlCol="0" anchor="ctr"/>
+          <a:lstStyle/>
+          <a:p>
+            <a:pPr algn="ctr"/>
+            <a:endParaRPr lang="en-US" sz="2000"/>
+          </a:p>
+        </p:txBody>
+      </p:sp>
+      <p:sp>
+        <p:nvSpPr>
+          <p:cNvPr id="64" name="Rectangle 63"/>
+          <p:cNvSpPr/>
+          <p:nvPr/>
+        </p:nvSpPr>
+        <p:spPr>
+          <a:xfrm>
+            <a:off x="3292903" y="3369708"/>
+            <a:ext cx="1929732" cy="673998"/>
+          </a:xfrm>
+          <a:prstGeom prst="rect">
+            <a:avLst/>
+          </a:prstGeom>
+          <a:noFill/>
+          <a:ln w="28575">
+            <a:solidFill>
+              <a:schemeClr val="bg1">
+                <a:lumMod val="50000"/>
+              </a:schemeClr>
+            </a:solidFill>
+          </a:ln>
+          <a:effectLst/>
+        </p:spPr>
+        <p:style>
+          <a:lnRef idx="1">
+            <a:schemeClr val="accent1"/>
+          </a:lnRef>
+          <a:fillRef idx="3">
+            <a:schemeClr val="accent1"/>
+          </a:fillRef>
+          <a:effectRef idx="2">
+            <a:schemeClr val="accent1"/>
+          </a:effectRef>
+          <a:fontRef idx="minor">
+            <a:schemeClr val="lt1"/>
+          </a:fontRef>
+        </p:style>
+        <p:txBody>
+          <a:bodyPr rtlCol="0" anchor="ctr"/>
+          <a:lstStyle/>
+          <a:p>
+            <a:pPr algn="ctr"/>
+            <a:r>
+              <a:rPr lang="en-US" sz="2000" dirty="0" smtClean="0">
+                <a:solidFill>
+                  <a:schemeClr val="tx1"/>
+                </a:solidFill>
+                <a:latin typeface="Alegreya" charset="0"/>
+                <a:ea typeface="Alegreya" charset="0"/>
+                <a:cs typeface="Alegreya" charset="0"/>
+              </a:rPr>
+              <a:t>Outlier Removal</a:t>
+            </a:r>
+            <a:endParaRPr lang="en-US" sz="2000" dirty="0">
+              <a:solidFill>
+                <a:schemeClr val="tx1"/>
+              </a:solidFill>
+              <a:latin typeface="Alegreya" charset="0"/>
+              <a:ea typeface="Alegreya" charset="0"/>
+              <a:cs typeface="Alegreya" charset="0"/>
+            </a:endParaRPr>
+          </a:p>
+        </p:txBody>
+      </p:sp>
+      <p:sp>
+        <p:nvSpPr>
+          <p:cNvPr id="65" name="Rectangle 64"/>
+          <p:cNvSpPr/>
+          <p:nvPr/>
+        </p:nvSpPr>
+        <p:spPr>
+          <a:xfrm>
+            <a:off x="3296169" y="4462710"/>
+            <a:ext cx="1926466" cy="650722"/>
+          </a:xfrm>
+          <a:prstGeom prst="rect">
+            <a:avLst/>
+          </a:prstGeom>
+          <a:noFill/>
+          <a:ln w="28575">
+            <a:solidFill>
+              <a:schemeClr val="bg1">
+                <a:lumMod val="50000"/>
+              </a:schemeClr>
+            </a:solidFill>
+          </a:ln>
+          <a:effectLst/>
+        </p:spPr>
+        <p:style>
+          <a:lnRef idx="1">
+            <a:schemeClr val="accent1"/>
+          </a:lnRef>
+          <a:fillRef idx="3">
+            <a:schemeClr val="accent1"/>
+          </a:fillRef>
+          <a:effectRef idx="2">
+            <a:schemeClr val="accent1"/>
+          </a:effectRef>
+          <a:fontRef idx="minor">
+            <a:schemeClr val="lt1"/>
+          </a:fontRef>
+        </p:style>
+        <p:txBody>
+          <a:bodyPr rtlCol="0" anchor="ctr"/>
+          <a:lstStyle/>
+          <a:p>
+            <a:pPr algn="ctr"/>
+            <a:r>
+              <a:rPr lang="en-US" sz="2000" dirty="0" smtClean="0">
+                <a:solidFill>
+                  <a:schemeClr val="tx1"/>
+                </a:solidFill>
+                <a:latin typeface="Alegreya" charset="0"/>
+                <a:ea typeface="Alegreya" charset="0"/>
+                <a:cs typeface="Alegreya" charset="0"/>
+              </a:rPr>
+              <a:t>MILP Encoding</a:t>
+            </a:r>
+            <a:endParaRPr lang="en-US" sz="2000" dirty="0">
+              <a:solidFill>
+                <a:schemeClr val="tx1"/>
+              </a:solidFill>
+              <a:latin typeface="Alegreya" charset="0"/>
+              <a:ea typeface="Alegreya" charset="0"/>
+              <a:cs typeface="Alegreya" charset="0"/>
+            </a:endParaRPr>
+          </a:p>
+        </p:txBody>
+      </p:sp>
+    </p:spTree>
+    <p:extLst>
+      <p:ext uri="{BB962C8B-B14F-4D97-AF65-F5344CB8AC3E}">
+        <p14:creationId xmlns:p14="http://schemas.microsoft.com/office/powerpoint/2010/main" val="424067901"/>
+      </p:ext>
+    </p:extLst>
+  </p:cSld>
+  <p:clrMapOvr>
+    <a:masterClrMapping/>
+  </p:clrMapOvr>
+  <p:timing>
+    <p:tnLst>
+      <p:par>
+        <p:cTn xmlns:p14="http://schemas.microsoft.com/office/powerpoint/2010/main" id="1" dur="indefinite" restart="never" nodeType="tmRoot"/>
+      </p:par>
+    </p:tnLst>
+  </p:timing>
+</p:sld>
+</file>
+
+<file path=ppt/slides/slide8.xml><?xml version="1.0" encoding="utf-8"?>
+<p:sld xmlns:a="http://schemas.openxmlformats.org/drawingml/2006/main" xmlns:r="http://schemas.openxmlformats.org/officeDocument/2006/relationships" xmlns:p="http://schemas.openxmlformats.org/presentationml/2006/main">
+  <p:cSld>
+    <p:spTree>
+      <p:nvGrpSpPr>
+        <p:cNvPr id="1" name=""/>
+        <p:cNvGrpSpPr/>
+        <p:nvPr/>
+      </p:nvGrpSpPr>
+      <p:grpSpPr>
+        <a:xfrm>
+          <a:off x="0" y="0"/>
+          <a:ext cx="0" cy="0"/>
+          <a:chOff x="0" y="0"/>
+          <a:chExt cx="0" cy="0"/>
+        </a:xfrm>
+      </p:grpSpPr>
       <p:cxnSp>
         <p:nvCxnSpPr>
           <p:cNvPr id="43" name="Straight Connector 42"/>
@@ -13245,13 +15868,6 @@
               </a:rPr>
               <a:t>repair</a:t>
             </a:r>
-            <a:endParaRPr lang="en-US" dirty="0" smtClean="0">
-              <a:solidFill>
-                <a:schemeClr val="accent6"/>
-              </a:solidFill>
-              <a:latin typeface="Gill Sans"/>
-              <a:cs typeface="Gill Sans"/>
-            </a:endParaRPr>
           </a:p>
         </p:txBody>
       </p:sp>
@@ -13396,13 +16012,6 @@
               </a:rPr>
               <a:t>repair</a:t>
             </a:r>
-            <a:endParaRPr lang="en-US" dirty="0" smtClean="0">
-              <a:solidFill>
-                <a:schemeClr val="accent6"/>
-              </a:solidFill>
-              <a:latin typeface="Gill Sans"/>
-              <a:cs typeface="Gill Sans"/>
-            </a:endParaRPr>
           </a:p>
         </p:txBody>
       </p:sp>

</xml_diff>

<commit_message>
another pass on sec 3
</commit_message>
<xml_diff>
--- a/docs/sigmod15/figures/figs.pptx
+++ b/docs/sigmod15/figures/figs.pptx
@@ -113,7 +113,7 @@
   </p:defaultTextStyle>
   <p:extLst>
     <p:ext uri="{EFAFB233-063F-42B5-8137-9DF3F51BA10A}">
-      <p15:sldGuideLst xmlns:p15="http://schemas.microsoft.com/office/powerpoint/2012/main" xmlns="">
+      <p15:sldGuideLst xmlns="" xmlns:p15="http://schemas.microsoft.com/office/powerpoint/2012/main">
         <p15:guide id="1" orient="horz" pos="2160">
           <p15:clr>
             <a:srgbClr val="A4A3A4"/>
@@ -12507,7 +12507,7 @@
         </p:nvSpPr>
         <p:spPr>
           <a:xfrm>
-            <a:off x="2875999" y="6243482"/>
+            <a:off x="4971651" y="1010555"/>
             <a:ext cx="178885" cy="178885"/>
           </a:xfrm>
           <a:prstGeom prst="ellipse">
@@ -12558,7 +12558,7 @@
         </p:nvSpPr>
         <p:spPr>
           <a:xfrm>
-            <a:off x="3095022" y="6074660"/>
+            <a:off x="5120222" y="872922"/>
             <a:ext cx="1309974" cy="400110"/>
           </a:xfrm>
           <a:prstGeom prst="rect">
@@ -12597,7 +12597,7 @@
         </p:nvSpPr>
         <p:spPr>
           <a:xfrm>
-            <a:off x="4997498" y="6243482"/>
+            <a:off x="4971651" y="1314696"/>
             <a:ext cx="178885" cy="178885"/>
           </a:xfrm>
           <a:prstGeom prst="ellipse">
@@ -12648,7 +12648,7 @@
         </p:nvSpPr>
         <p:spPr>
           <a:xfrm>
-            <a:off x="5192697" y="6074660"/>
+            <a:off x="5120222" y="1177063"/>
             <a:ext cx="721672" cy="400110"/>
           </a:xfrm>
           <a:prstGeom prst="rect">
@@ -12687,7 +12687,7 @@
         </p:nvSpPr>
         <p:spPr>
           <a:xfrm>
-            <a:off x="3067530" y="2617513"/>
+            <a:off x="3067530" y="2455393"/>
             <a:ext cx="5063801" cy="3100862"/>
           </a:xfrm>
           <a:custGeom>
@@ -12802,7 +12802,7 @@
         </p:nvSpPr>
         <p:spPr>
           <a:xfrm>
-            <a:off x="5637209" y="3175460"/>
+            <a:off x="5637209" y="3013340"/>
             <a:ext cx="2429185" cy="2453568"/>
           </a:xfrm>
           <a:custGeom>
@@ -12913,20 +12913,17 @@
       </p:sp>
       <p:sp>
         <p:nvSpPr>
-          <p:cNvPr id="38" name="Down Arrow 37"/>
+          <p:cNvPr id="5" name="Folded Corner 4"/>
           <p:cNvSpPr/>
           <p:nvPr/>
         </p:nvSpPr>
         <p:spPr>
           <a:xfrm>
-            <a:off x="4085664" y="2417342"/>
-            <a:ext cx="296173" cy="946530"/>
-          </a:xfrm>
-          <a:prstGeom prst="downArrow">
-            <a:avLst>
-              <a:gd name="adj1" fmla="val 63385"/>
-              <a:gd name="adj2" fmla="val 50000"/>
-            </a:avLst>
+            <a:off x="891367" y="3044925"/>
+            <a:ext cx="1438083" cy="2511330"/>
+          </a:xfrm>
+          <a:prstGeom prst="foldedCorner">
+            <a:avLst/>
           </a:prstGeom>
           <a:solidFill>
             <a:schemeClr val="bg1"/>
@@ -12937,7 +12934,6 @@
                 <a:lumMod val="50000"/>
               </a:schemeClr>
             </a:solidFill>
-            <a:prstDash val="solid"/>
           </a:ln>
           <a:effectLst/>
         </p:spPr>
@@ -12970,66 +12966,13 @@
       </p:sp>
       <p:sp>
         <p:nvSpPr>
-          <p:cNvPr id="5" name="Folded Corner 4"/>
-          <p:cNvSpPr/>
-          <p:nvPr/>
-        </p:nvSpPr>
-        <p:spPr>
-          <a:xfrm>
-            <a:off x="891367" y="3207045"/>
-            <a:ext cx="1438083" cy="2511330"/>
-          </a:xfrm>
-          <a:prstGeom prst="foldedCorner">
-            <a:avLst/>
-          </a:prstGeom>
-          <a:solidFill>
-            <a:schemeClr val="bg1"/>
-          </a:solidFill>
-          <a:ln w="28575">
-            <a:solidFill>
-              <a:schemeClr val="bg1">
-                <a:lumMod val="50000"/>
-              </a:schemeClr>
-            </a:solidFill>
-          </a:ln>
-          <a:effectLst/>
-        </p:spPr>
-        <p:style>
-          <a:lnRef idx="1">
-            <a:schemeClr val="accent1"/>
-          </a:lnRef>
-          <a:fillRef idx="3">
-            <a:schemeClr val="accent1"/>
-          </a:fillRef>
-          <a:effectRef idx="2">
-            <a:schemeClr val="accent1"/>
-          </a:effectRef>
-          <a:fontRef idx="minor">
-            <a:schemeClr val="lt1"/>
-          </a:fontRef>
-        </p:style>
-        <p:txBody>
-          <a:bodyPr rtlCol="0" anchor="ctr"/>
-          <a:lstStyle/>
-          <a:p>
-            <a:pPr algn="ctr"/>
-            <a:endParaRPr lang="en-US" sz="2000">
-              <a:latin typeface="Alegreya" charset="0"/>
-              <a:ea typeface="Alegreya" charset="0"/>
-              <a:cs typeface="Alegreya" charset="0"/>
-            </a:endParaRPr>
-          </a:p>
-        </p:txBody>
-      </p:sp>
-      <p:sp>
-        <p:nvSpPr>
           <p:cNvPr id="4" name="TextBox 3"/>
           <p:cNvSpPr txBox="1"/>
           <p:nvPr/>
         </p:nvSpPr>
         <p:spPr>
           <a:xfrm>
-            <a:off x="891367" y="3635689"/>
+            <a:off x="891367" y="3473569"/>
             <a:ext cx="1484152" cy="1708160"/>
           </a:xfrm>
           <a:prstGeom prst="rect">
@@ -13261,7 +13204,7 @@
         </p:nvSpPr>
         <p:spPr>
           <a:xfrm>
-            <a:off x="891464" y="3235582"/>
+            <a:off x="891464" y="3073462"/>
             <a:ext cx="1202573" cy="400110"/>
           </a:xfrm>
           <a:prstGeom prst="rect">
@@ -13292,15 +13235,707 @@
           </a:p>
         </p:txBody>
       </p:sp>
+      <p:pic>
+        <p:nvPicPr>
+          <p:cNvPr id="3" name="Picture 2"/>
+          <p:cNvPicPr>
+            <a:picLocks noChangeAspect="1"/>
+          </p:cNvPicPr>
+          <p:nvPr/>
+        </p:nvPicPr>
+        <p:blipFill>
+          <a:blip r:embed="rId2"/>
+          <a:stretch>
+            <a:fillRect/>
+          </a:stretch>
+        </p:blipFill>
+        <p:spPr>
+          <a:xfrm>
+            <a:off x="764836" y="1084645"/>
+            <a:ext cx="1230822" cy="1230822"/>
+          </a:xfrm>
+          <a:prstGeom prst="rect">
+            <a:avLst/>
+          </a:prstGeom>
+          <a:effectLst/>
+        </p:spPr>
+      </p:pic>
+      <p:sp>
+        <p:nvSpPr>
+          <p:cNvPr id="29" name="TextBox 28"/>
+          <p:cNvSpPr txBox="1"/>
+          <p:nvPr/>
+        </p:nvSpPr>
+        <p:spPr>
+          <a:xfrm>
+            <a:off x="984209" y="919609"/>
+            <a:ext cx="792076" cy="400110"/>
+          </a:xfrm>
+          <a:prstGeom prst="rect">
+            <a:avLst/>
+          </a:prstGeom>
+          <a:noFill/>
+          <a:effectLst/>
+        </p:spPr>
+        <p:txBody>
+          <a:bodyPr wrap="none" rtlCol="0">
+            <a:spAutoFit/>
+          </a:bodyPr>
+          <a:lstStyle/>
+          <a:p>
+            <a:r>
+              <a:rPr lang="en-US" sz="2000" dirty="0" smtClean="0">
+                <a:latin typeface="Alegreya" charset="0"/>
+                <a:ea typeface="Alegreya" charset="0"/>
+                <a:cs typeface="Alegreya" charset="0"/>
+              </a:rPr>
+              <a:t>Users</a:t>
+            </a:r>
+          </a:p>
+        </p:txBody>
+      </p:sp>
+      <p:cxnSp>
+        <p:nvCxnSpPr>
+          <p:cNvPr id="33" name="Straight Arrow Connector 32"/>
+          <p:cNvCxnSpPr/>
+          <p:nvPr/>
+        </p:nvCxnSpPr>
+        <p:spPr>
+          <a:xfrm>
+            <a:off x="1927303" y="1711427"/>
+            <a:ext cx="396693" cy="0"/>
+          </a:xfrm>
+          <a:prstGeom prst="straightConnector1">
+            <a:avLst/>
+          </a:prstGeom>
+          <a:ln>
+            <a:solidFill>
+              <a:srgbClr val="595959"/>
+            </a:solidFill>
+            <a:tailEnd type="arrow"/>
+          </a:ln>
+          <a:effectLst/>
+        </p:spPr>
+        <p:style>
+          <a:lnRef idx="2">
+            <a:schemeClr val="accent1"/>
+          </a:lnRef>
+          <a:fillRef idx="0">
+            <a:schemeClr val="accent1"/>
+          </a:fillRef>
+          <a:effectRef idx="1">
+            <a:schemeClr val="accent1"/>
+          </a:effectRef>
+          <a:fontRef idx="minor">
+            <a:schemeClr val="tx1"/>
+          </a:fontRef>
+        </p:style>
+      </p:cxnSp>
+      <p:sp>
+        <p:nvSpPr>
+          <p:cNvPr id="37" name="TextBox 36"/>
+          <p:cNvSpPr txBox="1"/>
+          <p:nvPr/>
+        </p:nvSpPr>
+        <p:spPr>
+          <a:xfrm>
+            <a:off x="6262290" y="2494689"/>
+            <a:ext cx="1301057" cy="400110"/>
+          </a:xfrm>
+          <a:prstGeom prst="rect">
+            <a:avLst/>
+          </a:prstGeom>
+          <a:noFill/>
+          <a:effectLst/>
+        </p:spPr>
+        <p:txBody>
+          <a:bodyPr wrap="none" rtlCol="0">
+            <a:spAutoFit/>
+          </a:bodyPr>
+          <a:lstStyle/>
+          <a:p>
+            <a:r>
+              <a:rPr lang="en-US" sz="2000" cap="small" dirty="0" err="1" smtClean="0">
+                <a:latin typeface="Alegreya" charset="0"/>
+                <a:ea typeface="Alegreya" charset="0"/>
+                <a:cs typeface="Alegreya" charset="0"/>
+              </a:rPr>
+              <a:t>QueryFix</a:t>
+            </a:r>
+            <a:endParaRPr lang="en-US" sz="2000" cap="small" dirty="0" smtClean="0">
+              <a:latin typeface="Alegreya" charset="0"/>
+              <a:ea typeface="Alegreya" charset="0"/>
+              <a:cs typeface="Alegreya" charset="0"/>
+            </a:endParaRPr>
+          </a:p>
+        </p:txBody>
+      </p:sp>
+      <p:sp>
+        <p:nvSpPr>
+          <p:cNvPr id="42" name="TextBox 41"/>
+          <p:cNvSpPr txBox="1"/>
+          <p:nvPr/>
+        </p:nvSpPr>
+        <p:spPr>
+          <a:xfrm>
+            <a:off x="5871635" y="3637591"/>
+            <a:ext cx="1960332" cy="707886"/>
+          </a:xfrm>
+          <a:prstGeom prst="rect">
+            <a:avLst/>
+          </a:prstGeom>
+          <a:solidFill>
+            <a:schemeClr val="bg1"/>
+          </a:solidFill>
+          <a:ln w="28575">
+            <a:solidFill>
+              <a:schemeClr val="bg1">
+                <a:lumMod val="50000"/>
+              </a:schemeClr>
+            </a:solidFill>
+          </a:ln>
+          <a:effectLst/>
+        </p:spPr>
+        <p:txBody>
+          <a:bodyPr wrap="square" rtlCol="0">
+            <a:spAutoFit/>
+          </a:bodyPr>
+          <a:lstStyle/>
+          <a:p>
+            <a:pPr algn="ctr"/>
+            <a:r>
+              <a:rPr lang="en-US" sz="2000" dirty="0" smtClean="0">
+                <a:latin typeface="Alegreya" charset="0"/>
+                <a:ea typeface="Alegreya" charset="0"/>
+                <a:cs typeface="Alegreya" charset="0"/>
+              </a:rPr>
+              <a:t>Tuple, Query, &amp; Attribute Slicing</a:t>
+            </a:r>
+          </a:p>
+        </p:txBody>
+      </p:sp>
+      <p:sp>
+        <p:nvSpPr>
+          <p:cNvPr id="43" name="TextBox 42"/>
+          <p:cNvSpPr txBox="1"/>
+          <p:nvPr/>
+        </p:nvSpPr>
+        <p:spPr>
+          <a:xfrm>
+            <a:off x="5871635" y="4541997"/>
+            <a:ext cx="1960332" cy="707886"/>
+          </a:xfrm>
+          <a:prstGeom prst="rect">
+            <a:avLst/>
+          </a:prstGeom>
+          <a:solidFill>
+            <a:schemeClr val="bg1"/>
+          </a:solidFill>
+          <a:ln w="28575">
+            <a:solidFill>
+              <a:schemeClr val="bg1">
+                <a:lumMod val="50000"/>
+              </a:schemeClr>
+            </a:solidFill>
+          </a:ln>
+          <a:effectLst/>
+        </p:spPr>
+        <p:txBody>
+          <a:bodyPr wrap="square" rtlCol="0">
+            <a:spAutoFit/>
+          </a:bodyPr>
+          <a:lstStyle/>
+          <a:p>
+            <a:pPr algn="ctr"/>
+            <a:r>
+              <a:rPr lang="en-US" sz="2000" dirty="0" smtClean="0">
+                <a:latin typeface="Alegreya" charset="0"/>
+                <a:ea typeface="Alegreya" charset="0"/>
+                <a:cs typeface="Alegreya" charset="0"/>
+              </a:rPr>
+              <a:t>Incremental Repair</a:t>
+            </a:r>
+          </a:p>
+        </p:txBody>
+      </p:sp>
+      <p:cxnSp>
+        <p:nvCxnSpPr>
+          <p:cNvPr id="45" name="Straight Arrow Connector 44"/>
+          <p:cNvCxnSpPr>
+            <a:stCxn id="64" idx="2"/>
+            <a:endCxn id="65" idx="0"/>
+          </p:cNvCxnSpPr>
+          <p:nvPr/>
+        </p:nvCxnSpPr>
+        <p:spPr>
+          <a:xfrm>
+            <a:off x="4257769" y="3881586"/>
+            <a:ext cx="1633" cy="419004"/>
+          </a:xfrm>
+          <a:prstGeom prst="straightConnector1">
+            <a:avLst/>
+          </a:prstGeom>
+          <a:ln w="38100">
+            <a:solidFill>
+              <a:schemeClr val="bg1">
+                <a:lumMod val="50000"/>
+              </a:schemeClr>
+            </a:solidFill>
+            <a:headEnd type="none" w="med" len="med"/>
+            <a:tailEnd type="triangle" w="med" len="med"/>
+          </a:ln>
+          <a:effectLst/>
+        </p:spPr>
+        <p:style>
+          <a:lnRef idx="2">
+            <a:schemeClr val="accent1"/>
+          </a:lnRef>
+          <a:fillRef idx="0">
+            <a:schemeClr val="accent1"/>
+          </a:fillRef>
+          <a:effectRef idx="1">
+            <a:schemeClr val="accent1"/>
+          </a:effectRef>
+          <a:fontRef idx="minor">
+            <a:schemeClr val="tx1"/>
+          </a:fontRef>
+        </p:style>
+      </p:cxnSp>
+      <p:cxnSp>
+        <p:nvCxnSpPr>
+          <p:cNvPr id="49" name="Straight Arrow Connector 48"/>
+          <p:cNvCxnSpPr>
+            <a:stCxn id="65" idx="3"/>
+          </p:cNvCxnSpPr>
+          <p:nvPr/>
+        </p:nvCxnSpPr>
+        <p:spPr>
+          <a:xfrm>
+            <a:off x="5222635" y="4625951"/>
+            <a:ext cx="414573" cy="3385"/>
+          </a:xfrm>
+          <a:prstGeom prst="straightConnector1">
+            <a:avLst/>
+          </a:prstGeom>
+          <a:ln w="38100">
+            <a:solidFill>
+              <a:schemeClr val="bg1">
+                <a:lumMod val="50000"/>
+              </a:schemeClr>
+            </a:solidFill>
+            <a:headEnd type="none" w="med" len="med"/>
+            <a:tailEnd type="triangle" w="med" len="med"/>
+          </a:ln>
+          <a:effectLst/>
+        </p:spPr>
+        <p:style>
+          <a:lnRef idx="2">
+            <a:schemeClr val="accent1"/>
+          </a:lnRef>
+          <a:fillRef idx="0">
+            <a:schemeClr val="accent1"/>
+          </a:fillRef>
+          <a:effectRef idx="1">
+            <a:schemeClr val="accent1"/>
+          </a:effectRef>
+          <a:fontRef idx="minor">
+            <a:schemeClr val="tx1"/>
+          </a:fontRef>
+        </p:style>
+      </p:cxnSp>
+      <p:sp>
+        <p:nvSpPr>
+          <p:cNvPr id="53" name="TextBox 52"/>
+          <p:cNvSpPr txBox="1"/>
+          <p:nvPr/>
+        </p:nvSpPr>
+        <p:spPr>
+          <a:xfrm>
+            <a:off x="6209120" y="1286484"/>
+            <a:ext cx="1576072" cy="707886"/>
+          </a:xfrm>
+          <a:prstGeom prst="rect">
+            <a:avLst/>
+          </a:prstGeom>
+          <a:noFill/>
+          <a:effectLst/>
+        </p:spPr>
+        <p:txBody>
+          <a:bodyPr wrap="none" rtlCol="0">
+            <a:spAutoFit/>
+          </a:bodyPr>
+          <a:lstStyle/>
+          <a:p>
+            <a:pPr algn="ctr"/>
+            <a:r>
+              <a:rPr lang="en-US" sz="2000" dirty="0" smtClean="0">
+                <a:latin typeface="Alegreya" charset="0"/>
+                <a:ea typeface="Alegreya" charset="0"/>
+                <a:cs typeface="Alegreya" charset="0"/>
+              </a:rPr>
+              <a:t>diagnoses &amp;</a:t>
+            </a:r>
+          </a:p>
+          <a:p>
+            <a:pPr algn="ctr"/>
+            <a:r>
+              <a:rPr lang="en-US" sz="2000" dirty="0" smtClean="0">
+                <a:latin typeface="Alegreya" charset="0"/>
+                <a:ea typeface="Alegreya" charset="0"/>
+                <a:cs typeface="Alegreya" charset="0"/>
+              </a:rPr>
+              <a:t>query repairs</a:t>
+            </a:r>
+          </a:p>
+        </p:txBody>
+      </p:sp>
+      <p:sp>
+        <p:nvSpPr>
+          <p:cNvPr id="47" name="TextBox 46"/>
+          <p:cNvSpPr txBox="1"/>
+          <p:nvPr/>
+        </p:nvSpPr>
+        <p:spPr>
+          <a:xfrm>
+            <a:off x="6673464" y="3033548"/>
+            <a:ext cx="1271502" cy="400110"/>
+          </a:xfrm>
+          <a:prstGeom prst="rect">
+            <a:avLst/>
+          </a:prstGeom>
+          <a:noFill/>
+          <a:effectLst/>
+        </p:spPr>
+        <p:txBody>
+          <a:bodyPr wrap="none" rtlCol="0">
+            <a:spAutoFit/>
+          </a:bodyPr>
+          <a:lstStyle/>
+          <a:p>
+            <a:r>
+              <a:rPr lang="en-US" sz="2000" dirty="0" smtClean="0">
+                <a:solidFill>
+                  <a:srgbClr val="595959"/>
+                </a:solidFill>
+                <a:latin typeface="Alegreya" charset="0"/>
+                <a:ea typeface="Alegreya" charset="0"/>
+                <a:cs typeface="Alegreya" charset="0"/>
+              </a:rPr>
+              <a:t>Optimizer</a:t>
+            </a:r>
+          </a:p>
+        </p:txBody>
+      </p:sp>
+      <p:sp>
+        <p:nvSpPr>
+          <p:cNvPr id="57" name="Down Arrow 56"/>
+          <p:cNvSpPr/>
+          <p:nvPr/>
+        </p:nvSpPr>
+        <p:spPr>
+          <a:xfrm rot="16200000">
+            <a:off x="2652358" y="4181932"/>
+            <a:ext cx="296173" cy="923715"/>
+          </a:xfrm>
+          <a:prstGeom prst="downArrow">
+            <a:avLst>
+              <a:gd name="adj1" fmla="val 63385"/>
+              <a:gd name="adj2" fmla="val 50000"/>
+            </a:avLst>
+          </a:prstGeom>
+          <a:solidFill>
+            <a:schemeClr val="bg1"/>
+          </a:solidFill>
+          <a:ln w="28575">
+            <a:solidFill>
+              <a:schemeClr val="bg1">
+                <a:lumMod val="50000"/>
+              </a:schemeClr>
+            </a:solidFill>
+            <a:prstDash val="solid"/>
+          </a:ln>
+          <a:effectLst/>
+        </p:spPr>
+        <p:style>
+          <a:lnRef idx="1">
+            <a:schemeClr val="accent1"/>
+          </a:lnRef>
+          <a:fillRef idx="3">
+            <a:schemeClr val="accent1"/>
+          </a:fillRef>
+          <a:effectRef idx="2">
+            <a:schemeClr val="accent1"/>
+          </a:effectRef>
+          <a:fontRef idx="minor">
+            <a:schemeClr val="lt1"/>
+          </a:fontRef>
+        </p:style>
+        <p:txBody>
+          <a:bodyPr rtlCol="0" anchor="ctr"/>
+          <a:lstStyle/>
+          <a:p>
+            <a:pPr algn="ctr"/>
+            <a:endParaRPr lang="en-US" sz="2000">
+              <a:latin typeface="Alegreya" charset="0"/>
+              <a:ea typeface="Alegreya" charset="0"/>
+              <a:cs typeface="Alegreya" charset="0"/>
+            </a:endParaRPr>
+          </a:p>
+        </p:txBody>
+      </p:sp>
+      <p:sp>
+        <p:nvSpPr>
+          <p:cNvPr id="58" name="Down Arrow 57"/>
+          <p:cNvSpPr/>
+          <p:nvPr/>
+        </p:nvSpPr>
+        <p:spPr>
+          <a:xfrm rot="10800000">
+            <a:off x="6851797" y="1962364"/>
+            <a:ext cx="296173" cy="487420"/>
+          </a:xfrm>
+          <a:prstGeom prst="downArrow">
+            <a:avLst>
+              <a:gd name="adj1" fmla="val 63385"/>
+              <a:gd name="adj2" fmla="val 50000"/>
+            </a:avLst>
+          </a:prstGeom>
+          <a:solidFill>
+            <a:schemeClr val="bg1"/>
+          </a:solidFill>
+          <a:ln w="28575">
+            <a:solidFill>
+              <a:schemeClr val="bg1">
+                <a:lumMod val="50000"/>
+              </a:schemeClr>
+            </a:solidFill>
+            <a:prstDash val="solid"/>
+          </a:ln>
+          <a:effectLst/>
+        </p:spPr>
+        <p:style>
+          <a:lnRef idx="1">
+            <a:schemeClr val="accent1"/>
+          </a:lnRef>
+          <a:fillRef idx="3">
+            <a:schemeClr val="accent1"/>
+          </a:fillRef>
+          <a:effectRef idx="2">
+            <a:schemeClr val="accent1"/>
+          </a:effectRef>
+          <a:fontRef idx="minor">
+            <a:schemeClr val="lt1"/>
+          </a:fontRef>
+        </p:style>
+        <p:txBody>
+          <a:bodyPr rtlCol="0" anchor="ctr"/>
+          <a:lstStyle/>
+          <a:p>
+            <a:pPr algn="ctr"/>
+            <a:endParaRPr lang="en-US" sz="2000">
+              <a:latin typeface="Alegreya" charset="0"/>
+              <a:ea typeface="Alegreya" charset="0"/>
+              <a:cs typeface="Alegreya" charset="0"/>
+            </a:endParaRPr>
+          </a:p>
+        </p:txBody>
+      </p:sp>
+      <p:sp>
+        <p:nvSpPr>
+          <p:cNvPr id="64" name="Rectangle 63"/>
+          <p:cNvSpPr/>
+          <p:nvPr/>
+        </p:nvSpPr>
+        <p:spPr>
+          <a:xfrm>
+            <a:off x="3292903" y="3207588"/>
+            <a:ext cx="1929732" cy="673998"/>
+          </a:xfrm>
+          <a:prstGeom prst="rect">
+            <a:avLst/>
+          </a:prstGeom>
+          <a:noFill/>
+          <a:ln w="28575">
+            <a:solidFill>
+              <a:schemeClr val="bg1">
+                <a:lumMod val="50000"/>
+              </a:schemeClr>
+            </a:solidFill>
+          </a:ln>
+          <a:effectLst/>
+        </p:spPr>
+        <p:style>
+          <a:lnRef idx="1">
+            <a:schemeClr val="accent1"/>
+          </a:lnRef>
+          <a:fillRef idx="3">
+            <a:schemeClr val="accent1"/>
+          </a:fillRef>
+          <a:effectRef idx="2">
+            <a:schemeClr val="accent1"/>
+          </a:effectRef>
+          <a:fontRef idx="minor">
+            <a:schemeClr val="lt1"/>
+          </a:fontRef>
+        </p:style>
+        <p:txBody>
+          <a:bodyPr rtlCol="0" anchor="ctr"/>
+          <a:lstStyle/>
+          <a:p>
+            <a:pPr algn="ctr"/>
+            <a:r>
+              <a:rPr lang="en-US" sz="2000" dirty="0" smtClean="0">
+                <a:solidFill>
+                  <a:schemeClr val="tx1"/>
+                </a:solidFill>
+                <a:latin typeface="Alegreya" charset="0"/>
+                <a:ea typeface="Alegreya" charset="0"/>
+                <a:cs typeface="Alegreya" charset="0"/>
+              </a:rPr>
+              <a:t>Outlier Removal</a:t>
+            </a:r>
+            <a:endParaRPr lang="en-US" sz="2000" dirty="0">
+              <a:solidFill>
+                <a:schemeClr val="tx1"/>
+              </a:solidFill>
+              <a:latin typeface="Alegreya" charset="0"/>
+              <a:ea typeface="Alegreya" charset="0"/>
+              <a:cs typeface="Alegreya" charset="0"/>
+            </a:endParaRPr>
+          </a:p>
+        </p:txBody>
+      </p:sp>
+      <p:sp>
+        <p:nvSpPr>
+          <p:cNvPr id="65" name="Rectangle 64"/>
+          <p:cNvSpPr/>
+          <p:nvPr/>
+        </p:nvSpPr>
+        <p:spPr>
+          <a:xfrm>
+            <a:off x="3296169" y="4300590"/>
+            <a:ext cx="1926466" cy="650722"/>
+          </a:xfrm>
+          <a:prstGeom prst="rect">
+            <a:avLst/>
+          </a:prstGeom>
+          <a:noFill/>
+          <a:ln w="28575">
+            <a:solidFill>
+              <a:schemeClr val="bg1">
+                <a:lumMod val="50000"/>
+              </a:schemeClr>
+            </a:solidFill>
+          </a:ln>
+          <a:effectLst/>
+        </p:spPr>
+        <p:style>
+          <a:lnRef idx="1">
+            <a:schemeClr val="accent1"/>
+          </a:lnRef>
+          <a:fillRef idx="3">
+            <a:schemeClr val="accent1"/>
+          </a:fillRef>
+          <a:effectRef idx="2">
+            <a:schemeClr val="accent1"/>
+          </a:effectRef>
+          <a:fontRef idx="minor">
+            <a:schemeClr val="lt1"/>
+          </a:fontRef>
+        </p:style>
+        <p:txBody>
+          <a:bodyPr rtlCol="0" anchor="ctr"/>
+          <a:lstStyle/>
+          <a:p>
+            <a:pPr algn="ctr"/>
+            <a:r>
+              <a:rPr lang="en-US" sz="2000" dirty="0" smtClean="0">
+                <a:solidFill>
+                  <a:schemeClr val="tx1"/>
+                </a:solidFill>
+                <a:latin typeface="Alegreya" charset="0"/>
+                <a:ea typeface="Alegreya" charset="0"/>
+                <a:cs typeface="Alegreya" charset="0"/>
+              </a:rPr>
+              <a:t>MILP Encoding</a:t>
+            </a:r>
+            <a:endParaRPr lang="en-US" sz="2000" dirty="0">
+              <a:solidFill>
+                <a:schemeClr val="tx1"/>
+              </a:solidFill>
+              <a:latin typeface="Alegreya" charset="0"/>
+              <a:ea typeface="Alegreya" charset="0"/>
+              <a:cs typeface="Alegreya" charset="0"/>
+            </a:endParaRPr>
+          </a:p>
+        </p:txBody>
+      </p:sp>
+      <p:sp>
+        <p:nvSpPr>
+          <p:cNvPr id="52" name="Down Arrow 51"/>
+          <p:cNvSpPr/>
+          <p:nvPr/>
+        </p:nvSpPr>
+        <p:spPr>
+          <a:xfrm>
+            <a:off x="4093801" y="2417342"/>
+            <a:ext cx="331202" cy="789703"/>
+          </a:xfrm>
+          <a:prstGeom prst="downArrow">
+            <a:avLst>
+              <a:gd name="adj1" fmla="val 63385"/>
+              <a:gd name="adj2" fmla="val 50000"/>
+            </a:avLst>
+          </a:prstGeom>
+          <a:solidFill>
+            <a:schemeClr val="bg1"/>
+          </a:solidFill>
+          <a:ln w="28575">
+            <a:solidFill>
+              <a:schemeClr val="bg1">
+                <a:lumMod val="50000"/>
+              </a:schemeClr>
+            </a:solidFill>
+            <a:prstDash val="solid"/>
+          </a:ln>
+          <a:effectLst/>
+        </p:spPr>
+        <p:style>
+          <a:lnRef idx="1">
+            <a:schemeClr val="accent1"/>
+          </a:lnRef>
+          <a:fillRef idx="3">
+            <a:schemeClr val="accent1"/>
+          </a:fillRef>
+          <a:effectRef idx="2">
+            <a:schemeClr val="accent1"/>
+          </a:effectRef>
+          <a:fontRef idx="minor">
+            <a:schemeClr val="lt1"/>
+          </a:fontRef>
+        </p:style>
+        <p:txBody>
+          <a:bodyPr rtlCol="0" anchor="ctr"/>
+          <a:lstStyle/>
+          <a:p>
+            <a:pPr algn="ctr"/>
+            <a:endParaRPr lang="en-US" sz="2000">
+              <a:latin typeface="Alegreya" charset="0"/>
+              <a:ea typeface="Alegreya" charset="0"/>
+              <a:cs typeface="Alegreya" charset="0"/>
+            </a:endParaRPr>
+          </a:p>
+        </p:txBody>
+      </p:sp>
       <p:grpSp>
         <p:nvGrpSpPr>
-          <p:cNvPr id="44" name="Group 43"/>
+          <p:cNvPr id="59" name="Group 58"/>
           <p:cNvGrpSpPr/>
           <p:nvPr/>
         </p:nvGrpSpPr>
         <p:grpSpPr>
           <a:xfrm>
-            <a:off x="3157134" y="1448032"/>
+            <a:off x="2543501" y="1448032"/>
             <a:ext cx="2139217" cy="178885"/>
             <a:chOff x="3157134" y="1063984"/>
             <a:chExt cx="2139217" cy="178885"/>
@@ -13309,7 +13944,7 @@
         </p:grpSpPr>
         <p:sp>
           <p:nvSpPr>
-            <p:cNvPr id="2" name="Oval 1"/>
+            <p:cNvPr id="61" name="Oval 60"/>
             <p:cNvSpPr/>
             <p:nvPr/>
           </p:nvSpPr>
@@ -13360,7 +13995,7 @@
         </p:sp>
         <p:sp>
           <p:nvSpPr>
-            <p:cNvPr id="8" name="Oval 7"/>
+            <p:cNvPr id="62" name="Oval 61"/>
             <p:cNvSpPr/>
             <p:nvPr/>
           </p:nvSpPr>
@@ -13411,7 +14046,7 @@
         </p:sp>
         <p:sp>
           <p:nvSpPr>
-            <p:cNvPr id="9" name="Oval 8"/>
+            <p:cNvPr id="63" name="Oval 62"/>
             <p:cNvSpPr/>
             <p:nvPr/>
           </p:nvSpPr>
@@ -13465,7 +14100,7 @@
         </p:sp>
         <p:sp>
           <p:nvSpPr>
-            <p:cNvPr id="10" name="Oval 9"/>
+            <p:cNvPr id="66" name="Oval 65"/>
             <p:cNvSpPr/>
             <p:nvPr/>
           </p:nvSpPr>
@@ -13516,7 +14151,7 @@
         </p:sp>
         <p:sp>
           <p:nvSpPr>
-            <p:cNvPr id="11" name="Oval 10"/>
+            <p:cNvPr id="67" name="Oval 66"/>
             <p:cNvSpPr/>
             <p:nvPr/>
           </p:nvSpPr>
@@ -13567,7 +14202,7 @@
         </p:sp>
         <p:sp>
           <p:nvSpPr>
-            <p:cNvPr id="12" name="Oval 11"/>
+            <p:cNvPr id="68" name="Oval 67"/>
             <p:cNvSpPr/>
             <p:nvPr/>
           </p:nvSpPr>
@@ -13618,7 +14253,7 @@
         </p:sp>
         <p:sp>
           <p:nvSpPr>
-            <p:cNvPr id="13" name="Oval 12"/>
+            <p:cNvPr id="69" name="Oval 68"/>
             <p:cNvSpPr/>
             <p:nvPr/>
           </p:nvSpPr>
@@ -13670,13 +14305,13 @@
       </p:grpSp>
       <p:grpSp>
         <p:nvGrpSpPr>
-          <p:cNvPr id="36" name="Group 35"/>
+          <p:cNvPr id="70" name="Group 69"/>
           <p:cNvGrpSpPr/>
           <p:nvPr/>
         </p:nvGrpSpPr>
         <p:grpSpPr>
           <a:xfrm>
-            <a:off x="3157134" y="1696816"/>
+            <a:off x="2543501" y="1696816"/>
             <a:ext cx="2139217" cy="178885"/>
             <a:chOff x="3157134" y="1312768"/>
             <a:chExt cx="2139217" cy="178885"/>
@@ -13685,7 +14320,7 @@
         </p:grpSpPr>
         <p:sp>
           <p:nvSpPr>
-            <p:cNvPr id="14" name="Oval 13"/>
+            <p:cNvPr id="71" name="Oval 70"/>
             <p:cNvSpPr/>
             <p:nvPr/>
           </p:nvSpPr>
@@ -13736,7 +14371,7 @@
         </p:sp>
         <p:sp>
           <p:nvSpPr>
-            <p:cNvPr id="15" name="Oval 14"/>
+            <p:cNvPr id="72" name="Oval 71"/>
             <p:cNvSpPr/>
             <p:nvPr/>
           </p:nvSpPr>
@@ -13787,7 +14422,7 @@
         </p:sp>
         <p:sp>
           <p:nvSpPr>
-            <p:cNvPr id="16" name="Oval 15"/>
+            <p:cNvPr id="73" name="Oval 72"/>
             <p:cNvSpPr/>
             <p:nvPr/>
           </p:nvSpPr>
@@ -13838,7 +14473,7 @@
         </p:sp>
         <p:sp>
           <p:nvSpPr>
-            <p:cNvPr id="17" name="Oval 16"/>
+            <p:cNvPr id="74" name="Oval 73"/>
             <p:cNvSpPr/>
             <p:nvPr/>
           </p:nvSpPr>
@@ -13889,7 +14524,7 @@
         </p:sp>
         <p:sp>
           <p:nvSpPr>
-            <p:cNvPr id="18" name="Oval 17"/>
+            <p:cNvPr id="75" name="Oval 74"/>
             <p:cNvSpPr/>
             <p:nvPr/>
           </p:nvSpPr>
@@ -13940,7 +14575,7 @@
         </p:sp>
         <p:sp>
           <p:nvSpPr>
-            <p:cNvPr id="19" name="Oval 18"/>
+            <p:cNvPr id="76" name="Oval 75"/>
             <p:cNvSpPr/>
             <p:nvPr/>
           </p:nvSpPr>
@@ -13991,7 +14626,7 @@
         </p:sp>
         <p:sp>
           <p:nvSpPr>
-            <p:cNvPr id="20" name="Oval 19"/>
+            <p:cNvPr id="77" name="Oval 76"/>
             <p:cNvSpPr/>
             <p:nvPr/>
           </p:nvSpPr>
@@ -14043,13 +14678,13 @@
       </p:grpSp>
       <p:grpSp>
         <p:nvGrpSpPr>
-          <p:cNvPr id="30" name="Group 29"/>
+          <p:cNvPr id="78" name="Group 77"/>
           <p:cNvGrpSpPr/>
           <p:nvPr/>
         </p:nvGrpSpPr>
         <p:grpSpPr>
           <a:xfrm>
-            <a:off x="3157134" y="1945600"/>
+            <a:off x="2543501" y="1945600"/>
             <a:ext cx="2139217" cy="178885"/>
             <a:chOff x="3157134" y="1561552"/>
             <a:chExt cx="2139217" cy="178885"/>
@@ -14058,7 +14693,7 @@
         </p:grpSpPr>
         <p:sp>
           <p:nvSpPr>
-            <p:cNvPr id="21" name="Oval 20"/>
+            <p:cNvPr id="79" name="Oval 78"/>
             <p:cNvSpPr/>
             <p:nvPr/>
           </p:nvSpPr>
@@ -14109,7 +14744,7 @@
         </p:sp>
         <p:sp>
           <p:nvSpPr>
-            <p:cNvPr id="22" name="Oval 21"/>
+            <p:cNvPr id="80" name="Oval 79"/>
             <p:cNvSpPr/>
             <p:nvPr/>
           </p:nvSpPr>
@@ -14160,7 +14795,7 @@
         </p:sp>
         <p:sp>
           <p:nvSpPr>
-            <p:cNvPr id="23" name="Oval 22"/>
+            <p:cNvPr id="81" name="Oval 80"/>
             <p:cNvSpPr/>
             <p:nvPr/>
           </p:nvSpPr>
@@ -14211,7 +14846,7 @@
         </p:sp>
         <p:sp>
           <p:nvSpPr>
-            <p:cNvPr id="24" name="Oval 23"/>
+            <p:cNvPr id="82" name="Oval 81"/>
             <p:cNvSpPr/>
             <p:nvPr/>
           </p:nvSpPr>
@@ -14262,7 +14897,7 @@
         </p:sp>
         <p:sp>
           <p:nvSpPr>
-            <p:cNvPr id="25" name="Oval 24"/>
+            <p:cNvPr id="83" name="Oval 82"/>
             <p:cNvSpPr/>
             <p:nvPr/>
           </p:nvSpPr>
@@ -14313,7 +14948,7 @@
         </p:sp>
         <p:sp>
           <p:nvSpPr>
-            <p:cNvPr id="26" name="Oval 25"/>
+            <p:cNvPr id="84" name="Oval 83"/>
             <p:cNvSpPr/>
             <p:nvPr/>
           </p:nvSpPr>
@@ -14364,7 +14999,7 @@
         </p:sp>
         <p:sp>
           <p:nvSpPr>
-            <p:cNvPr id="27" name="Oval 26"/>
+            <p:cNvPr id="85" name="Oval 84"/>
             <p:cNvSpPr/>
             <p:nvPr/>
           </p:nvSpPr>
@@ -14416,13 +15051,13 @@
       </p:grpSp>
       <p:sp>
         <p:nvSpPr>
-          <p:cNvPr id="28" name="TextBox 27"/>
+          <p:cNvPr id="86" name="TextBox 85"/>
           <p:cNvSpPr txBox="1"/>
           <p:nvPr/>
         </p:nvSpPr>
         <p:spPr>
           <a:xfrm>
-            <a:off x="3054884" y="918644"/>
+            <a:off x="2527916" y="918644"/>
             <a:ext cx="1157689" cy="400110"/>
           </a:xfrm>
           <a:prstGeom prst="rect">
@@ -14453,424 +15088,27 @@
           </a:p>
         </p:txBody>
       </p:sp>
-      <p:pic>
-        <p:nvPicPr>
-          <p:cNvPr id="3" name="Picture 2"/>
-          <p:cNvPicPr>
-            <a:picLocks noChangeAspect="1"/>
-          </p:cNvPicPr>
-          <p:nvPr/>
-        </p:nvPicPr>
-        <p:blipFill>
-          <a:blip r:embed="rId2"/>
-          <a:stretch>
-            <a:fillRect/>
-          </a:stretch>
-        </p:blipFill>
-        <p:spPr>
-          <a:xfrm>
-            <a:off x="764836" y="1084645"/>
-            <a:ext cx="1230822" cy="1230822"/>
+      <p:sp>
+        <p:nvSpPr>
+          <p:cNvPr id="87" name="Rectangle 86"/>
+          <p:cNvSpPr/>
+          <p:nvPr/>
+        </p:nvSpPr>
+        <p:spPr>
+          <a:xfrm>
+            <a:off x="2321499" y="886759"/>
+            <a:ext cx="2583220" cy="1531199"/>
           </a:xfrm>
           <a:prstGeom prst="rect">
             <a:avLst/>
           </a:prstGeom>
-          <a:effectLst/>
-        </p:spPr>
-      </p:pic>
-      <p:sp>
-        <p:nvSpPr>
-          <p:cNvPr id="29" name="TextBox 28"/>
-          <p:cNvSpPr txBox="1"/>
-          <p:nvPr/>
-        </p:nvSpPr>
-        <p:spPr>
-          <a:xfrm>
-            <a:off x="984209" y="919609"/>
-            <a:ext cx="792076" cy="400110"/>
-          </a:xfrm>
-          <a:prstGeom prst="rect">
-            <a:avLst/>
-          </a:prstGeom>
           <a:noFill/>
-          <a:effectLst/>
-        </p:spPr>
-        <p:txBody>
-          <a:bodyPr wrap="none" rtlCol="0">
-            <a:spAutoFit/>
-          </a:bodyPr>
-          <a:lstStyle/>
-          <a:p>
-            <a:r>
-              <a:rPr lang="en-US" sz="2000" dirty="0" smtClean="0">
-                <a:latin typeface="Alegreya" charset="0"/>
-                <a:ea typeface="Alegreya" charset="0"/>
-                <a:cs typeface="Alegreya" charset="0"/>
-              </a:rPr>
-              <a:t>Users</a:t>
-            </a:r>
-          </a:p>
-        </p:txBody>
-      </p:sp>
-      <p:cxnSp>
-        <p:nvCxnSpPr>
-          <p:cNvPr id="33" name="Straight Arrow Connector 32"/>
-          <p:cNvCxnSpPr/>
-          <p:nvPr/>
-        </p:nvCxnSpPr>
-        <p:spPr>
-          <a:xfrm>
-            <a:off x="2143495" y="1711427"/>
-            <a:ext cx="704971" cy="0"/>
-          </a:xfrm>
-          <a:prstGeom prst="straightConnector1">
-            <a:avLst/>
-          </a:prstGeom>
-          <a:ln>
-            <a:solidFill>
-              <a:srgbClr val="595959"/>
-            </a:solidFill>
-            <a:tailEnd type="arrow"/>
-          </a:ln>
-          <a:effectLst/>
-        </p:spPr>
-        <p:style>
-          <a:lnRef idx="2">
-            <a:schemeClr val="accent1"/>
-          </a:lnRef>
-          <a:fillRef idx="0">
-            <a:schemeClr val="accent1"/>
-          </a:fillRef>
-          <a:effectRef idx="1">
-            <a:schemeClr val="accent1"/>
-          </a:effectRef>
-          <a:fontRef idx="minor">
-            <a:schemeClr val="tx1"/>
-          </a:fontRef>
-        </p:style>
-      </p:cxnSp>
-      <p:sp>
-        <p:nvSpPr>
-          <p:cNvPr id="37" name="TextBox 36"/>
-          <p:cNvSpPr txBox="1"/>
-          <p:nvPr/>
-        </p:nvSpPr>
-        <p:spPr>
-          <a:xfrm>
-            <a:off x="6262290" y="2656809"/>
-            <a:ext cx="1301057" cy="400110"/>
-          </a:xfrm>
-          <a:prstGeom prst="rect">
-            <a:avLst/>
-          </a:prstGeom>
-          <a:noFill/>
-          <a:effectLst/>
-        </p:spPr>
-        <p:txBody>
-          <a:bodyPr wrap="none" rtlCol="0">
-            <a:spAutoFit/>
-          </a:bodyPr>
-          <a:lstStyle/>
-          <a:p>
-            <a:r>
-              <a:rPr lang="en-US" sz="2000" cap="small" dirty="0" err="1" smtClean="0">
-                <a:latin typeface="Alegreya" charset="0"/>
-                <a:ea typeface="Alegreya" charset="0"/>
-                <a:cs typeface="Alegreya" charset="0"/>
-              </a:rPr>
-              <a:t>QueryFix</a:t>
-            </a:r>
-            <a:endParaRPr lang="en-US" sz="2000" cap="small" dirty="0" smtClean="0">
-              <a:latin typeface="Alegreya" charset="0"/>
-              <a:ea typeface="Alegreya" charset="0"/>
-              <a:cs typeface="Alegreya" charset="0"/>
-            </a:endParaRPr>
-          </a:p>
-        </p:txBody>
-      </p:sp>
-      <p:sp>
-        <p:nvSpPr>
-          <p:cNvPr id="42" name="TextBox 41"/>
-          <p:cNvSpPr txBox="1"/>
-          <p:nvPr/>
-        </p:nvSpPr>
-        <p:spPr>
-          <a:xfrm>
-            <a:off x="5871635" y="3799711"/>
-            <a:ext cx="1960332" cy="707886"/>
-          </a:xfrm>
-          <a:prstGeom prst="rect">
-            <a:avLst/>
-          </a:prstGeom>
-          <a:solidFill>
-            <a:schemeClr val="bg1"/>
-          </a:solidFill>
           <a:ln w="28575">
             <a:solidFill>
               <a:schemeClr val="bg1">
                 <a:lumMod val="50000"/>
               </a:schemeClr>
             </a:solidFill>
-          </a:ln>
-          <a:effectLst/>
-        </p:spPr>
-        <p:txBody>
-          <a:bodyPr wrap="square" rtlCol="0">
-            <a:spAutoFit/>
-          </a:bodyPr>
-          <a:lstStyle/>
-          <a:p>
-            <a:pPr algn="ctr"/>
-            <a:r>
-              <a:rPr lang="en-US" sz="2000" dirty="0" smtClean="0">
-                <a:latin typeface="Alegreya" charset="0"/>
-                <a:ea typeface="Alegreya" charset="0"/>
-                <a:cs typeface="Alegreya" charset="0"/>
-              </a:rPr>
-              <a:t>Tuple, Query, &amp; Attribute Slicing</a:t>
-            </a:r>
-          </a:p>
-        </p:txBody>
-      </p:sp>
-      <p:sp>
-        <p:nvSpPr>
-          <p:cNvPr id="43" name="TextBox 42"/>
-          <p:cNvSpPr txBox="1"/>
-          <p:nvPr/>
-        </p:nvSpPr>
-        <p:spPr>
-          <a:xfrm>
-            <a:off x="5871635" y="4704117"/>
-            <a:ext cx="1960332" cy="707886"/>
-          </a:xfrm>
-          <a:prstGeom prst="rect">
-            <a:avLst/>
-          </a:prstGeom>
-          <a:solidFill>
-            <a:schemeClr val="bg1"/>
-          </a:solidFill>
-          <a:ln w="28575">
-            <a:solidFill>
-              <a:schemeClr val="bg1">
-                <a:lumMod val="50000"/>
-              </a:schemeClr>
-            </a:solidFill>
-          </a:ln>
-          <a:effectLst/>
-        </p:spPr>
-        <p:txBody>
-          <a:bodyPr wrap="square" rtlCol="0">
-            <a:spAutoFit/>
-          </a:bodyPr>
-          <a:lstStyle/>
-          <a:p>
-            <a:pPr algn="ctr"/>
-            <a:r>
-              <a:rPr lang="en-US" sz="2000" dirty="0" smtClean="0">
-                <a:latin typeface="Alegreya" charset="0"/>
-                <a:ea typeface="Alegreya" charset="0"/>
-                <a:cs typeface="Alegreya" charset="0"/>
-              </a:rPr>
-              <a:t>Incremental Repair</a:t>
-            </a:r>
-          </a:p>
-        </p:txBody>
-      </p:sp>
-      <p:cxnSp>
-        <p:nvCxnSpPr>
-          <p:cNvPr id="45" name="Straight Arrow Connector 44"/>
-          <p:cNvCxnSpPr>
-            <a:stCxn id="64" idx="2"/>
-            <a:endCxn id="65" idx="0"/>
-          </p:cNvCxnSpPr>
-          <p:nvPr/>
-        </p:nvCxnSpPr>
-        <p:spPr>
-          <a:xfrm>
-            <a:off x="4257769" y="4043706"/>
-            <a:ext cx="1633" cy="419004"/>
-          </a:xfrm>
-          <a:prstGeom prst="straightConnector1">
-            <a:avLst/>
-          </a:prstGeom>
-          <a:ln w="38100">
-            <a:solidFill>
-              <a:schemeClr val="bg1">
-                <a:lumMod val="50000"/>
-              </a:schemeClr>
-            </a:solidFill>
-            <a:headEnd type="none" w="med" len="med"/>
-            <a:tailEnd type="triangle" w="med" len="med"/>
-          </a:ln>
-          <a:effectLst/>
-        </p:spPr>
-        <p:style>
-          <a:lnRef idx="2">
-            <a:schemeClr val="accent1"/>
-          </a:lnRef>
-          <a:fillRef idx="0">
-            <a:schemeClr val="accent1"/>
-          </a:fillRef>
-          <a:effectRef idx="1">
-            <a:schemeClr val="accent1"/>
-          </a:effectRef>
-          <a:fontRef idx="minor">
-            <a:schemeClr val="tx1"/>
-          </a:fontRef>
-        </p:style>
-      </p:cxnSp>
-      <p:cxnSp>
-        <p:nvCxnSpPr>
-          <p:cNvPr id="49" name="Straight Arrow Connector 48"/>
-          <p:cNvCxnSpPr>
-            <a:stCxn id="65" idx="3"/>
-          </p:cNvCxnSpPr>
-          <p:nvPr/>
-        </p:nvCxnSpPr>
-        <p:spPr>
-          <a:xfrm>
-            <a:off x="5222635" y="4788071"/>
-            <a:ext cx="414573" cy="3385"/>
-          </a:xfrm>
-          <a:prstGeom prst="straightConnector1">
-            <a:avLst/>
-          </a:prstGeom>
-          <a:ln w="38100">
-            <a:solidFill>
-              <a:schemeClr val="bg1">
-                <a:lumMod val="50000"/>
-              </a:schemeClr>
-            </a:solidFill>
-            <a:headEnd type="none" w="med" len="med"/>
-            <a:tailEnd type="triangle" w="med" len="med"/>
-          </a:ln>
-          <a:effectLst/>
-        </p:spPr>
-        <p:style>
-          <a:lnRef idx="2">
-            <a:schemeClr val="accent1"/>
-          </a:lnRef>
-          <a:fillRef idx="0">
-            <a:schemeClr val="accent1"/>
-          </a:fillRef>
-          <a:effectRef idx="1">
-            <a:schemeClr val="accent1"/>
-          </a:effectRef>
-          <a:fontRef idx="minor">
-            <a:schemeClr val="tx1"/>
-          </a:fontRef>
-        </p:style>
-      </p:cxnSp>
-      <p:sp>
-        <p:nvSpPr>
-          <p:cNvPr id="53" name="TextBox 52"/>
-          <p:cNvSpPr txBox="1"/>
-          <p:nvPr/>
-        </p:nvSpPr>
-        <p:spPr>
-          <a:xfrm>
-            <a:off x="6209120" y="932479"/>
-            <a:ext cx="1576072" cy="707886"/>
-          </a:xfrm>
-          <a:prstGeom prst="rect">
-            <a:avLst/>
-          </a:prstGeom>
-          <a:noFill/>
-          <a:effectLst/>
-        </p:spPr>
-        <p:txBody>
-          <a:bodyPr wrap="none" rtlCol="0">
-            <a:spAutoFit/>
-          </a:bodyPr>
-          <a:lstStyle/>
-          <a:p>
-            <a:pPr algn="ctr"/>
-            <a:r>
-              <a:rPr lang="en-US" sz="2000" dirty="0" smtClean="0">
-                <a:latin typeface="Alegreya" charset="0"/>
-                <a:ea typeface="Alegreya" charset="0"/>
-                <a:cs typeface="Alegreya" charset="0"/>
-              </a:rPr>
-              <a:t>diagnoses &amp;</a:t>
-            </a:r>
-          </a:p>
-          <a:p>
-            <a:pPr algn="ctr"/>
-            <a:r>
-              <a:rPr lang="en-US" sz="2000" dirty="0" smtClean="0">
-                <a:latin typeface="Alegreya" charset="0"/>
-                <a:ea typeface="Alegreya" charset="0"/>
-                <a:cs typeface="Alegreya" charset="0"/>
-              </a:rPr>
-              <a:t>query repairs</a:t>
-            </a:r>
-          </a:p>
-        </p:txBody>
-      </p:sp>
-      <p:sp>
-        <p:nvSpPr>
-          <p:cNvPr id="47" name="TextBox 46"/>
-          <p:cNvSpPr txBox="1"/>
-          <p:nvPr/>
-        </p:nvSpPr>
-        <p:spPr>
-          <a:xfrm>
-            <a:off x="6673464" y="3195668"/>
-            <a:ext cx="1271502" cy="400110"/>
-          </a:xfrm>
-          <a:prstGeom prst="rect">
-            <a:avLst/>
-          </a:prstGeom>
-          <a:noFill/>
-          <a:effectLst/>
-        </p:spPr>
-        <p:txBody>
-          <a:bodyPr wrap="none" rtlCol="0">
-            <a:spAutoFit/>
-          </a:bodyPr>
-          <a:lstStyle/>
-          <a:p>
-            <a:r>
-              <a:rPr lang="en-US" sz="2000" dirty="0" smtClean="0">
-                <a:solidFill>
-                  <a:srgbClr val="595959"/>
-                </a:solidFill>
-                <a:latin typeface="Alegreya" charset="0"/>
-                <a:ea typeface="Alegreya" charset="0"/>
-                <a:cs typeface="Alegreya" charset="0"/>
-              </a:rPr>
-              <a:t>Optimizer</a:t>
-            </a:r>
-          </a:p>
-        </p:txBody>
-      </p:sp>
-      <p:sp>
-        <p:nvSpPr>
-          <p:cNvPr id="57" name="Down Arrow 56"/>
-          <p:cNvSpPr/>
-          <p:nvPr/>
-        </p:nvSpPr>
-        <p:spPr>
-          <a:xfrm rot="16200000">
-            <a:off x="2652358" y="4344052"/>
-            <a:ext cx="296173" cy="923715"/>
-          </a:xfrm>
-          <a:prstGeom prst="downArrow">
-            <a:avLst>
-              <a:gd name="adj1" fmla="val 63385"/>
-              <a:gd name="adj2" fmla="val 50000"/>
-            </a:avLst>
-          </a:prstGeom>
-          <a:solidFill>
-            <a:schemeClr val="bg1"/>
-          </a:solidFill>
-          <a:ln w="28575">
-            <a:solidFill>
-              <a:schemeClr val="bg1">
-                <a:lumMod val="50000"/>
-              </a:schemeClr>
-            </a:solidFill>
-            <a:prstDash val="solid"/>
           </a:ln>
           <a:effectLst/>
         </p:spPr>
@@ -14893,245 +15131,7 @@
           <a:lstStyle/>
           <a:p>
             <a:pPr algn="ctr"/>
-            <a:endParaRPr lang="en-US" sz="2000">
-              <a:latin typeface="Alegreya" charset="0"/>
-              <a:ea typeface="Alegreya" charset="0"/>
-              <a:cs typeface="Alegreya" charset="0"/>
-            </a:endParaRPr>
-          </a:p>
-        </p:txBody>
-      </p:sp>
-      <p:sp>
-        <p:nvSpPr>
-          <p:cNvPr id="58" name="Down Arrow 57"/>
-          <p:cNvSpPr/>
-          <p:nvPr/>
-        </p:nvSpPr>
-        <p:spPr>
-          <a:xfrm rot="10800000">
-            <a:off x="6851801" y="1665376"/>
-            <a:ext cx="296173" cy="946530"/>
-          </a:xfrm>
-          <a:prstGeom prst="downArrow">
-            <a:avLst>
-              <a:gd name="adj1" fmla="val 63385"/>
-              <a:gd name="adj2" fmla="val 50000"/>
-            </a:avLst>
-          </a:prstGeom>
-          <a:solidFill>
-            <a:schemeClr val="bg1"/>
-          </a:solidFill>
-          <a:ln w="28575">
-            <a:solidFill>
-              <a:schemeClr val="bg1">
-                <a:lumMod val="50000"/>
-              </a:schemeClr>
-            </a:solidFill>
-            <a:prstDash val="solid"/>
-          </a:ln>
-          <a:effectLst/>
-        </p:spPr>
-        <p:style>
-          <a:lnRef idx="1">
-            <a:schemeClr val="accent1"/>
-          </a:lnRef>
-          <a:fillRef idx="3">
-            <a:schemeClr val="accent1"/>
-          </a:fillRef>
-          <a:effectRef idx="2">
-            <a:schemeClr val="accent1"/>
-          </a:effectRef>
-          <a:fontRef idx="minor">
-            <a:schemeClr val="lt1"/>
-          </a:fontRef>
-        </p:style>
-        <p:txBody>
-          <a:bodyPr rtlCol="0" anchor="ctr"/>
-          <a:lstStyle/>
-          <a:p>
-            <a:pPr algn="ctr"/>
-            <a:endParaRPr lang="en-US" sz="2000">
-              <a:latin typeface="Alegreya" charset="0"/>
-              <a:ea typeface="Alegreya" charset="0"/>
-              <a:cs typeface="Alegreya" charset="0"/>
-            </a:endParaRPr>
-          </a:p>
-        </p:txBody>
-      </p:sp>
-      <p:sp>
-        <p:nvSpPr>
-          <p:cNvPr id="60" name="Rectangle 59"/>
-          <p:cNvSpPr/>
-          <p:nvPr/>
-        </p:nvSpPr>
-        <p:spPr>
-          <a:xfrm>
-            <a:off x="2848466" y="886759"/>
-            <a:ext cx="2788743" cy="1531199"/>
-          </a:xfrm>
-          <a:prstGeom prst="rect">
-            <a:avLst/>
-          </a:prstGeom>
-          <a:noFill/>
-          <a:ln w="28575">
-            <a:solidFill>
-              <a:schemeClr val="bg1">
-                <a:lumMod val="50000"/>
-              </a:schemeClr>
-            </a:solidFill>
-          </a:ln>
-          <a:effectLst/>
-        </p:spPr>
-        <p:style>
-          <a:lnRef idx="1">
-            <a:schemeClr val="accent1"/>
-          </a:lnRef>
-          <a:fillRef idx="3">
-            <a:schemeClr val="accent1"/>
-          </a:fillRef>
-          <a:effectRef idx="2">
-            <a:schemeClr val="accent1"/>
-          </a:effectRef>
-          <a:fontRef idx="minor">
-            <a:schemeClr val="lt1"/>
-          </a:fontRef>
-        </p:style>
-        <p:txBody>
-          <a:bodyPr rtlCol="0" anchor="ctr"/>
-          <a:lstStyle/>
-          <a:p>
-            <a:pPr algn="ctr"/>
             <a:endParaRPr lang="en-US" sz="2000"/>
-          </a:p>
-        </p:txBody>
-      </p:sp>
-      <p:sp>
-        <p:nvSpPr>
-          <p:cNvPr id="64" name="Rectangle 63"/>
-          <p:cNvSpPr/>
-          <p:nvPr/>
-        </p:nvSpPr>
-        <p:spPr>
-          <a:xfrm>
-            <a:off x="3292903" y="3369708"/>
-            <a:ext cx="1929732" cy="673998"/>
-          </a:xfrm>
-          <a:prstGeom prst="rect">
-            <a:avLst/>
-          </a:prstGeom>
-          <a:noFill/>
-          <a:ln w="28575">
-            <a:solidFill>
-              <a:schemeClr val="bg1">
-                <a:lumMod val="50000"/>
-              </a:schemeClr>
-            </a:solidFill>
-          </a:ln>
-          <a:effectLst/>
-        </p:spPr>
-        <p:style>
-          <a:lnRef idx="1">
-            <a:schemeClr val="accent1"/>
-          </a:lnRef>
-          <a:fillRef idx="3">
-            <a:schemeClr val="accent1"/>
-          </a:fillRef>
-          <a:effectRef idx="2">
-            <a:schemeClr val="accent1"/>
-          </a:effectRef>
-          <a:fontRef idx="minor">
-            <a:schemeClr val="lt1"/>
-          </a:fontRef>
-        </p:style>
-        <p:txBody>
-          <a:bodyPr rtlCol="0" anchor="ctr"/>
-          <a:lstStyle/>
-          <a:p>
-            <a:pPr algn="ctr"/>
-            <a:r>
-              <a:rPr lang="en-US" sz="2000" dirty="0" smtClean="0">
-                <a:solidFill>
-                  <a:schemeClr val="tx1"/>
-                </a:solidFill>
-                <a:latin typeface="Alegreya" charset="0"/>
-                <a:ea typeface="Alegreya" charset="0"/>
-                <a:cs typeface="Alegreya" charset="0"/>
-              </a:rPr>
-              <a:t>Outlier Removal</a:t>
-            </a:r>
-            <a:endParaRPr lang="en-US" sz="2000" dirty="0">
-              <a:solidFill>
-                <a:schemeClr val="tx1"/>
-              </a:solidFill>
-              <a:latin typeface="Alegreya" charset="0"/>
-              <a:ea typeface="Alegreya" charset="0"/>
-              <a:cs typeface="Alegreya" charset="0"/>
-            </a:endParaRPr>
-          </a:p>
-        </p:txBody>
-      </p:sp>
-      <p:sp>
-        <p:nvSpPr>
-          <p:cNvPr id="65" name="Rectangle 64"/>
-          <p:cNvSpPr/>
-          <p:nvPr/>
-        </p:nvSpPr>
-        <p:spPr>
-          <a:xfrm>
-            <a:off x="3296169" y="4462710"/>
-            <a:ext cx="1926466" cy="650722"/>
-          </a:xfrm>
-          <a:prstGeom prst="rect">
-            <a:avLst/>
-          </a:prstGeom>
-          <a:noFill/>
-          <a:ln w="28575">
-            <a:solidFill>
-              <a:schemeClr val="bg1">
-                <a:lumMod val="50000"/>
-              </a:schemeClr>
-            </a:solidFill>
-          </a:ln>
-          <a:effectLst/>
-        </p:spPr>
-        <p:style>
-          <a:lnRef idx="1">
-            <a:schemeClr val="accent1"/>
-          </a:lnRef>
-          <a:fillRef idx="3">
-            <a:schemeClr val="accent1"/>
-          </a:fillRef>
-          <a:effectRef idx="2">
-            <a:schemeClr val="accent1"/>
-          </a:effectRef>
-          <a:fontRef idx="minor">
-            <a:schemeClr val="lt1"/>
-          </a:fontRef>
-        </p:style>
-        <p:txBody>
-          <a:bodyPr rtlCol="0" anchor="ctr"/>
-          <a:lstStyle/>
-          <a:p>
-            <a:pPr algn="ctr"/>
-            <a:r>
-              <a:rPr lang="en-US" sz="2000" dirty="0" smtClean="0">
-                <a:solidFill>
-                  <a:schemeClr val="tx1"/>
-                </a:solidFill>
-                <a:latin typeface="Alegreya" charset="0"/>
-                <a:ea typeface="Alegreya" charset="0"/>
-                <a:cs typeface="Alegreya" charset="0"/>
-              </a:rPr>
-              <a:t>MILP Encoding</a:t>
-            </a:r>
-            <a:endParaRPr lang="en-US" sz="2000" dirty="0">
-              <a:solidFill>
-                <a:schemeClr val="tx1"/>
-              </a:solidFill>
-              <a:latin typeface="Alegreya" charset="0"/>
-              <a:ea typeface="Alegreya" charset="0"/>
-              <a:cs typeface="Alegreya" charset="0"/>
-            </a:endParaRPr>
           </a:p>
         </p:txBody>
       </p:sp>

</xml_diff>